<commit_message>
started testing AVL tree and passed them so far
</commit_message>
<xml_diff>
--- a/ex1/tests/sketch_tree.pptx
+++ b/ex1/tests/sketch_tree.pptx
@@ -6,6 +6,8 @@
   </p:sldMasterIdLst>
   <p:sldIdLst>
     <p:sldId id="256" r:id="rId2"/>
+    <p:sldId id="257" r:id="rId3"/>
+    <p:sldId id="258" r:id="rId4"/>
   </p:sldIdLst>
   <p:sldSz cx="12192000" cy="6858000"/>
   <p:notesSz cx="6858000" cy="9144000"/>
@@ -104,6 +106,11 @@
       </a:defRPr>
     </a:lvl9pPr>
   </p:defaultTextStyle>
+  <p:extLst>
+    <p:ext uri="{EFAFB233-063F-42B5-8137-9DF3F51BA10A}">
+      <p15:sldGuideLst xmlns:p15="http://schemas.microsoft.com/office/powerpoint/2012/main"/>
+    </p:ext>
+  </p:extLst>
 </p:presentation>
 </file>
 
@@ -256,7 +263,7 @@
           <a:p>
             <a:fld id="{A8E905E9-DFD8-4C69-8908-AF1D10759DCE}" type="datetimeFigureOut">
               <a:rPr lang="en-IL" smtClean="0"/>
-              <a:t>16/04/2022</a:t>
+              <a:t>18/04/2022</a:t>
             </a:fld>
             <a:endParaRPr lang="en-IL"/>
           </a:p>
@@ -456,7 +463,7 @@
           <a:p>
             <a:fld id="{A8E905E9-DFD8-4C69-8908-AF1D10759DCE}" type="datetimeFigureOut">
               <a:rPr lang="en-IL" smtClean="0"/>
-              <a:t>16/04/2022</a:t>
+              <a:t>18/04/2022</a:t>
             </a:fld>
             <a:endParaRPr lang="en-IL"/>
           </a:p>
@@ -666,7 +673,7 @@
           <a:p>
             <a:fld id="{A8E905E9-DFD8-4C69-8908-AF1D10759DCE}" type="datetimeFigureOut">
               <a:rPr lang="en-IL" smtClean="0"/>
-              <a:t>16/04/2022</a:t>
+              <a:t>18/04/2022</a:t>
             </a:fld>
             <a:endParaRPr lang="en-IL"/>
           </a:p>
@@ -866,7 +873,7 @@
           <a:p>
             <a:fld id="{A8E905E9-DFD8-4C69-8908-AF1D10759DCE}" type="datetimeFigureOut">
               <a:rPr lang="en-IL" smtClean="0"/>
-              <a:t>16/04/2022</a:t>
+              <a:t>18/04/2022</a:t>
             </a:fld>
             <a:endParaRPr lang="en-IL"/>
           </a:p>
@@ -1142,7 +1149,7 @@
           <a:p>
             <a:fld id="{A8E905E9-DFD8-4C69-8908-AF1D10759DCE}" type="datetimeFigureOut">
               <a:rPr lang="en-IL" smtClean="0"/>
-              <a:t>16/04/2022</a:t>
+              <a:t>18/04/2022</a:t>
             </a:fld>
             <a:endParaRPr lang="en-IL"/>
           </a:p>
@@ -1410,7 +1417,7 @@
           <a:p>
             <a:fld id="{A8E905E9-DFD8-4C69-8908-AF1D10759DCE}" type="datetimeFigureOut">
               <a:rPr lang="en-IL" smtClean="0"/>
-              <a:t>16/04/2022</a:t>
+              <a:t>18/04/2022</a:t>
             </a:fld>
             <a:endParaRPr lang="en-IL"/>
           </a:p>
@@ -1825,7 +1832,7 @@
           <a:p>
             <a:fld id="{A8E905E9-DFD8-4C69-8908-AF1D10759DCE}" type="datetimeFigureOut">
               <a:rPr lang="en-IL" smtClean="0"/>
-              <a:t>16/04/2022</a:t>
+              <a:t>18/04/2022</a:t>
             </a:fld>
             <a:endParaRPr lang="en-IL"/>
           </a:p>
@@ -1967,7 +1974,7 @@
           <a:p>
             <a:fld id="{A8E905E9-DFD8-4C69-8908-AF1D10759DCE}" type="datetimeFigureOut">
               <a:rPr lang="en-IL" smtClean="0"/>
-              <a:t>16/04/2022</a:t>
+              <a:t>18/04/2022</a:t>
             </a:fld>
             <a:endParaRPr lang="en-IL"/>
           </a:p>
@@ -2080,7 +2087,7 @@
           <a:p>
             <a:fld id="{A8E905E9-DFD8-4C69-8908-AF1D10759DCE}" type="datetimeFigureOut">
               <a:rPr lang="en-IL" smtClean="0"/>
-              <a:t>16/04/2022</a:t>
+              <a:t>18/04/2022</a:t>
             </a:fld>
             <a:endParaRPr lang="en-IL"/>
           </a:p>
@@ -2393,7 +2400,7 @@
           <a:p>
             <a:fld id="{A8E905E9-DFD8-4C69-8908-AF1D10759DCE}" type="datetimeFigureOut">
               <a:rPr lang="en-IL" smtClean="0"/>
-              <a:t>16/04/2022</a:t>
+              <a:t>18/04/2022</a:t>
             </a:fld>
             <a:endParaRPr lang="en-IL"/>
           </a:p>
@@ -2682,7 +2689,7 @@
           <a:p>
             <a:fld id="{A8E905E9-DFD8-4C69-8908-AF1D10759DCE}" type="datetimeFigureOut">
               <a:rPr lang="en-IL" smtClean="0"/>
-              <a:t>16/04/2022</a:t>
+              <a:t>18/04/2022</a:t>
             </a:fld>
             <a:endParaRPr lang="en-IL"/>
           </a:p>
@@ -2925,7 +2932,7 @@
           <a:p>
             <a:fld id="{A8E905E9-DFD8-4C69-8908-AF1D10759DCE}" type="datetimeFigureOut">
               <a:rPr lang="en-IL" smtClean="0"/>
-              <a:t>16/04/2022</a:t>
+              <a:t>18/04/2022</a:t>
             </a:fld>
             <a:endParaRPr lang="en-IL"/>
           </a:p>
@@ -4989,6 +4996,2630 @@
 </p:sld>
 </file>
 
+<file path=ppt/slides/slide2.xml><?xml version="1.0" encoding="utf-8"?>
+<p:sld xmlns:a="http://schemas.openxmlformats.org/drawingml/2006/main" xmlns:r="http://schemas.openxmlformats.org/officeDocument/2006/relationships" xmlns:p="http://schemas.openxmlformats.org/presentationml/2006/main">
+  <p:cSld>
+    <p:spTree>
+      <p:nvGrpSpPr>
+        <p:cNvPr id="1" name=""/>
+        <p:cNvGrpSpPr/>
+        <p:nvPr/>
+      </p:nvGrpSpPr>
+      <p:grpSpPr>
+        <a:xfrm>
+          <a:off x="0" y="0"/>
+          <a:ext cx="0" cy="0"/>
+          <a:chOff x="0" y="0"/>
+          <a:chExt cx="0" cy="0"/>
+        </a:xfrm>
+      </p:grpSpPr>
+      <p:sp>
+        <p:nvSpPr>
+          <p:cNvPr id="4" name="Oval 3">
+            <a:extLst>
+              <a:ext uri="{FF2B5EF4-FFF2-40B4-BE49-F238E27FC236}">
+                <a16:creationId xmlns:a16="http://schemas.microsoft.com/office/drawing/2014/main" id="{ADF9CD02-12ED-439B-80DE-CED727D58513}"/>
+              </a:ext>
+            </a:extLst>
+          </p:cNvPr>
+          <p:cNvSpPr/>
+          <p:nvPr/>
+        </p:nvSpPr>
+        <p:spPr>
+          <a:xfrm>
+            <a:off x="2992602" y="1108959"/>
+            <a:ext cx="638354" cy="621102"/>
+          </a:xfrm>
+          <a:prstGeom prst="ellipse">
+            <a:avLst/>
+          </a:prstGeom>
+        </p:spPr>
+        <p:style>
+          <a:lnRef idx="2">
+            <a:schemeClr val="accent1">
+              <a:shade val="50000"/>
+            </a:schemeClr>
+          </a:lnRef>
+          <a:fillRef idx="1">
+            <a:schemeClr val="accent1"/>
+          </a:fillRef>
+          <a:effectRef idx="0">
+            <a:schemeClr val="accent1"/>
+          </a:effectRef>
+          <a:fontRef idx="minor">
+            <a:schemeClr val="lt1"/>
+          </a:fontRef>
+        </p:style>
+        <p:txBody>
+          <a:bodyPr rtlCol="0" anchor="ctr"/>
+          <a:lstStyle/>
+          <a:p>
+            <a:pPr algn="ctr"/>
+            <a:r>
+              <a:rPr lang="en-US" dirty="0"/>
+              <a:t>5</a:t>
+            </a:r>
+            <a:endParaRPr lang="en-IL" dirty="0"/>
+          </a:p>
+        </p:txBody>
+      </p:sp>
+      <p:cxnSp>
+        <p:nvCxnSpPr>
+          <p:cNvPr id="5" name="Straight Connector 4">
+            <a:extLst>
+              <a:ext uri="{FF2B5EF4-FFF2-40B4-BE49-F238E27FC236}">
+                <a16:creationId xmlns:a16="http://schemas.microsoft.com/office/drawing/2014/main" id="{2FD8C976-9D39-4DAA-A4ED-B7064D8DC20D}"/>
+              </a:ext>
+            </a:extLst>
+          </p:cNvPr>
+          <p:cNvCxnSpPr>
+            <a:cxnSpLocks/>
+          </p:cNvCxnSpPr>
+          <p:nvPr/>
+        </p:nvCxnSpPr>
+        <p:spPr>
+          <a:xfrm flipH="1">
+            <a:off x="2085946" y="1487084"/>
+            <a:ext cx="1051157" cy="430540"/>
+          </a:xfrm>
+          <a:prstGeom prst="line">
+            <a:avLst/>
+          </a:prstGeom>
+        </p:spPr>
+        <p:style>
+          <a:lnRef idx="1">
+            <a:schemeClr val="accent1"/>
+          </a:lnRef>
+          <a:fillRef idx="0">
+            <a:schemeClr val="accent1"/>
+          </a:fillRef>
+          <a:effectRef idx="0">
+            <a:schemeClr val="accent1"/>
+          </a:effectRef>
+          <a:fontRef idx="minor">
+            <a:schemeClr val="tx1"/>
+          </a:fontRef>
+        </p:style>
+      </p:cxnSp>
+      <p:cxnSp>
+        <p:nvCxnSpPr>
+          <p:cNvPr id="6" name="Straight Connector 5">
+            <a:extLst>
+              <a:ext uri="{FF2B5EF4-FFF2-40B4-BE49-F238E27FC236}">
+                <a16:creationId xmlns:a16="http://schemas.microsoft.com/office/drawing/2014/main" id="{D55E085A-857B-4D9A-9287-15E46C60DD49}"/>
+              </a:ext>
+            </a:extLst>
+          </p:cNvPr>
+          <p:cNvCxnSpPr>
+            <a:cxnSpLocks/>
+          </p:cNvCxnSpPr>
+          <p:nvPr/>
+        </p:nvCxnSpPr>
+        <p:spPr>
+          <a:xfrm>
+            <a:off x="3494390" y="1487084"/>
+            <a:ext cx="1230128" cy="559694"/>
+          </a:xfrm>
+          <a:prstGeom prst="line">
+            <a:avLst/>
+          </a:prstGeom>
+        </p:spPr>
+        <p:style>
+          <a:lnRef idx="1">
+            <a:schemeClr val="accent1"/>
+          </a:lnRef>
+          <a:fillRef idx="0">
+            <a:schemeClr val="accent1"/>
+          </a:fillRef>
+          <a:effectRef idx="0">
+            <a:schemeClr val="accent1"/>
+          </a:effectRef>
+          <a:fontRef idx="minor">
+            <a:schemeClr val="tx1"/>
+          </a:fontRef>
+        </p:style>
+      </p:cxnSp>
+      <p:sp>
+        <p:nvSpPr>
+          <p:cNvPr id="8" name="Oval 7">
+            <a:extLst>
+              <a:ext uri="{FF2B5EF4-FFF2-40B4-BE49-F238E27FC236}">
+                <a16:creationId xmlns:a16="http://schemas.microsoft.com/office/drawing/2014/main" id="{88E6CD13-FC1E-4310-BF64-AF2926D2CB5E}"/>
+              </a:ext>
+            </a:extLst>
+          </p:cNvPr>
+          <p:cNvSpPr/>
+          <p:nvPr/>
+        </p:nvSpPr>
+        <p:spPr>
+          <a:xfrm>
+            <a:off x="1562189" y="4017766"/>
+            <a:ext cx="638354" cy="621102"/>
+          </a:xfrm>
+          <a:prstGeom prst="ellipse">
+            <a:avLst/>
+          </a:prstGeom>
+        </p:spPr>
+        <p:style>
+          <a:lnRef idx="2">
+            <a:schemeClr val="accent1">
+              <a:shade val="50000"/>
+            </a:schemeClr>
+          </a:lnRef>
+          <a:fillRef idx="1">
+            <a:schemeClr val="accent1"/>
+          </a:fillRef>
+          <a:effectRef idx="0">
+            <a:schemeClr val="accent1"/>
+          </a:effectRef>
+          <a:fontRef idx="minor">
+            <a:schemeClr val="lt1"/>
+          </a:fontRef>
+        </p:style>
+        <p:txBody>
+          <a:bodyPr rtlCol="0" anchor="ctr"/>
+          <a:lstStyle/>
+          <a:p>
+            <a:pPr algn="ctr"/>
+            <a:r>
+              <a:rPr lang="en-US" dirty="0"/>
+              <a:t>3</a:t>
+            </a:r>
+            <a:endParaRPr lang="en-IL" dirty="0"/>
+          </a:p>
+        </p:txBody>
+      </p:sp>
+      <p:sp>
+        <p:nvSpPr>
+          <p:cNvPr id="9" name="Oval 8">
+            <a:extLst>
+              <a:ext uri="{FF2B5EF4-FFF2-40B4-BE49-F238E27FC236}">
+                <a16:creationId xmlns:a16="http://schemas.microsoft.com/office/drawing/2014/main" id="{45618D00-5680-429F-BB8B-2215D643065B}"/>
+              </a:ext>
+            </a:extLst>
+          </p:cNvPr>
+          <p:cNvSpPr/>
+          <p:nvPr/>
+        </p:nvSpPr>
+        <p:spPr>
+          <a:xfrm>
+            <a:off x="4405341" y="1736227"/>
+            <a:ext cx="638354" cy="621102"/>
+          </a:xfrm>
+          <a:prstGeom prst="ellipse">
+            <a:avLst/>
+          </a:prstGeom>
+        </p:spPr>
+        <p:style>
+          <a:lnRef idx="2">
+            <a:schemeClr val="accent1">
+              <a:shade val="50000"/>
+            </a:schemeClr>
+          </a:lnRef>
+          <a:fillRef idx="1">
+            <a:schemeClr val="accent1"/>
+          </a:fillRef>
+          <a:effectRef idx="0">
+            <a:schemeClr val="accent1"/>
+          </a:effectRef>
+          <a:fontRef idx="minor">
+            <a:schemeClr val="lt1"/>
+          </a:fontRef>
+        </p:style>
+        <p:txBody>
+          <a:bodyPr rtlCol="0" anchor="ctr"/>
+          <a:lstStyle/>
+          <a:p>
+            <a:pPr algn="ctr"/>
+            <a:r>
+              <a:rPr lang="en-US" dirty="0"/>
+              <a:t>8</a:t>
+            </a:r>
+            <a:endParaRPr lang="en-IL" dirty="0"/>
+          </a:p>
+        </p:txBody>
+      </p:sp>
+      <p:sp>
+        <p:nvSpPr>
+          <p:cNvPr id="12" name="Oval 11">
+            <a:extLst>
+              <a:ext uri="{FF2B5EF4-FFF2-40B4-BE49-F238E27FC236}">
+                <a16:creationId xmlns:a16="http://schemas.microsoft.com/office/drawing/2014/main" id="{FE85DE7B-9740-4E53-8443-6314F5DF0E93}"/>
+              </a:ext>
+            </a:extLst>
+          </p:cNvPr>
+          <p:cNvSpPr/>
+          <p:nvPr/>
+        </p:nvSpPr>
+        <p:spPr>
+          <a:xfrm>
+            <a:off x="2371580" y="2894429"/>
+            <a:ext cx="638354" cy="621102"/>
+          </a:xfrm>
+          <a:prstGeom prst="ellipse">
+            <a:avLst/>
+          </a:prstGeom>
+        </p:spPr>
+        <p:style>
+          <a:lnRef idx="2">
+            <a:schemeClr val="accent1">
+              <a:shade val="50000"/>
+            </a:schemeClr>
+          </a:lnRef>
+          <a:fillRef idx="1">
+            <a:schemeClr val="accent1"/>
+          </a:fillRef>
+          <a:effectRef idx="0">
+            <a:schemeClr val="accent1"/>
+          </a:effectRef>
+          <a:fontRef idx="minor">
+            <a:schemeClr val="lt1"/>
+          </a:fontRef>
+        </p:style>
+        <p:txBody>
+          <a:bodyPr rtlCol="0" anchor="ctr"/>
+          <a:lstStyle/>
+          <a:p>
+            <a:pPr algn="ctr"/>
+            <a:r>
+              <a:rPr lang="en-US" dirty="0"/>
+              <a:t>4</a:t>
+            </a:r>
+            <a:endParaRPr lang="en-IL" dirty="0"/>
+          </a:p>
+        </p:txBody>
+      </p:sp>
+      <p:sp>
+        <p:nvSpPr>
+          <p:cNvPr id="13" name="Oval 12">
+            <a:extLst>
+              <a:ext uri="{FF2B5EF4-FFF2-40B4-BE49-F238E27FC236}">
+                <a16:creationId xmlns:a16="http://schemas.microsoft.com/office/drawing/2014/main" id="{46A46D48-81A8-4133-8E35-3D29723333E0}"/>
+              </a:ext>
+            </a:extLst>
+          </p:cNvPr>
+          <p:cNvSpPr/>
+          <p:nvPr/>
+        </p:nvSpPr>
+        <p:spPr>
+          <a:xfrm>
+            <a:off x="1650297" y="1766930"/>
+            <a:ext cx="638354" cy="621102"/>
+          </a:xfrm>
+          <a:prstGeom prst="ellipse">
+            <a:avLst/>
+          </a:prstGeom>
+        </p:spPr>
+        <p:style>
+          <a:lnRef idx="2">
+            <a:schemeClr val="accent1">
+              <a:shade val="50000"/>
+            </a:schemeClr>
+          </a:lnRef>
+          <a:fillRef idx="1">
+            <a:schemeClr val="accent1"/>
+          </a:fillRef>
+          <a:effectRef idx="0">
+            <a:schemeClr val="accent1"/>
+          </a:effectRef>
+          <a:fontRef idx="minor">
+            <a:schemeClr val="lt1"/>
+          </a:fontRef>
+        </p:style>
+        <p:txBody>
+          <a:bodyPr rtlCol="0" anchor="ctr"/>
+          <a:lstStyle/>
+          <a:p>
+            <a:pPr algn="ctr"/>
+            <a:r>
+              <a:rPr lang="en-US" dirty="0"/>
+              <a:t>2</a:t>
+            </a:r>
+            <a:endParaRPr lang="en-IL" dirty="0"/>
+          </a:p>
+        </p:txBody>
+      </p:sp>
+      <p:sp>
+        <p:nvSpPr>
+          <p:cNvPr id="14" name="Oval 13">
+            <a:extLst>
+              <a:ext uri="{FF2B5EF4-FFF2-40B4-BE49-F238E27FC236}">
+                <a16:creationId xmlns:a16="http://schemas.microsoft.com/office/drawing/2014/main" id="{BF944F62-7D17-443A-9FB0-FAE6282F1660}"/>
+              </a:ext>
+            </a:extLst>
+          </p:cNvPr>
+          <p:cNvSpPr/>
+          <p:nvPr/>
+        </p:nvSpPr>
+        <p:spPr>
+          <a:xfrm>
+            <a:off x="470754" y="186516"/>
+            <a:ext cx="638354" cy="621102"/>
+          </a:xfrm>
+          <a:prstGeom prst="ellipse">
+            <a:avLst/>
+          </a:prstGeom>
+        </p:spPr>
+        <p:style>
+          <a:lnRef idx="2">
+            <a:schemeClr val="accent1">
+              <a:shade val="50000"/>
+            </a:schemeClr>
+          </a:lnRef>
+          <a:fillRef idx="1">
+            <a:schemeClr val="accent1"/>
+          </a:fillRef>
+          <a:effectRef idx="0">
+            <a:schemeClr val="accent1"/>
+          </a:effectRef>
+          <a:fontRef idx="minor">
+            <a:schemeClr val="lt1"/>
+          </a:fontRef>
+        </p:style>
+        <p:txBody>
+          <a:bodyPr rtlCol="0" anchor="ctr"/>
+          <a:lstStyle/>
+          <a:p>
+            <a:pPr algn="ctr"/>
+            <a:r>
+              <a:rPr lang="en-US" dirty="0"/>
+              <a:t>6</a:t>
+            </a:r>
+            <a:endParaRPr lang="en-IL" dirty="0"/>
+          </a:p>
+        </p:txBody>
+      </p:sp>
+      <p:sp>
+        <p:nvSpPr>
+          <p:cNvPr id="15" name="Oval 14">
+            <a:extLst>
+              <a:ext uri="{FF2B5EF4-FFF2-40B4-BE49-F238E27FC236}">
+                <a16:creationId xmlns:a16="http://schemas.microsoft.com/office/drawing/2014/main" id="{F60B2FB0-FC0D-477D-B73A-A82CC6849087}"/>
+              </a:ext>
+            </a:extLst>
+          </p:cNvPr>
+          <p:cNvSpPr/>
+          <p:nvPr/>
+        </p:nvSpPr>
+        <p:spPr>
+          <a:xfrm>
+            <a:off x="5204910" y="2788234"/>
+            <a:ext cx="638354" cy="621102"/>
+          </a:xfrm>
+          <a:prstGeom prst="ellipse">
+            <a:avLst/>
+          </a:prstGeom>
+        </p:spPr>
+        <p:style>
+          <a:lnRef idx="2">
+            <a:schemeClr val="accent1">
+              <a:shade val="50000"/>
+            </a:schemeClr>
+          </a:lnRef>
+          <a:fillRef idx="1">
+            <a:schemeClr val="accent1"/>
+          </a:fillRef>
+          <a:effectRef idx="0">
+            <a:schemeClr val="accent1"/>
+          </a:effectRef>
+          <a:fontRef idx="minor">
+            <a:schemeClr val="lt1"/>
+          </a:fontRef>
+        </p:style>
+        <p:txBody>
+          <a:bodyPr rtlCol="0" anchor="ctr"/>
+          <a:lstStyle/>
+          <a:p>
+            <a:pPr algn="ctr"/>
+            <a:r>
+              <a:rPr lang="en-US" dirty="0"/>
+              <a:t>10</a:t>
+            </a:r>
+            <a:endParaRPr lang="en-IL" dirty="0"/>
+          </a:p>
+        </p:txBody>
+      </p:sp>
+      <p:sp>
+        <p:nvSpPr>
+          <p:cNvPr id="16" name="Oval 15">
+            <a:extLst>
+              <a:ext uri="{FF2B5EF4-FFF2-40B4-BE49-F238E27FC236}">
+                <a16:creationId xmlns:a16="http://schemas.microsoft.com/office/drawing/2014/main" id="{88A780DD-6211-4DA8-8765-B221308A7668}"/>
+              </a:ext>
+            </a:extLst>
+          </p:cNvPr>
+          <p:cNvSpPr/>
+          <p:nvPr/>
+        </p:nvSpPr>
+        <p:spPr>
+          <a:xfrm>
+            <a:off x="3429263" y="2894429"/>
+            <a:ext cx="638354" cy="621102"/>
+          </a:xfrm>
+          <a:prstGeom prst="ellipse">
+            <a:avLst/>
+          </a:prstGeom>
+        </p:spPr>
+        <p:style>
+          <a:lnRef idx="2">
+            <a:schemeClr val="accent1">
+              <a:shade val="50000"/>
+            </a:schemeClr>
+          </a:lnRef>
+          <a:fillRef idx="1">
+            <a:schemeClr val="accent1"/>
+          </a:fillRef>
+          <a:effectRef idx="0">
+            <a:schemeClr val="accent1"/>
+          </a:effectRef>
+          <a:fontRef idx="minor">
+            <a:schemeClr val="lt1"/>
+          </a:fontRef>
+        </p:style>
+        <p:txBody>
+          <a:bodyPr rtlCol="0" anchor="ctr"/>
+          <a:lstStyle/>
+          <a:p>
+            <a:pPr algn="ctr"/>
+            <a:r>
+              <a:rPr lang="en-US" dirty="0"/>
+              <a:t>7</a:t>
+            </a:r>
+            <a:endParaRPr lang="en-IL" dirty="0"/>
+          </a:p>
+        </p:txBody>
+      </p:sp>
+      <p:cxnSp>
+        <p:nvCxnSpPr>
+          <p:cNvPr id="17" name="Straight Connector 16">
+            <a:extLst>
+              <a:ext uri="{FF2B5EF4-FFF2-40B4-BE49-F238E27FC236}">
+                <a16:creationId xmlns:a16="http://schemas.microsoft.com/office/drawing/2014/main" id="{59EA5F00-A627-4AA1-9108-0E4B662A35DC}"/>
+              </a:ext>
+            </a:extLst>
+          </p:cNvPr>
+          <p:cNvCxnSpPr>
+            <a:cxnSpLocks/>
+          </p:cNvCxnSpPr>
+          <p:nvPr/>
+        </p:nvCxnSpPr>
+        <p:spPr>
+          <a:xfrm>
+            <a:off x="4861571" y="2241212"/>
+            <a:ext cx="603005" cy="800039"/>
+          </a:xfrm>
+          <a:prstGeom prst="line">
+            <a:avLst/>
+          </a:prstGeom>
+        </p:spPr>
+        <p:style>
+          <a:lnRef idx="1">
+            <a:schemeClr val="accent1"/>
+          </a:lnRef>
+          <a:fillRef idx="0">
+            <a:schemeClr val="accent1"/>
+          </a:fillRef>
+          <a:effectRef idx="0">
+            <a:schemeClr val="accent1"/>
+          </a:effectRef>
+          <a:fontRef idx="minor">
+            <a:schemeClr val="tx1"/>
+          </a:fontRef>
+        </p:style>
+      </p:cxnSp>
+      <p:cxnSp>
+        <p:nvCxnSpPr>
+          <p:cNvPr id="19" name="Straight Connector 18">
+            <a:extLst>
+              <a:ext uri="{FF2B5EF4-FFF2-40B4-BE49-F238E27FC236}">
+                <a16:creationId xmlns:a16="http://schemas.microsoft.com/office/drawing/2014/main" id="{9E8CEC1B-4C02-4619-AF9C-0DF96A2CBB06}"/>
+              </a:ext>
+            </a:extLst>
+          </p:cNvPr>
+          <p:cNvCxnSpPr>
+            <a:cxnSpLocks/>
+          </p:cNvCxnSpPr>
+          <p:nvPr/>
+        </p:nvCxnSpPr>
+        <p:spPr>
+          <a:xfrm>
+            <a:off x="2071442" y="2241211"/>
+            <a:ext cx="603005" cy="800039"/>
+          </a:xfrm>
+          <a:prstGeom prst="line">
+            <a:avLst/>
+          </a:prstGeom>
+        </p:spPr>
+        <p:style>
+          <a:lnRef idx="1">
+            <a:schemeClr val="accent1"/>
+          </a:lnRef>
+          <a:fillRef idx="0">
+            <a:schemeClr val="accent1"/>
+          </a:fillRef>
+          <a:effectRef idx="0">
+            <a:schemeClr val="accent1"/>
+          </a:effectRef>
+          <a:fontRef idx="minor">
+            <a:schemeClr val="tx1"/>
+          </a:fontRef>
+        </p:style>
+      </p:cxnSp>
+      <p:cxnSp>
+        <p:nvCxnSpPr>
+          <p:cNvPr id="20" name="Straight Connector 19">
+            <a:extLst>
+              <a:ext uri="{FF2B5EF4-FFF2-40B4-BE49-F238E27FC236}">
+                <a16:creationId xmlns:a16="http://schemas.microsoft.com/office/drawing/2014/main" id="{596AA1C5-5AC4-49E5-A287-7E216860DD0B}"/>
+              </a:ext>
+            </a:extLst>
+          </p:cNvPr>
+          <p:cNvCxnSpPr>
+            <a:cxnSpLocks/>
+          </p:cNvCxnSpPr>
+          <p:nvPr/>
+        </p:nvCxnSpPr>
+        <p:spPr>
+          <a:xfrm>
+            <a:off x="3807951" y="3322803"/>
+            <a:ext cx="376059" cy="853333"/>
+          </a:xfrm>
+          <a:prstGeom prst="line">
+            <a:avLst/>
+          </a:prstGeom>
+        </p:spPr>
+        <p:style>
+          <a:lnRef idx="1">
+            <a:schemeClr val="accent1"/>
+          </a:lnRef>
+          <a:fillRef idx="0">
+            <a:schemeClr val="accent1"/>
+          </a:fillRef>
+          <a:effectRef idx="0">
+            <a:schemeClr val="accent1"/>
+          </a:effectRef>
+          <a:fontRef idx="minor">
+            <a:schemeClr val="tx1"/>
+          </a:fontRef>
+        </p:style>
+      </p:cxnSp>
+      <p:cxnSp>
+        <p:nvCxnSpPr>
+          <p:cNvPr id="22" name="Straight Connector 21">
+            <a:extLst>
+              <a:ext uri="{FF2B5EF4-FFF2-40B4-BE49-F238E27FC236}">
+                <a16:creationId xmlns:a16="http://schemas.microsoft.com/office/drawing/2014/main" id="{BA4193EC-18A4-45EF-8692-5FA8DE1F552B}"/>
+              </a:ext>
+            </a:extLst>
+          </p:cNvPr>
+          <p:cNvCxnSpPr>
+            <a:cxnSpLocks/>
+          </p:cNvCxnSpPr>
+          <p:nvPr/>
+        </p:nvCxnSpPr>
+        <p:spPr>
+          <a:xfrm flipH="1">
+            <a:off x="3807951" y="2173469"/>
+            <a:ext cx="877404" cy="925316"/>
+          </a:xfrm>
+          <a:prstGeom prst="line">
+            <a:avLst/>
+          </a:prstGeom>
+        </p:spPr>
+        <p:style>
+          <a:lnRef idx="1">
+            <a:schemeClr val="accent1"/>
+          </a:lnRef>
+          <a:fillRef idx="0">
+            <a:schemeClr val="accent1"/>
+          </a:fillRef>
+          <a:effectRef idx="0">
+            <a:schemeClr val="accent1"/>
+          </a:effectRef>
+          <a:fontRef idx="minor">
+            <a:schemeClr val="tx1"/>
+          </a:fontRef>
+        </p:style>
+      </p:cxnSp>
+      <p:cxnSp>
+        <p:nvCxnSpPr>
+          <p:cNvPr id="24" name="Straight Connector 23">
+            <a:extLst>
+              <a:ext uri="{FF2B5EF4-FFF2-40B4-BE49-F238E27FC236}">
+                <a16:creationId xmlns:a16="http://schemas.microsoft.com/office/drawing/2014/main" id="{8D9C1536-67CA-4CE6-BA8D-46D95F8C7375}"/>
+              </a:ext>
+            </a:extLst>
+          </p:cNvPr>
+          <p:cNvCxnSpPr>
+            <a:cxnSpLocks/>
+          </p:cNvCxnSpPr>
+          <p:nvPr/>
+        </p:nvCxnSpPr>
+        <p:spPr>
+          <a:xfrm flipH="1">
+            <a:off x="1003962" y="2115934"/>
+            <a:ext cx="877404" cy="925316"/>
+          </a:xfrm>
+          <a:prstGeom prst="line">
+            <a:avLst/>
+          </a:prstGeom>
+        </p:spPr>
+        <p:style>
+          <a:lnRef idx="1">
+            <a:schemeClr val="accent1"/>
+          </a:lnRef>
+          <a:fillRef idx="0">
+            <a:schemeClr val="accent1"/>
+          </a:fillRef>
+          <a:effectRef idx="0">
+            <a:schemeClr val="accent1"/>
+          </a:effectRef>
+          <a:fontRef idx="minor">
+            <a:schemeClr val="tx1"/>
+          </a:fontRef>
+        </p:style>
+      </p:cxnSp>
+      <p:cxnSp>
+        <p:nvCxnSpPr>
+          <p:cNvPr id="25" name="Straight Connector 24">
+            <a:extLst>
+              <a:ext uri="{FF2B5EF4-FFF2-40B4-BE49-F238E27FC236}">
+                <a16:creationId xmlns:a16="http://schemas.microsoft.com/office/drawing/2014/main" id="{79DCADF0-CB48-473A-816B-7C41F6BE672F}"/>
+              </a:ext>
+            </a:extLst>
+          </p:cNvPr>
+          <p:cNvCxnSpPr>
+            <a:cxnSpLocks/>
+          </p:cNvCxnSpPr>
+          <p:nvPr/>
+        </p:nvCxnSpPr>
+        <p:spPr>
+          <a:xfrm flipH="1">
+            <a:off x="5057257" y="3136947"/>
+            <a:ext cx="501345" cy="958189"/>
+          </a:xfrm>
+          <a:prstGeom prst="line">
+            <a:avLst/>
+          </a:prstGeom>
+        </p:spPr>
+        <p:style>
+          <a:lnRef idx="1">
+            <a:schemeClr val="accent1"/>
+          </a:lnRef>
+          <a:fillRef idx="0">
+            <a:schemeClr val="accent1"/>
+          </a:fillRef>
+          <a:effectRef idx="0">
+            <a:schemeClr val="accent1"/>
+          </a:effectRef>
+          <a:fontRef idx="minor">
+            <a:schemeClr val="tx1"/>
+          </a:fontRef>
+        </p:style>
+      </p:cxnSp>
+      <p:sp>
+        <p:nvSpPr>
+          <p:cNvPr id="29" name="Oval 28">
+            <a:extLst>
+              <a:ext uri="{FF2B5EF4-FFF2-40B4-BE49-F238E27FC236}">
+                <a16:creationId xmlns:a16="http://schemas.microsoft.com/office/drawing/2014/main" id="{EB39261E-3673-4ED1-888D-DDFB72349565}"/>
+              </a:ext>
+            </a:extLst>
+          </p:cNvPr>
+          <p:cNvSpPr/>
+          <p:nvPr/>
+        </p:nvSpPr>
+        <p:spPr>
+          <a:xfrm>
+            <a:off x="4709034" y="4026806"/>
+            <a:ext cx="638354" cy="621102"/>
+          </a:xfrm>
+          <a:prstGeom prst="ellipse">
+            <a:avLst/>
+          </a:prstGeom>
+        </p:spPr>
+        <p:style>
+          <a:lnRef idx="2">
+            <a:schemeClr val="accent1">
+              <a:shade val="50000"/>
+            </a:schemeClr>
+          </a:lnRef>
+          <a:fillRef idx="1">
+            <a:schemeClr val="accent1"/>
+          </a:fillRef>
+          <a:effectRef idx="0">
+            <a:schemeClr val="accent1"/>
+          </a:effectRef>
+          <a:fontRef idx="minor">
+            <a:schemeClr val="lt1"/>
+          </a:fontRef>
+        </p:style>
+        <p:txBody>
+          <a:bodyPr rtlCol="0" anchor="ctr"/>
+          <a:lstStyle/>
+          <a:p>
+            <a:pPr algn="ctr"/>
+            <a:r>
+              <a:rPr lang="en-US" dirty="0"/>
+              <a:t>9</a:t>
+            </a:r>
+            <a:endParaRPr lang="en-IL" dirty="0"/>
+          </a:p>
+        </p:txBody>
+      </p:sp>
+      <p:sp>
+        <p:nvSpPr>
+          <p:cNvPr id="30" name="Oval 29">
+            <a:extLst>
+              <a:ext uri="{FF2B5EF4-FFF2-40B4-BE49-F238E27FC236}">
+                <a16:creationId xmlns:a16="http://schemas.microsoft.com/office/drawing/2014/main" id="{80804BE3-44D3-4337-ACEB-10CDD129F6CA}"/>
+              </a:ext>
+            </a:extLst>
+          </p:cNvPr>
+          <p:cNvSpPr/>
+          <p:nvPr/>
+        </p:nvSpPr>
+        <p:spPr>
+          <a:xfrm>
+            <a:off x="5758980" y="4026806"/>
+            <a:ext cx="638354" cy="621102"/>
+          </a:xfrm>
+          <a:prstGeom prst="ellipse">
+            <a:avLst/>
+          </a:prstGeom>
+        </p:spPr>
+        <p:style>
+          <a:lnRef idx="2">
+            <a:schemeClr val="accent1">
+              <a:shade val="50000"/>
+            </a:schemeClr>
+          </a:lnRef>
+          <a:fillRef idx="1">
+            <a:schemeClr val="accent1"/>
+          </a:fillRef>
+          <a:effectRef idx="0">
+            <a:schemeClr val="accent1"/>
+          </a:effectRef>
+          <a:fontRef idx="minor">
+            <a:schemeClr val="lt1"/>
+          </a:fontRef>
+        </p:style>
+        <p:txBody>
+          <a:bodyPr rtlCol="0" anchor="ctr"/>
+          <a:lstStyle/>
+          <a:p>
+            <a:pPr algn="ctr"/>
+            <a:r>
+              <a:rPr lang="en-US" dirty="0"/>
+              <a:t>12</a:t>
+            </a:r>
+            <a:endParaRPr lang="en-IL" dirty="0"/>
+          </a:p>
+        </p:txBody>
+      </p:sp>
+      <p:sp>
+        <p:nvSpPr>
+          <p:cNvPr id="31" name="Oval 30">
+            <a:extLst>
+              <a:ext uri="{FF2B5EF4-FFF2-40B4-BE49-F238E27FC236}">
+                <a16:creationId xmlns:a16="http://schemas.microsoft.com/office/drawing/2014/main" id="{588F14ED-3B37-46B7-B927-8A2941F69105}"/>
+              </a:ext>
+            </a:extLst>
+          </p:cNvPr>
+          <p:cNvSpPr/>
+          <p:nvPr/>
+        </p:nvSpPr>
+        <p:spPr>
+          <a:xfrm>
+            <a:off x="5256544" y="5143511"/>
+            <a:ext cx="638354" cy="621102"/>
+          </a:xfrm>
+          <a:prstGeom prst="ellipse">
+            <a:avLst/>
+          </a:prstGeom>
+        </p:spPr>
+        <p:style>
+          <a:lnRef idx="2">
+            <a:schemeClr val="accent1">
+              <a:shade val="50000"/>
+            </a:schemeClr>
+          </a:lnRef>
+          <a:fillRef idx="1">
+            <a:schemeClr val="accent1"/>
+          </a:fillRef>
+          <a:effectRef idx="0">
+            <a:schemeClr val="accent1"/>
+          </a:effectRef>
+          <a:fontRef idx="minor">
+            <a:schemeClr val="lt1"/>
+          </a:fontRef>
+        </p:style>
+        <p:txBody>
+          <a:bodyPr rtlCol="0" anchor="ctr"/>
+          <a:lstStyle/>
+          <a:p>
+            <a:pPr algn="ctr"/>
+            <a:r>
+              <a:rPr lang="en-US" dirty="0"/>
+              <a:t>11</a:t>
+            </a:r>
+            <a:endParaRPr lang="en-IL" dirty="0"/>
+          </a:p>
+        </p:txBody>
+      </p:sp>
+      <p:cxnSp>
+        <p:nvCxnSpPr>
+          <p:cNvPr id="32" name="Straight Connector 31">
+            <a:extLst>
+              <a:ext uri="{FF2B5EF4-FFF2-40B4-BE49-F238E27FC236}">
+                <a16:creationId xmlns:a16="http://schemas.microsoft.com/office/drawing/2014/main" id="{347AC39A-7C5A-4622-A033-D9737C20B4CB}"/>
+              </a:ext>
+            </a:extLst>
+          </p:cNvPr>
+          <p:cNvCxnSpPr>
+            <a:cxnSpLocks/>
+          </p:cNvCxnSpPr>
+          <p:nvPr/>
+        </p:nvCxnSpPr>
+        <p:spPr>
+          <a:xfrm flipH="1">
+            <a:off x="1721664" y="3314765"/>
+            <a:ext cx="877404" cy="925316"/>
+          </a:xfrm>
+          <a:prstGeom prst="line">
+            <a:avLst/>
+          </a:prstGeom>
+        </p:spPr>
+        <p:style>
+          <a:lnRef idx="1">
+            <a:schemeClr val="accent1"/>
+          </a:lnRef>
+          <a:fillRef idx="0">
+            <a:schemeClr val="accent1"/>
+          </a:fillRef>
+          <a:effectRef idx="0">
+            <a:schemeClr val="accent1"/>
+          </a:effectRef>
+          <a:fontRef idx="minor">
+            <a:schemeClr val="tx1"/>
+          </a:fontRef>
+        </p:style>
+      </p:cxnSp>
+      <p:sp>
+        <p:nvSpPr>
+          <p:cNvPr id="34" name="Oval 33">
+            <a:extLst>
+              <a:ext uri="{FF2B5EF4-FFF2-40B4-BE49-F238E27FC236}">
+                <a16:creationId xmlns:a16="http://schemas.microsoft.com/office/drawing/2014/main" id="{0C95B91A-A58D-43DC-982B-D276178B14DC}"/>
+              </a:ext>
+            </a:extLst>
+          </p:cNvPr>
+          <p:cNvSpPr/>
+          <p:nvPr/>
+        </p:nvSpPr>
+        <p:spPr>
+          <a:xfrm>
+            <a:off x="673438" y="2788199"/>
+            <a:ext cx="638354" cy="621102"/>
+          </a:xfrm>
+          <a:prstGeom prst="ellipse">
+            <a:avLst/>
+          </a:prstGeom>
+        </p:spPr>
+        <p:style>
+          <a:lnRef idx="2">
+            <a:schemeClr val="accent1">
+              <a:shade val="50000"/>
+            </a:schemeClr>
+          </a:lnRef>
+          <a:fillRef idx="1">
+            <a:schemeClr val="accent1"/>
+          </a:fillRef>
+          <a:effectRef idx="0">
+            <a:schemeClr val="accent1"/>
+          </a:effectRef>
+          <a:fontRef idx="minor">
+            <a:schemeClr val="lt1"/>
+          </a:fontRef>
+        </p:style>
+        <p:txBody>
+          <a:bodyPr rtlCol="0" anchor="ctr"/>
+          <a:lstStyle/>
+          <a:p>
+            <a:pPr algn="ctr"/>
+            <a:r>
+              <a:rPr lang="en-US" dirty="0"/>
+              <a:t>*</a:t>
+            </a:r>
+            <a:endParaRPr lang="en-IL" dirty="0"/>
+          </a:p>
+        </p:txBody>
+      </p:sp>
+      <p:cxnSp>
+        <p:nvCxnSpPr>
+          <p:cNvPr id="35" name="Straight Connector 34">
+            <a:extLst>
+              <a:ext uri="{FF2B5EF4-FFF2-40B4-BE49-F238E27FC236}">
+                <a16:creationId xmlns:a16="http://schemas.microsoft.com/office/drawing/2014/main" id="{404CD11F-4136-430B-80E3-6875D908C6C5}"/>
+              </a:ext>
+            </a:extLst>
+          </p:cNvPr>
+          <p:cNvCxnSpPr>
+            <a:cxnSpLocks/>
+          </p:cNvCxnSpPr>
+          <p:nvPr/>
+        </p:nvCxnSpPr>
+        <p:spPr>
+          <a:xfrm>
+            <a:off x="5608088" y="3314765"/>
+            <a:ext cx="376059" cy="853333"/>
+          </a:xfrm>
+          <a:prstGeom prst="line">
+            <a:avLst/>
+          </a:prstGeom>
+        </p:spPr>
+        <p:style>
+          <a:lnRef idx="1">
+            <a:schemeClr val="accent1"/>
+          </a:lnRef>
+          <a:fillRef idx="0">
+            <a:schemeClr val="accent1"/>
+          </a:fillRef>
+          <a:effectRef idx="0">
+            <a:schemeClr val="accent1"/>
+          </a:effectRef>
+          <a:fontRef idx="minor">
+            <a:schemeClr val="tx1"/>
+          </a:fontRef>
+        </p:style>
+      </p:cxnSp>
+      <p:cxnSp>
+        <p:nvCxnSpPr>
+          <p:cNvPr id="36" name="Straight Connector 35">
+            <a:extLst>
+              <a:ext uri="{FF2B5EF4-FFF2-40B4-BE49-F238E27FC236}">
+                <a16:creationId xmlns:a16="http://schemas.microsoft.com/office/drawing/2014/main" id="{4A03B50C-B86F-4A53-8428-045E4C4D0B97}"/>
+              </a:ext>
+            </a:extLst>
+          </p:cNvPr>
+          <p:cNvCxnSpPr>
+            <a:cxnSpLocks/>
+          </p:cNvCxnSpPr>
+          <p:nvPr/>
+        </p:nvCxnSpPr>
+        <p:spPr>
+          <a:xfrm flipH="1">
+            <a:off x="5532841" y="4425546"/>
+            <a:ext cx="501345" cy="958189"/>
+          </a:xfrm>
+          <a:prstGeom prst="line">
+            <a:avLst/>
+          </a:prstGeom>
+        </p:spPr>
+        <p:style>
+          <a:lnRef idx="1">
+            <a:schemeClr val="accent1"/>
+          </a:lnRef>
+          <a:fillRef idx="0">
+            <a:schemeClr val="accent1"/>
+          </a:fillRef>
+          <a:effectRef idx="0">
+            <a:schemeClr val="accent1"/>
+          </a:effectRef>
+          <a:fontRef idx="minor">
+            <a:schemeClr val="tx1"/>
+          </a:fontRef>
+        </p:style>
+      </p:cxnSp>
+      <p:sp>
+        <p:nvSpPr>
+          <p:cNvPr id="43" name="Oval 42">
+            <a:extLst>
+              <a:ext uri="{FF2B5EF4-FFF2-40B4-BE49-F238E27FC236}">
+                <a16:creationId xmlns:a16="http://schemas.microsoft.com/office/drawing/2014/main" id="{B90C64C0-D13F-4283-91DA-8DA6D2E4B71A}"/>
+              </a:ext>
+            </a:extLst>
+          </p:cNvPr>
+          <p:cNvSpPr/>
+          <p:nvPr/>
+        </p:nvSpPr>
+        <p:spPr>
+          <a:xfrm>
+            <a:off x="8448613" y="1743856"/>
+            <a:ext cx="638354" cy="621102"/>
+          </a:xfrm>
+          <a:prstGeom prst="ellipse">
+            <a:avLst/>
+          </a:prstGeom>
+        </p:spPr>
+        <p:style>
+          <a:lnRef idx="2">
+            <a:schemeClr val="accent1">
+              <a:shade val="50000"/>
+            </a:schemeClr>
+          </a:lnRef>
+          <a:fillRef idx="1">
+            <a:schemeClr val="accent1"/>
+          </a:fillRef>
+          <a:effectRef idx="0">
+            <a:schemeClr val="accent1"/>
+          </a:effectRef>
+          <a:fontRef idx="minor">
+            <a:schemeClr val="lt1"/>
+          </a:fontRef>
+        </p:style>
+        <p:txBody>
+          <a:bodyPr rtlCol="0" anchor="ctr"/>
+          <a:lstStyle/>
+          <a:p>
+            <a:pPr algn="ctr"/>
+            <a:r>
+              <a:rPr lang="en-US" dirty="0"/>
+              <a:t>8</a:t>
+            </a:r>
+            <a:endParaRPr lang="en-IL" dirty="0"/>
+          </a:p>
+        </p:txBody>
+      </p:sp>
+      <p:sp>
+        <p:nvSpPr>
+          <p:cNvPr id="44" name="Oval 43">
+            <a:extLst>
+              <a:ext uri="{FF2B5EF4-FFF2-40B4-BE49-F238E27FC236}">
+                <a16:creationId xmlns:a16="http://schemas.microsoft.com/office/drawing/2014/main" id="{E19C3229-FD9E-435C-B54B-B4AA5996578B}"/>
+              </a:ext>
+            </a:extLst>
+          </p:cNvPr>
+          <p:cNvSpPr/>
+          <p:nvPr/>
+        </p:nvSpPr>
+        <p:spPr>
+          <a:xfrm>
+            <a:off x="9381531" y="793415"/>
+            <a:ext cx="638354" cy="621102"/>
+          </a:xfrm>
+          <a:prstGeom prst="ellipse">
+            <a:avLst/>
+          </a:prstGeom>
+        </p:spPr>
+        <p:style>
+          <a:lnRef idx="2">
+            <a:schemeClr val="accent1">
+              <a:shade val="50000"/>
+            </a:schemeClr>
+          </a:lnRef>
+          <a:fillRef idx="1">
+            <a:schemeClr val="accent1"/>
+          </a:fillRef>
+          <a:effectRef idx="0">
+            <a:schemeClr val="accent1"/>
+          </a:effectRef>
+          <a:fontRef idx="minor">
+            <a:schemeClr val="lt1"/>
+          </a:fontRef>
+        </p:style>
+        <p:txBody>
+          <a:bodyPr rtlCol="0" anchor="ctr"/>
+          <a:lstStyle/>
+          <a:p>
+            <a:pPr algn="ctr"/>
+            <a:r>
+              <a:rPr lang="en-US" dirty="0"/>
+              <a:t>10</a:t>
+            </a:r>
+            <a:endParaRPr lang="en-IL" dirty="0"/>
+          </a:p>
+        </p:txBody>
+      </p:sp>
+      <p:sp>
+        <p:nvSpPr>
+          <p:cNvPr id="45" name="Oval 44">
+            <a:extLst>
+              <a:ext uri="{FF2B5EF4-FFF2-40B4-BE49-F238E27FC236}">
+                <a16:creationId xmlns:a16="http://schemas.microsoft.com/office/drawing/2014/main" id="{48A6D14F-5AB4-4CE4-BC43-41EA1793FD62}"/>
+              </a:ext>
+            </a:extLst>
+          </p:cNvPr>
+          <p:cNvSpPr/>
+          <p:nvPr/>
+        </p:nvSpPr>
+        <p:spPr>
+          <a:xfrm>
+            <a:off x="7748775" y="2894429"/>
+            <a:ext cx="638354" cy="621102"/>
+          </a:xfrm>
+          <a:prstGeom prst="ellipse">
+            <a:avLst/>
+          </a:prstGeom>
+        </p:spPr>
+        <p:style>
+          <a:lnRef idx="2">
+            <a:schemeClr val="accent1">
+              <a:shade val="50000"/>
+            </a:schemeClr>
+          </a:lnRef>
+          <a:fillRef idx="1">
+            <a:schemeClr val="accent1"/>
+          </a:fillRef>
+          <a:effectRef idx="0">
+            <a:schemeClr val="accent1"/>
+          </a:effectRef>
+          <a:fontRef idx="minor">
+            <a:schemeClr val="lt1"/>
+          </a:fontRef>
+        </p:style>
+        <p:txBody>
+          <a:bodyPr rtlCol="0" anchor="ctr"/>
+          <a:lstStyle/>
+          <a:p>
+            <a:pPr algn="ctr"/>
+            <a:r>
+              <a:rPr lang="en-US" dirty="0"/>
+              <a:t>7</a:t>
+            </a:r>
+            <a:endParaRPr lang="en-IL" dirty="0"/>
+          </a:p>
+        </p:txBody>
+      </p:sp>
+      <p:cxnSp>
+        <p:nvCxnSpPr>
+          <p:cNvPr id="46" name="Straight Connector 45">
+            <a:extLst>
+              <a:ext uri="{FF2B5EF4-FFF2-40B4-BE49-F238E27FC236}">
+                <a16:creationId xmlns:a16="http://schemas.microsoft.com/office/drawing/2014/main" id="{46A8FDB8-657C-463C-B6AA-7A79F3F5440C}"/>
+              </a:ext>
+            </a:extLst>
+          </p:cNvPr>
+          <p:cNvCxnSpPr>
+            <a:cxnSpLocks/>
+          </p:cNvCxnSpPr>
+          <p:nvPr/>
+        </p:nvCxnSpPr>
+        <p:spPr>
+          <a:xfrm>
+            <a:off x="10018468" y="1124507"/>
+            <a:ext cx="603005" cy="800039"/>
+          </a:xfrm>
+          <a:prstGeom prst="line">
+            <a:avLst/>
+          </a:prstGeom>
+        </p:spPr>
+        <p:style>
+          <a:lnRef idx="1">
+            <a:schemeClr val="accent1"/>
+          </a:lnRef>
+          <a:fillRef idx="0">
+            <a:schemeClr val="accent1"/>
+          </a:fillRef>
+          <a:effectRef idx="0">
+            <a:schemeClr val="accent1"/>
+          </a:effectRef>
+          <a:fontRef idx="minor">
+            <a:schemeClr val="tx1"/>
+          </a:fontRef>
+        </p:style>
+      </p:cxnSp>
+      <p:cxnSp>
+        <p:nvCxnSpPr>
+          <p:cNvPr id="47" name="Straight Connector 46">
+            <a:extLst>
+              <a:ext uri="{FF2B5EF4-FFF2-40B4-BE49-F238E27FC236}">
+                <a16:creationId xmlns:a16="http://schemas.microsoft.com/office/drawing/2014/main" id="{B999B784-C59E-497B-A784-A311EB38701B}"/>
+              </a:ext>
+            </a:extLst>
+          </p:cNvPr>
+          <p:cNvCxnSpPr>
+            <a:cxnSpLocks/>
+          </p:cNvCxnSpPr>
+          <p:nvPr/>
+        </p:nvCxnSpPr>
+        <p:spPr>
+          <a:xfrm>
+            <a:off x="8964848" y="2206098"/>
+            <a:ext cx="376059" cy="853333"/>
+          </a:xfrm>
+          <a:prstGeom prst="line">
+            <a:avLst/>
+          </a:prstGeom>
+        </p:spPr>
+        <p:style>
+          <a:lnRef idx="1">
+            <a:schemeClr val="accent1"/>
+          </a:lnRef>
+          <a:fillRef idx="0">
+            <a:schemeClr val="accent1"/>
+          </a:fillRef>
+          <a:effectRef idx="0">
+            <a:schemeClr val="accent1"/>
+          </a:effectRef>
+          <a:fontRef idx="minor">
+            <a:schemeClr val="tx1"/>
+          </a:fontRef>
+        </p:style>
+      </p:cxnSp>
+      <p:cxnSp>
+        <p:nvCxnSpPr>
+          <p:cNvPr id="48" name="Straight Connector 47">
+            <a:extLst>
+              <a:ext uri="{FF2B5EF4-FFF2-40B4-BE49-F238E27FC236}">
+                <a16:creationId xmlns:a16="http://schemas.microsoft.com/office/drawing/2014/main" id="{8089A858-4E96-4E6F-8DDF-387AEFA77769}"/>
+              </a:ext>
+            </a:extLst>
+          </p:cNvPr>
+          <p:cNvCxnSpPr>
+            <a:cxnSpLocks/>
+          </p:cNvCxnSpPr>
+          <p:nvPr/>
+        </p:nvCxnSpPr>
+        <p:spPr>
+          <a:xfrm flipH="1">
+            <a:off x="8972496" y="1061241"/>
+            <a:ext cx="501345" cy="958189"/>
+          </a:xfrm>
+          <a:prstGeom prst="line">
+            <a:avLst/>
+          </a:prstGeom>
+        </p:spPr>
+        <p:style>
+          <a:lnRef idx="1">
+            <a:schemeClr val="accent1"/>
+          </a:lnRef>
+          <a:fillRef idx="0">
+            <a:schemeClr val="accent1"/>
+          </a:fillRef>
+          <a:effectRef idx="0">
+            <a:schemeClr val="accent1"/>
+          </a:effectRef>
+          <a:fontRef idx="minor">
+            <a:schemeClr val="tx1"/>
+          </a:fontRef>
+        </p:style>
+      </p:cxnSp>
+      <p:sp>
+        <p:nvSpPr>
+          <p:cNvPr id="49" name="Oval 48">
+            <a:extLst>
+              <a:ext uri="{FF2B5EF4-FFF2-40B4-BE49-F238E27FC236}">
+                <a16:creationId xmlns:a16="http://schemas.microsoft.com/office/drawing/2014/main" id="{490B1245-CF30-4663-AF0E-C9E5DCFCA049}"/>
+              </a:ext>
+            </a:extLst>
+          </p:cNvPr>
+          <p:cNvSpPr/>
+          <p:nvPr/>
+        </p:nvSpPr>
+        <p:spPr>
+          <a:xfrm>
+            <a:off x="9139176" y="2961473"/>
+            <a:ext cx="638354" cy="621102"/>
+          </a:xfrm>
+          <a:prstGeom prst="ellipse">
+            <a:avLst/>
+          </a:prstGeom>
+        </p:spPr>
+        <p:style>
+          <a:lnRef idx="2">
+            <a:schemeClr val="accent1">
+              <a:shade val="50000"/>
+            </a:schemeClr>
+          </a:lnRef>
+          <a:fillRef idx="1">
+            <a:schemeClr val="accent1"/>
+          </a:fillRef>
+          <a:effectRef idx="0">
+            <a:schemeClr val="accent1"/>
+          </a:effectRef>
+          <a:fontRef idx="minor">
+            <a:schemeClr val="lt1"/>
+          </a:fontRef>
+        </p:style>
+        <p:txBody>
+          <a:bodyPr rtlCol="0" anchor="ctr"/>
+          <a:lstStyle/>
+          <a:p>
+            <a:pPr algn="ctr"/>
+            <a:r>
+              <a:rPr lang="en-US" dirty="0"/>
+              <a:t>9</a:t>
+            </a:r>
+            <a:endParaRPr lang="en-IL" dirty="0"/>
+          </a:p>
+        </p:txBody>
+      </p:sp>
+      <p:sp>
+        <p:nvSpPr>
+          <p:cNvPr id="50" name="Oval 49">
+            <a:extLst>
+              <a:ext uri="{FF2B5EF4-FFF2-40B4-BE49-F238E27FC236}">
+                <a16:creationId xmlns:a16="http://schemas.microsoft.com/office/drawing/2014/main" id="{FD5533F9-631F-4604-B3E4-40BF8DC5194F}"/>
+              </a:ext>
+            </a:extLst>
+          </p:cNvPr>
+          <p:cNvSpPr/>
+          <p:nvPr/>
+        </p:nvSpPr>
+        <p:spPr>
+          <a:xfrm>
+            <a:off x="10268521" y="1766930"/>
+            <a:ext cx="638354" cy="621102"/>
+          </a:xfrm>
+          <a:prstGeom prst="ellipse">
+            <a:avLst/>
+          </a:prstGeom>
+        </p:spPr>
+        <p:style>
+          <a:lnRef idx="2">
+            <a:schemeClr val="accent1">
+              <a:shade val="50000"/>
+            </a:schemeClr>
+          </a:lnRef>
+          <a:fillRef idx="1">
+            <a:schemeClr val="accent1"/>
+          </a:fillRef>
+          <a:effectRef idx="0">
+            <a:schemeClr val="accent1"/>
+          </a:effectRef>
+          <a:fontRef idx="minor">
+            <a:schemeClr val="lt1"/>
+          </a:fontRef>
+        </p:style>
+        <p:txBody>
+          <a:bodyPr rtlCol="0" anchor="ctr"/>
+          <a:lstStyle/>
+          <a:p>
+            <a:pPr algn="ctr"/>
+            <a:r>
+              <a:rPr lang="en-US" dirty="0"/>
+              <a:t>12</a:t>
+            </a:r>
+            <a:endParaRPr lang="en-IL" dirty="0"/>
+          </a:p>
+        </p:txBody>
+      </p:sp>
+      <p:sp>
+        <p:nvSpPr>
+          <p:cNvPr id="51" name="Oval 50">
+            <a:extLst>
+              <a:ext uri="{FF2B5EF4-FFF2-40B4-BE49-F238E27FC236}">
+                <a16:creationId xmlns:a16="http://schemas.microsoft.com/office/drawing/2014/main" id="{F54D5F85-4413-476B-AC78-C06B7DAB58A7}"/>
+              </a:ext>
+            </a:extLst>
+          </p:cNvPr>
+          <p:cNvSpPr/>
+          <p:nvPr/>
+        </p:nvSpPr>
+        <p:spPr>
+          <a:xfrm>
+            <a:off x="10831992" y="2894429"/>
+            <a:ext cx="638354" cy="621102"/>
+          </a:xfrm>
+          <a:prstGeom prst="ellipse">
+            <a:avLst/>
+          </a:prstGeom>
+        </p:spPr>
+        <p:style>
+          <a:lnRef idx="2">
+            <a:schemeClr val="accent1">
+              <a:shade val="50000"/>
+            </a:schemeClr>
+          </a:lnRef>
+          <a:fillRef idx="1">
+            <a:schemeClr val="accent1"/>
+          </a:fillRef>
+          <a:effectRef idx="0">
+            <a:schemeClr val="accent1"/>
+          </a:effectRef>
+          <a:fontRef idx="minor">
+            <a:schemeClr val="lt1"/>
+          </a:fontRef>
+        </p:style>
+        <p:txBody>
+          <a:bodyPr rtlCol="0" anchor="ctr"/>
+          <a:lstStyle/>
+          <a:p>
+            <a:pPr algn="ctr"/>
+            <a:r>
+              <a:rPr lang="en-US" dirty="0"/>
+              <a:t>11</a:t>
+            </a:r>
+            <a:endParaRPr lang="en-IL" dirty="0"/>
+          </a:p>
+        </p:txBody>
+      </p:sp>
+      <p:cxnSp>
+        <p:nvCxnSpPr>
+          <p:cNvPr id="52" name="Straight Connector 51">
+            <a:extLst>
+              <a:ext uri="{FF2B5EF4-FFF2-40B4-BE49-F238E27FC236}">
+                <a16:creationId xmlns:a16="http://schemas.microsoft.com/office/drawing/2014/main" id="{8465FA73-13F2-483C-9769-5E8FFA388A08}"/>
+              </a:ext>
+            </a:extLst>
+          </p:cNvPr>
+          <p:cNvCxnSpPr>
+            <a:cxnSpLocks/>
+          </p:cNvCxnSpPr>
+          <p:nvPr/>
+        </p:nvCxnSpPr>
+        <p:spPr>
+          <a:xfrm>
+            <a:off x="10764985" y="2198060"/>
+            <a:ext cx="376059" cy="853333"/>
+          </a:xfrm>
+          <a:prstGeom prst="line">
+            <a:avLst/>
+          </a:prstGeom>
+        </p:spPr>
+        <p:style>
+          <a:lnRef idx="1">
+            <a:schemeClr val="accent1"/>
+          </a:lnRef>
+          <a:fillRef idx="0">
+            <a:schemeClr val="accent1"/>
+          </a:fillRef>
+          <a:effectRef idx="0">
+            <a:schemeClr val="accent1"/>
+          </a:effectRef>
+          <a:fontRef idx="minor">
+            <a:schemeClr val="tx1"/>
+          </a:fontRef>
+        </p:style>
+      </p:cxnSp>
+      <p:cxnSp>
+        <p:nvCxnSpPr>
+          <p:cNvPr id="53" name="Straight Connector 52">
+            <a:extLst>
+              <a:ext uri="{FF2B5EF4-FFF2-40B4-BE49-F238E27FC236}">
+                <a16:creationId xmlns:a16="http://schemas.microsoft.com/office/drawing/2014/main" id="{DE9A4AE8-12D7-4189-83A6-2AAF63696B4E}"/>
+              </a:ext>
+            </a:extLst>
+          </p:cNvPr>
+          <p:cNvCxnSpPr>
+            <a:cxnSpLocks/>
+          </p:cNvCxnSpPr>
+          <p:nvPr/>
+        </p:nvCxnSpPr>
+        <p:spPr>
+          <a:xfrm flipH="1">
+            <a:off x="10689738" y="3308841"/>
+            <a:ext cx="501345" cy="958189"/>
+          </a:xfrm>
+          <a:prstGeom prst="line">
+            <a:avLst/>
+          </a:prstGeom>
+        </p:spPr>
+        <p:style>
+          <a:lnRef idx="1">
+            <a:schemeClr val="accent1"/>
+          </a:lnRef>
+          <a:fillRef idx="0">
+            <a:schemeClr val="accent1"/>
+          </a:fillRef>
+          <a:effectRef idx="0">
+            <a:schemeClr val="accent1"/>
+          </a:effectRef>
+          <a:fontRef idx="minor">
+            <a:schemeClr val="tx1"/>
+          </a:fontRef>
+        </p:style>
+      </p:cxnSp>
+      <p:cxnSp>
+        <p:nvCxnSpPr>
+          <p:cNvPr id="55" name="Straight Connector 54">
+            <a:extLst>
+              <a:ext uri="{FF2B5EF4-FFF2-40B4-BE49-F238E27FC236}">
+                <a16:creationId xmlns:a16="http://schemas.microsoft.com/office/drawing/2014/main" id="{EFBEAB74-6346-4499-8008-A7C3451FF533}"/>
+              </a:ext>
+            </a:extLst>
+          </p:cNvPr>
+          <p:cNvCxnSpPr>
+            <a:cxnSpLocks/>
+          </p:cNvCxnSpPr>
+          <p:nvPr/>
+        </p:nvCxnSpPr>
+        <p:spPr>
+          <a:xfrm flipH="1">
+            <a:off x="8126912" y="2146790"/>
+            <a:ext cx="501345" cy="958189"/>
+          </a:xfrm>
+          <a:prstGeom prst="line">
+            <a:avLst/>
+          </a:prstGeom>
+        </p:spPr>
+        <p:style>
+          <a:lnRef idx="1">
+            <a:schemeClr val="accent1"/>
+          </a:lnRef>
+          <a:fillRef idx="0">
+            <a:schemeClr val="accent1"/>
+          </a:fillRef>
+          <a:effectRef idx="0">
+            <a:schemeClr val="accent1"/>
+          </a:effectRef>
+          <a:fontRef idx="minor">
+            <a:schemeClr val="tx1"/>
+          </a:fontRef>
+        </p:style>
+      </p:cxnSp>
+    </p:spTree>
+    <p:extLst>
+      <p:ext uri="{BB962C8B-B14F-4D97-AF65-F5344CB8AC3E}">
+        <p14:creationId xmlns:p14="http://schemas.microsoft.com/office/powerpoint/2010/main" val="3457516895"/>
+      </p:ext>
+    </p:extLst>
+  </p:cSld>
+  <p:clrMapOvr>
+    <a:masterClrMapping/>
+  </p:clrMapOvr>
+</p:sld>
+</file>
+
+<file path=ppt/slides/slide3.xml><?xml version="1.0" encoding="utf-8"?>
+<p:sld xmlns:a="http://schemas.openxmlformats.org/drawingml/2006/main" xmlns:r="http://schemas.openxmlformats.org/officeDocument/2006/relationships" xmlns:p="http://schemas.openxmlformats.org/presentationml/2006/main">
+  <p:cSld>
+    <p:spTree>
+      <p:nvGrpSpPr>
+        <p:cNvPr id="1" name=""/>
+        <p:cNvGrpSpPr/>
+        <p:nvPr/>
+      </p:nvGrpSpPr>
+      <p:grpSpPr>
+        <a:xfrm>
+          <a:off x="0" y="0"/>
+          <a:ext cx="0" cy="0"/>
+          <a:chOff x="0" y="0"/>
+          <a:chExt cx="0" cy="0"/>
+        </a:xfrm>
+      </p:grpSpPr>
+      <p:sp>
+        <p:nvSpPr>
+          <p:cNvPr id="13" name="Oval 12">
+            <a:extLst>
+              <a:ext uri="{FF2B5EF4-FFF2-40B4-BE49-F238E27FC236}">
+                <a16:creationId xmlns:a16="http://schemas.microsoft.com/office/drawing/2014/main" id="{A8D50DB1-073D-4598-96D6-12E9622D931C}"/>
+              </a:ext>
+            </a:extLst>
+          </p:cNvPr>
+          <p:cNvSpPr/>
+          <p:nvPr/>
+        </p:nvSpPr>
+        <p:spPr>
+          <a:xfrm>
+            <a:off x="8974427" y="680149"/>
+            <a:ext cx="638354" cy="621102"/>
+          </a:xfrm>
+          <a:prstGeom prst="ellipse">
+            <a:avLst/>
+          </a:prstGeom>
+        </p:spPr>
+        <p:style>
+          <a:lnRef idx="2">
+            <a:schemeClr val="accent1">
+              <a:shade val="50000"/>
+            </a:schemeClr>
+          </a:lnRef>
+          <a:fillRef idx="1">
+            <a:schemeClr val="accent1"/>
+          </a:fillRef>
+          <a:effectRef idx="0">
+            <a:schemeClr val="accent1"/>
+          </a:effectRef>
+          <a:fontRef idx="minor">
+            <a:schemeClr val="lt1"/>
+          </a:fontRef>
+        </p:style>
+        <p:txBody>
+          <a:bodyPr rtlCol="0" anchor="ctr"/>
+          <a:lstStyle/>
+          <a:p>
+            <a:pPr algn="ctr"/>
+            <a:r>
+              <a:rPr lang="en-US" dirty="0"/>
+              <a:t>5</a:t>
+            </a:r>
+            <a:endParaRPr lang="en-IL" dirty="0"/>
+          </a:p>
+        </p:txBody>
+      </p:sp>
+      <p:cxnSp>
+        <p:nvCxnSpPr>
+          <p:cNvPr id="14" name="Straight Connector 13">
+            <a:extLst>
+              <a:ext uri="{FF2B5EF4-FFF2-40B4-BE49-F238E27FC236}">
+                <a16:creationId xmlns:a16="http://schemas.microsoft.com/office/drawing/2014/main" id="{F7929DB8-A7E1-4C3C-A3D0-70ECC7281344}"/>
+              </a:ext>
+            </a:extLst>
+          </p:cNvPr>
+          <p:cNvCxnSpPr>
+            <a:cxnSpLocks/>
+          </p:cNvCxnSpPr>
+          <p:nvPr/>
+        </p:nvCxnSpPr>
+        <p:spPr>
+          <a:xfrm flipH="1">
+            <a:off x="4433940" y="1401843"/>
+            <a:ext cx="1051157" cy="430540"/>
+          </a:xfrm>
+          <a:prstGeom prst="line">
+            <a:avLst/>
+          </a:prstGeom>
+        </p:spPr>
+        <p:style>
+          <a:lnRef idx="1">
+            <a:schemeClr val="accent1"/>
+          </a:lnRef>
+          <a:fillRef idx="0">
+            <a:schemeClr val="accent1"/>
+          </a:fillRef>
+          <a:effectRef idx="0">
+            <a:schemeClr val="accent1"/>
+          </a:effectRef>
+          <a:fontRef idx="minor">
+            <a:schemeClr val="tx1"/>
+          </a:fontRef>
+        </p:style>
+      </p:cxnSp>
+      <p:cxnSp>
+        <p:nvCxnSpPr>
+          <p:cNvPr id="15" name="Straight Connector 14">
+            <a:extLst>
+              <a:ext uri="{FF2B5EF4-FFF2-40B4-BE49-F238E27FC236}">
+                <a16:creationId xmlns:a16="http://schemas.microsoft.com/office/drawing/2014/main" id="{B27D7CCB-DB47-46C1-8961-24AD6ED4A4FC}"/>
+              </a:ext>
+            </a:extLst>
+          </p:cNvPr>
+          <p:cNvCxnSpPr>
+            <a:cxnSpLocks/>
+          </p:cNvCxnSpPr>
+          <p:nvPr/>
+        </p:nvCxnSpPr>
+        <p:spPr>
+          <a:xfrm>
+            <a:off x="5842384" y="1401843"/>
+            <a:ext cx="1230128" cy="559694"/>
+          </a:xfrm>
+          <a:prstGeom prst="line">
+            <a:avLst/>
+          </a:prstGeom>
+        </p:spPr>
+        <p:style>
+          <a:lnRef idx="1">
+            <a:schemeClr val="accent1"/>
+          </a:lnRef>
+          <a:fillRef idx="0">
+            <a:schemeClr val="accent1"/>
+          </a:fillRef>
+          <a:effectRef idx="0">
+            <a:schemeClr val="accent1"/>
+          </a:effectRef>
+          <a:fontRef idx="minor">
+            <a:schemeClr val="tx1"/>
+          </a:fontRef>
+        </p:style>
+      </p:cxnSp>
+      <p:sp>
+        <p:nvSpPr>
+          <p:cNvPr id="16" name="Oval 15">
+            <a:extLst>
+              <a:ext uri="{FF2B5EF4-FFF2-40B4-BE49-F238E27FC236}">
+                <a16:creationId xmlns:a16="http://schemas.microsoft.com/office/drawing/2014/main" id="{61DE0BA2-07F5-47AE-8BB7-69940BBA6DF9}"/>
+              </a:ext>
+            </a:extLst>
+          </p:cNvPr>
+          <p:cNvSpPr/>
+          <p:nvPr/>
+        </p:nvSpPr>
+        <p:spPr>
+          <a:xfrm>
+            <a:off x="3998291" y="1650986"/>
+            <a:ext cx="638354" cy="621102"/>
+          </a:xfrm>
+          <a:prstGeom prst="ellipse">
+            <a:avLst/>
+          </a:prstGeom>
+        </p:spPr>
+        <p:style>
+          <a:lnRef idx="2">
+            <a:schemeClr val="accent1">
+              <a:shade val="50000"/>
+            </a:schemeClr>
+          </a:lnRef>
+          <a:fillRef idx="1">
+            <a:schemeClr val="accent1"/>
+          </a:fillRef>
+          <a:effectRef idx="0">
+            <a:schemeClr val="accent1"/>
+          </a:effectRef>
+          <a:fontRef idx="minor">
+            <a:schemeClr val="lt1"/>
+          </a:fontRef>
+        </p:style>
+        <p:txBody>
+          <a:bodyPr rtlCol="0" anchor="ctr"/>
+          <a:lstStyle/>
+          <a:p>
+            <a:pPr algn="ctr"/>
+            <a:r>
+              <a:rPr lang="en-US" dirty="0"/>
+              <a:t>3</a:t>
+            </a:r>
+            <a:endParaRPr lang="en-IL" dirty="0"/>
+          </a:p>
+        </p:txBody>
+      </p:sp>
+      <p:sp>
+        <p:nvSpPr>
+          <p:cNvPr id="17" name="Oval 16">
+            <a:extLst>
+              <a:ext uri="{FF2B5EF4-FFF2-40B4-BE49-F238E27FC236}">
+                <a16:creationId xmlns:a16="http://schemas.microsoft.com/office/drawing/2014/main" id="{8BF794A3-1429-47D3-A7C7-6CEEB593F777}"/>
+              </a:ext>
+            </a:extLst>
+          </p:cNvPr>
+          <p:cNvSpPr/>
+          <p:nvPr/>
+        </p:nvSpPr>
+        <p:spPr>
+          <a:xfrm>
+            <a:off x="5804668" y="2804305"/>
+            <a:ext cx="638354" cy="621102"/>
+          </a:xfrm>
+          <a:prstGeom prst="ellipse">
+            <a:avLst/>
+          </a:prstGeom>
+        </p:spPr>
+        <p:style>
+          <a:lnRef idx="2">
+            <a:schemeClr val="accent1">
+              <a:shade val="50000"/>
+            </a:schemeClr>
+          </a:lnRef>
+          <a:fillRef idx="1">
+            <a:schemeClr val="accent1"/>
+          </a:fillRef>
+          <a:effectRef idx="0">
+            <a:schemeClr val="accent1"/>
+          </a:effectRef>
+          <a:fontRef idx="minor">
+            <a:schemeClr val="lt1"/>
+          </a:fontRef>
+        </p:style>
+        <p:txBody>
+          <a:bodyPr rtlCol="0" anchor="ctr"/>
+          <a:lstStyle/>
+          <a:p>
+            <a:pPr algn="ctr"/>
+            <a:r>
+              <a:rPr lang="en-US" dirty="0"/>
+              <a:t>8</a:t>
+            </a:r>
+            <a:endParaRPr lang="en-IL" dirty="0"/>
+          </a:p>
+        </p:txBody>
+      </p:sp>
+      <p:sp>
+        <p:nvSpPr>
+          <p:cNvPr id="18" name="Oval 17">
+            <a:extLst>
+              <a:ext uri="{FF2B5EF4-FFF2-40B4-BE49-F238E27FC236}">
+                <a16:creationId xmlns:a16="http://schemas.microsoft.com/office/drawing/2014/main" id="{41ADE486-B571-4812-8187-4ABDADA3A34C}"/>
+              </a:ext>
+            </a:extLst>
+          </p:cNvPr>
+          <p:cNvSpPr/>
+          <p:nvPr/>
+        </p:nvSpPr>
+        <p:spPr>
+          <a:xfrm>
+            <a:off x="4719574" y="2809188"/>
+            <a:ext cx="638354" cy="621102"/>
+          </a:xfrm>
+          <a:prstGeom prst="ellipse">
+            <a:avLst/>
+          </a:prstGeom>
+        </p:spPr>
+        <p:style>
+          <a:lnRef idx="2">
+            <a:schemeClr val="accent1">
+              <a:shade val="50000"/>
+            </a:schemeClr>
+          </a:lnRef>
+          <a:fillRef idx="1">
+            <a:schemeClr val="accent1"/>
+          </a:fillRef>
+          <a:effectRef idx="0">
+            <a:schemeClr val="accent1"/>
+          </a:effectRef>
+          <a:fontRef idx="minor">
+            <a:schemeClr val="lt1"/>
+          </a:fontRef>
+        </p:style>
+        <p:txBody>
+          <a:bodyPr rtlCol="0" anchor="ctr"/>
+          <a:lstStyle/>
+          <a:p>
+            <a:pPr algn="ctr"/>
+            <a:r>
+              <a:rPr lang="en-US" dirty="0"/>
+              <a:t>4</a:t>
+            </a:r>
+            <a:endParaRPr lang="en-IL" dirty="0"/>
+          </a:p>
+        </p:txBody>
+      </p:sp>
+      <p:sp>
+        <p:nvSpPr>
+          <p:cNvPr id="19" name="Oval 18">
+            <a:extLst>
+              <a:ext uri="{FF2B5EF4-FFF2-40B4-BE49-F238E27FC236}">
+                <a16:creationId xmlns:a16="http://schemas.microsoft.com/office/drawing/2014/main" id="{FE4FEC56-5B09-4E45-9DA7-A8690C7A00DD}"/>
+              </a:ext>
+            </a:extLst>
+          </p:cNvPr>
+          <p:cNvSpPr/>
+          <p:nvPr/>
+        </p:nvSpPr>
+        <p:spPr>
+          <a:xfrm>
+            <a:off x="792661" y="638235"/>
+            <a:ext cx="638354" cy="621102"/>
+          </a:xfrm>
+          <a:prstGeom prst="ellipse">
+            <a:avLst/>
+          </a:prstGeom>
+        </p:spPr>
+        <p:style>
+          <a:lnRef idx="2">
+            <a:schemeClr val="accent1">
+              <a:shade val="50000"/>
+            </a:schemeClr>
+          </a:lnRef>
+          <a:fillRef idx="1">
+            <a:schemeClr val="accent1"/>
+          </a:fillRef>
+          <a:effectRef idx="0">
+            <a:schemeClr val="accent1"/>
+          </a:effectRef>
+          <a:fontRef idx="minor">
+            <a:schemeClr val="lt1"/>
+          </a:fontRef>
+        </p:style>
+        <p:txBody>
+          <a:bodyPr rtlCol="0" anchor="ctr"/>
+          <a:lstStyle/>
+          <a:p>
+            <a:pPr algn="ctr"/>
+            <a:r>
+              <a:rPr lang="en-US" dirty="0"/>
+              <a:t>2</a:t>
+            </a:r>
+            <a:endParaRPr lang="en-IL" dirty="0"/>
+          </a:p>
+        </p:txBody>
+      </p:sp>
+      <p:sp>
+        <p:nvSpPr>
+          <p:cNvPr id="20" name="Oval 19">
+            <a:extLst>
+              <a:ext uri="{FF2B5EF4-FFF2-40B4-BE49-F238E27FC236}">
+                <a16:creationId xmlns:a16="http://schemas.microsoft.com/office/drawing/2014/main" id="{4F98DFBD-26E1-4F1F-95E3-5AE5AD67AB25}"/>
+              </a:ext>
+            </a:extLst>
+          </p:cNvPr>
+          <p:cNvSpPr/>
+          <p:nvPr/>
+        </p:nvSpPr>
+        <p:spPr>
+          <a:xfrm>
+            <a:off x="5325509" y="1062524"/>
+            <a:ext cx="638354" cy="621102"/>
+          </a:xfrm>
+          <a:prstGeom prst="ellipse">
+            <a:avLst/>
+          </a:prstGeom>
+        </p:spPr>
+        <p:style>
+          <a:lnRef idx="2">
+            <a:schemeClr val="accent1">
+              <a:shade val="50000"/>
+            </a:schemeClr>
+          </a:lnRef>
+          <a:fillRef idx="1">
+            <a:schemeClr val="accent1"/>
+          </a:fillRef>
+          <a:effectRef idx="0">
+            <a:schemeClr val="accent1"/>
+          </a:effectRef>
+          <a:fontRef idx="minor">
+            <a:schemeClr val="lt1"/>
+          </a:fontRef>
+        </p:style>
+        <p:txBody>
+          <a:bodyPr rtlCol="0" anchor="ctr"/>
+          <a:lstStyle/>
+          <a:p>
+            <a:pPr algn="ctr"/>
+            <a:r>
+              <a:rPr lang="en-US" dirty="0"/>
+              <a:t>6</a:t>
+            </a:r>
+            <a:endParaRPr lang="en-IL" dirty="0"/>
+          </a:p>
+        </p:txBody>
+      </p:sp>
+      <p:sp>
+        <p:nvSpPr>
+          <p:cNvPr id="21" name="Oval 20">
+            <a:extLst>
+              <a:ext uri="{FF2B5EF4-FFF2-40B4-BE49-F238E27FC236}">
+                <a16:creationId xmlns:a16="http://schemas.microsoft.com/office/drawing/2014/main" id="{FBDF7B98-9123-42C0-A8BD-5EDBD21EC8A8}"/>
+              </a:ext>
+            </a:extLst>
+          </p:cNvPr>
+          <p:cNvSpPr/>
+          <p:nvPr/>
+        </p:nvSpPr>
+        <p:spPr>
+          <a:xfrm>
+            <a:off x="6802280" y="1729829"/>
+            <a:ext cx="638354" cy="621102"/>
+          </a:xfrm>
+          <a:prstGeom prst="ellipse">
+            <a:avLst/>
+          </a:prstGeom>
+        </p:spPr>
+        <p:style>
+          <a:lnRef idx="2">
+            <a:schemeClr val="accent1">
+              <a:shade val="50000"/>
+            </a:schemeClr>
+          </a:lnRef>
+          <a:fillRef idx="1">
+            <a:schemeClr val="accent1"/>
+          </a:fillRef>
+          <a:effectRef idx="0">
+            <a:schemeClr val="accent1"/>
+          </a:effectRef>
+          <a:fontRef idx="minor">
+            <a:schemeClr val="lt1"/>
+          </a:fontRef>
+        </p:style>
+        <p:txBody>
+          <a:bodyPr rtlCol="0" anchor="ctr"/>
+          <a:lstStyle/>
+          <a:p>
+            <a:pPr algn="ctr"/>
+            <a:r>
+              <a:rPr lang="en-US" dirty="0"/>
+              <a:t>10</a:t>
+            </a:r>
+            <a:endParaRPr lang="en-IL" dirty="0"/>
+          </a:p>
+        </p:txBody>
+      </p:sp>
+      <p:sp>
+        <p:nvSpPr>
+          <p:cNvPr id="22" name="Oval 21">
+            <a:extLst>
+              <a:ext uri="{FF2B5EF4-FFF2-40B4-BE49-F238E27FC236}">
+                <a16:creationId xmlns:a16="http://schemas.microsoft.com/office/drawing/2014/main" id="{A63DD798-5A78-402C-A825-2BA084B830D6}"/>
+              </a:ext>
+            </a:extLst>
+          </p:cNvPr>
+          <p:cNvSpPr/>
+          <p:nvPr/>
+        </p:nvSpPr>
+        <p:spPr>
+          <a:xfrm>
+            <a:off x="5254468" y="3941565"/>
+            <a:ext cx="638354" cy="621102"/>
+          </a:xfrm>
+          <a:prstGeom prst="ellipse">
+            <a:avLst/>
+          </a:prstGeom>
+        </p:spPr>
+        <p:style>
+          <a:lnRef idx="2">
+            <a:schemeClr val="accent1">
+              <a:shade val="50000"/>
+            </a:schemeClr>
+          </a:lnRef>
+          <a:fillRef idx="1">
+            <a:schemeClr val="accent1"/>
+          </a:fillRef>
+          <a:effectRef idx="0">
+            <a:schemeClr val="accent1"/>
+          </a:effectRef>
+          <a:fontRef idx="minor">
+            <a:schemeClr val="lt1"/>
+          </a:fontRef>
+        </p:style>
+        <p:txBody>
+          <a:bodyPr rtlCol="0" anchor="ctr"/>
+          <a:lstStyle/>
+          <a:p>
+            <a:pPr algn="ctr"/>
+            <a:r>
+              <a:rPr lang="en-US" dirty="0"/>
+              <a:t>7</a:t>
+            </a:r>
+            <a:endParaRPr lang="en-IL" dirty="0"/>
+          </a:p>
+        </p:txBody>
+      </p:sp>
+      <p:cxnSp>
+        <p:nvCxnSpPr>
+          <p:cNvPr id="23" name="Straight Connector 22">
+            <a:extLst>
+              <a:ext uri="{FF2B5EF4-FFF2-40B4-BE49-F238E27FC236}">
+                <a16:creationId xmlns:a16="http://schemas.microsoft.com/office/drawing/2014/main" id="{AABDF7F7-5ABE-4509-8F9F-6F5F657F3B7B}"/>
+              </a:ext>
+            </a:extLst>
+          </p:cNvPr>
+          <p:cNvCxnSpPr>
+            <a:cxnSpLocks/>
+          </p:cNvCxnSpPr>
+          <p:nvPr/>
+        </p:nvCxnSpPr>
+        <p:spPr>
+          <a:xfrm>
+            <a:off x="7209565" y="2155971"/>
+            <a:ext cx="603005" cy="800039"/>
+          </a:xfrm>
+          <a:prstGeom prst="line">
+            <a:avLst/>
+          </a:prstGeom>
+        </p:spPr>
+        <p:style>
+          <a:lnRef idx="1">
+            <a:schemeClr val="accent1"/>
+          </a:lnRef>
+          <a:fillRef idx="0">
+            <a:schemeClr val="accent1"/>
+          </a:fillRef>
+          <a:effectRef idx="0">
+            <a:schemeClr val="accent1"/>
+          </a:effectRef>
+          <a:fontRef idx="minor">
+            <a:schemeClr val="tx1"/>
+          </a:fontRef>
+        </p:style>
+      </p:cxnSp>
+      <p:cxnSp>
+        <p:nvCxnSpPr>
+          <p:cNvPr id="24" name="Straight Connector 23">
+            <a:extLst>
+              <a:ext uri="{FF2B5EF4-FFF2-40B4-BE49-F238E27FC236}">
+                <a16:creationId xmlns:a16="http://schemas.microsoft.com/office/drawing/2014/main" id="{5732D7C7-CBFD-4297-9DB5-16921A97F10C}"/>
+              </a:ext>
+            </a:extLst>
+          </p:cNvPr>
+          <p:cNvCxnSpPr>
+            <a:cxnSpLocks/>
+          </p:cNvCxnSpPr>
+          <p:nvPr/>
+        </p:nvCxnSpPr>
+        <p:spPr>
+          <a:xfrm>
+            <a:off x="4419436" y="2155970"/>
+            <a:ext cx="603005" cy="800039"/>
+          </a:xfrm>
+          <a:prstGeom prst="line">
+            <a:avLst/>
+          </a:prstGeom>
+        </p:spPr>
+        <p:style>
+          <a:lnRef idx="1">
+            <a:schemeClr val="accent1"/>
+          </a:lnRef>
+          <a:fillRef idx="0">
+            <a:schemeClr val="accent1"/>
+          </a:fillRef>
+          <a:effectRef idx="0">
+            <a:schemeClr val="accent1"/>
+          </a:effectRef>
+          <a:fontRef idx="minor">
+            <a:schemeClr val="tx1"/>
+          </a:fontRef>
+        </p:style>
+      </p:cxnSp>
+      <p:cxnSp>
+        <p:nvCxnSpPr>
+          <p:cNvPr id="25" name="Straight Connector 24">
+            <a:extLst>
+              <a:ext uri="{FF2B5EF4-FFF2-40B4-BE49-F238E27FC236}">
+                <a16:creationId xmlns:a16="http://schemas.microsoft.com/office/drawing/2014/main" id="{F546B667-7CDE-446A-A315-9AD440C01C8E}"/>
+              </a:ext>
+            </a:extLst>
+          </p:cNvPr>
+          <p:cNvCxnSpPr>
+            <a:cxnSpLocks/>
+          </p:cNvCxnSpPr>
+          <p:nvPr/>
+        </p:nvCxnSpPr>
+        <p:spPr>
+          <a:xfrm>
+            <a:off x="6155945" y="3237562"/>
+            <a:ext cx="376059" cy="853333"/>
+          </a:xfrm>
+          <a:prstGeom prst="line">
+            <a:avLst/>
+          </a:prstGeom>
+        </p:spPr>
+        <p:style>
+          <a:lnRef idx="1">
+            <a:schemeClr val="accent1"/>
+          </a:lnRef>
+          <a:fillRef idx="0">
+            <a:schemeClr val="accent1"/>
+          </a:fillRef>
+          <a:effectRef idx="0">
+            <a:schemeClr val="accent1"/>
+          </a:effectRef>
+          <a:fontRef idx="minor">
+            <a:schemeClr val="tx1"/>
+          </a:fontRef>
+        </p:style>
+      </p:cxnSp>
+      <p:cxnSp>
+        <p:nvCxnSpPr>
+          <p:cNvPr id="26" name="Straight Connector 25">
+            <a:extLst>
+              <a:ext uri="{FF2B5EF4-FFF2-40B4-BE49-F238E27FC236}">
+                <a16:creationId xmlns:a16="http://schemas.microsoft.com/office/drawing/2014/main" id="{4DD651FE-9308-45BF-B4CC-9E48C51ED44A}"/>
+              </a:ext>
+            </a:extLst>
+          </p:cNvPr>
+          <p:cNvCxnSpPr>
+            <a:cxnSpLocks/>
+          </p:cNvCxnSpPr>
+          <p:nvPr/>
+        </p:nvCxnSpPr>
+        <p:spPr>
+          <a:xfrm flipH="1">
+            <a:off x="6155945" y="2088228"/>
+            <a:ext cx="877404" cy="925316"/>
+          </a:xfrm>
+          <a:prstGeom prst="line">
+            <a:avLst/>
+          </a:prstGeom>
+        </p:spPr>
+        <p:style>
+          <a:lnRef idx="1">
+            <a:schemeClr val="accent1"/>
+          </a:lnRef>
+          <a:fillRef idx="0">
+            <a:schemeClr val="accent1"/>
+          </a:fillRef>
+          <a:effectRef idx="0">
+            <a:schemeClr val="accent1"/>
+          </a:effectRef>
+          <a:fontRef idx="minor">
+            <a:schemeClr val="tx1"/>
+          </a:fontRef>
+        </p:style>
+      </p:cxnSp>
+      <p:cxnSp>
+        <p:nvCxnSpPr>
+          <p:cNvPr id="27" name="Straight Connector 26">
+            <a:extLst>
+              <a:ext uri="{FF2B5EF4-FFF2-40B4-BE49-F238E27FC236}">
+                <a16:creationId xmlns:a16="http://schemas.microsoft.com/office/drawing/2014/main" id="{AF407116-B8D4-4644-BDD5-35B655466811}"/>
+              </a:ext>
+            </a:extLst>
+          </p:cNvPr>
+          <p:cNvCxnSpPr>
+            <a:cxnSpLocks/>
+          </p:cNvCxnSpPr>
+          <p:nvPr/>
+        </p:nvCxnSpPr>
+        <p:spPr>
+          <a:xfrm flipH="1">
+            <a:off x="3351956" y="2030693"/>
+            <a:ext cx="877404" cy="925316"/>
+          </a:xfrm>
+          <a:prstGeom prst="line">
+            <a:avLst/>
+          </a:prstGeom>
+        </p:spPr>
+        <p:style>
+          <a:lnRef idx="1">
+            <a:schemeClr val="accent1"/>
+          </a:lnRef>
+          <a:fillRef idx="0">
+            <a:schemeClr val="accent1"/>
+          </a:fillRef>
+          <a:effectRef idx="0">
+            <a:schemeClr val="accent1"/>
+          </a:effectRef>
+          <a:fontRef idx="minor">
+            <a:schemeClr val="tx1"/>
+          </a:fontRef>
+        </p:style>
+      </p:cxnSp>
+      <p:cxnSp>
+        <p:nvCxnSpPr>
+          <p:cNvPr id="28" name="Straight Connector 27">
+            <a:extLst>
+              <a:ext uri="{FF2B5EF4-FFF2-40B4-BE49-F238E27FC236}">
+                <a16:creationId xmlns:a16="http://schemas.microsoft.com/office/drawing/2014/main" id="{E7958AB4-7DF7-4893-9CC6-60998E0ED82C}"/>
+              </a:ext>
+            </a:extLst>
+          </p:cNvPr>
+          <p:cNvCxnSpPr>
+            <a:cxnSpLocks/>
+          </p:cNvCxnSpPr>
+          <p:nvPr/>
+        </p:nvCxnSpPr>
+        <p:spPr>
+          <a:xfrm flipH="1">
+            <a:off x="7405251" y="3051706"/>
+            <a:ext cx="501345" cy="958189"/>
+          </a:xfrm>
+          <a:prstGeom prst="line">
+            <a:avLst/>
+          </a:prstGeom>
+        </p:spPr>
+        <p:style>
+          <a:lnRef idx="1">
+            <a:schemeClr val="accent1"/>
+          </a:lnRef>
+          <a:fillRef idx="0">
+            <a:schemeClr val="accent1"/>
+          </a:fillRef>
+          <a:effectRef idx="0">
+            <a:schemeClr val="accent1"/>
+          </a:effectRef>
+          <a:fontRef idx="minor">
+            <a:schemeClr val="tx1"/>
+          </a:fontRef>
+        </p:style>
+      </p:cxnSp>
+      <p:sp>
+        <p:nvSpPr>
+          <p:cNvPr id="29" name="Oval 28">
+            <a:extLst>
+              <a:ext uri="{FF2B5EF4-FFF2-40B4-BE49-F238E27FC236}">
+                <a16:creationId xmlns:a16="http://schemas.microsoft.com/office/drawing/2014/main" id="{17288FA5-44A5-4152-8802-D02555DE7635}"/>
+              </a:ext>
+            </a:extLst>
+          </p:cNvPr>
+          <p:cNvSpPr/>
+          <p:nvPr/>
+        </p:nvSpPr>
+        <p:spPr>
+          <a:xfrm>
+            <a:off x="6244927" y="4004362"/>
+            <a:ext cx="638354" cy="621102"/>
+          </a:xfrm>
+          <a:prstGeom prst="ellipse">
+            <a:avLst/>
+          </a:prstGeom>
+        </p:spPr>
+        <p:style>
+          <a:lnRef idx="2">
+            <a:schemeClr val="accent1">
+              <a:shade val="50000"/>
+            </a:schemeClr>
+          </a:lnRef>
+          <a:fillRef idx="1">
+            <a:schemeClr val="accent1"/>
+          </a:fillRef>
+          <a:effectRef idx="0">
+            <a:schemeClr val="accent1"/>
+          </a:effectRef>
+          <a:fontRef idx="minor">
+            <a:schemeClr val="lt1"/>
+          </a:fontRef>
+        </p:style>
+        <p:txBody>
+          <a:bodyPr rtlCol="0" anchor="ctr"/>
+          <a:lstStyle/>
+          <a:p>
+            <a:pPr algn="ctr"/>
+            <a:r>
+              <a:rPr lang="en-US" dirty="0"/>
+              <a:t>9</a:t>
+            </a:r>
+            <a:endParaRPr lang="en-IL" dirty="0"/>
+          </a:p>
+        </p:txBody>
+      </p:sp>
+      <p:sp>
+        <p:nvSpPr>
+          <p:cNvPr id="30" name="Oval 29">
+            <a:extLst>
+              <a:ext uri="{FF2B5EF4-FFF2-40B4-BE49-F238E27FC236}">
+                <a16:creationId xmlns:a16="http://schemas.microsoft.com/office/drawing/2014/main" id="{9B03D380-F05B-4432-BF98-6DEB0D3761FB}"/>
+              </a:ext>
+            </a:extLst>
+          </p:cNvPr>
+          <p:cNvSpPr/>
+          <p:nvPr/>
+        </p:nvSpPr>
+        <p:spPr>
+          <a:xfrm>
+            <a:off x="7576526" y="2810664"/>
+            <a:ext cx="638354" cy="621102"/>
+          </a:xfrm>
+          <a:prstGeom prst="ellipse">
+            <a:avLst/>
+          </a:prstGeom>
+        </p:spPr>
+        <p:style>
+          <a:lnRef idx="2">
+            <a:schemeClr val="accent1">
+              <a:shade val="50000"/>
+            </a:schemeClr>
+          </a:lnRef>
+          <a:fillRef idx="1">
+            <a:schemeClr val="accent1"/>
+          </a:fillRef>
+          <a:effectRef idx="0">
+            <a:schemeClr val="accent1"/>
+          </a:effectRef>
+          <a:fontRef idx="minor">
+            <a:schemeClr val="lt1"/>
+          </a:fontRef>
+        </p:style>
+        <p:txBody>
+          <a:bodyPr rtlCol="0" anchor="ctr"/>
+          <a:lstStyle/>
+          <a:p>
+            <a:pPr algn="ctr"/>
+            <a:r>
+              <a:rPr lang="en-US" dirty="0"/>
+              <a:t>12</a:t>
+            </a:r>
+            <a:endParaRPr lang="en-IL" dirty="0"/>
+          </a:p>
+        </p:txBody>
+      </p:sp>
+      <p:sp>
+        <p:nvSpPr>
+          <p:cNvPr id="31" name="Oval 30">
+            <a:extLst>
+              <a:ext uri="{FF2B5EF4-FFF2-40B4-BE49-F238E27FC236}">
+                <a16:creationId xmlns:a16="http://schemas.microsoft.com/office/drawing/2014/main" id="{9B424BD8-15A8-48D2-B631-E5091686311B}"/>
+              </a:ext>
+            </a:extLst>
+          </p:cNvPr>
+          <p:cNvSpPr/>
+          <p:nvPr/>
+        </p:nvSpPr>
+        <p:spPr>
+          <a:xfrm>
+            <a:off x="7086074" y="3885968"/>
+            <a:ext cx="638354" cy="621102"/>
+          </a:xfrm>
+          <a:prstGeom prst="ellipse">
+            <a:avLst/>
+          </a:prstGeom>
+        </p:spPr>
+        <p:style>
+          <a:lnRef idx="2">
+            <a:schemeClr val="accent1">
+              <a:shade val="50000"/>
+            </a:schemeClr>
+          </a:lnRef>
+          <a:fillRef idx="1">
+            <a:schemeClr val="accent1"/>
+          </a:fillRef>
+          <a:effectRef idx="0">
+            <a:schemeClr val="accent1"/>
+          </a:effectRef>
+          <a:fontRef idx="minor">
+            <a:schemeClr val="lt1"/>
+          </a:fontRef>
+        </p:style>
+        <p:txBody>
+          <a:bodyPr rtlCol="0" anchor="ctr"/>
+          <a:lstStyle/>
+          <a:p>
+            <a:pPr algn="ctr"/>
+            <a:r>
+              <a:rPr lang="en-US" dirty="0"/>
+              <a:t>11</a:t>
+            </a:r>
+            <a:endParaRPr lang="en-IL" dirty="0"/>
+          </a:p>
+        </p:txBody>
+      </p:sp>
+      <p:cxnSp>
+        <p:nvCxnSpPr>
+          <p:cNvPr id="32" name="Straight Connector 31">
+            <a:extLst>
+              <a:ext uri="{FF2B5EF4-FFF2-40B4-BE49-F238E27FC236}">
+                <a16:creationId xmlns:a16="http://schemas.microsoft.com/office/drawing/2014/main" id="{3075A00D-F515-4AE6-8CAF-5367DA7ABC6B}"/>
+              </a:ext>
+            </a:extLst>
+          </p:cNvPr>
+          <p:cNvCxnSpPr>
+            <a:cxnSpLocks/>
+          </p:cNvCxnSpPr>
+          <p:nvPr/>
+        </p:nvCxnSpPr>
+        <p:spPr>
+          <a:xfrm flipH="1">
+            <a:off x="4069658" y="3229524"/>
+            <a:ext cx="877404" cy="925316"/>
+          </a:xfrm>
+          <a:prstGeom prst="line">
+            <a:avLst/>
+          </a:prstGeom>
+        </p:spPr>
+        <p:style>
+          <a:lnRef idx="1">
+            <a:schemeClr val="accent1"/>
+          </a:lnRef>
+          <a:fillRef idx="0">
+            <a:schemeClr val="accent1"/>
+          </a:fillRef>
+          <a:effectRef idx="0">
+            <a:schemeClr val="accent1"/>
+          </a:effectRef>
+          <a:fontRef idx="minor">
+            <a:schemeClr val="tx1"/>
+          </a:fontRef>
+        </p:style>
+      </p:cxnSp>
+      <p:sp>
+        <p:nvSpPr>
+          <p:cNvPr id="33" name="Oval 32">
+            <a:extLst>
+              <a:ext uri="{FF2B5EF4-FFF2-40B4-BE49-F238E27FC236}">
+                <a16:creationId xmlns:a16="http://schemas.microsoft.com/office/drawing/2014/main" id="{206EAB10-4BE6-4322-A2EA-AC78B7E1FC94}"/>
+              </a:ext>
+            </a:extLst>
+          </p:cNvPr>
+          <p:cNvSpPr/>
+          <p:nvPr/>
+        </p:nvSpPr>
+        <p:spPr>
+          <a:xfrm>
+            <a:off x="3021432" y="2702958"/>
+            <a:ext cx="638354" cy="621102"/>
+          </a:xfrm>
+          <a:prstGeom prst="ellipse">
+            <a:avLst/>
+          </a:prstGeom>
+        </p:spPr>
+        <p:style>
+          <a:lnRef idx="2">
+            <a:schemeClr val="accent1">
+              <a:shade val="50000"/>
+            </a:schemeClr>
+          </a:lnRef>
+          <a:fillRef idx="1">
+            <a:schemeClr val="accent1"/>
+          </a:fillRef>
+          <a:effectRef idx="0">
+            <a:schemeClr val="accent1"/>
+          </a:effectRef>
+          <a:fontRef idx="minor">
+            <a:schemeClr val="lt1"/>
+          </a:fontRef>
+        </p:style>
+        <p:txBody>
+          <a:bodyPr rtlCol="0" anchor="ctr"/>
+          <a:lstStyle/>
+          <a:p>
+            <a:pPr algn="ctr"/>
+            <a:r>
+              <a:rPr lang="en-US" dirty="0"/>
+              <a:t>1</a:t>
+            </a:r>
+            <a:endParaRPr lang="en-IL" dirty="0"/>
+          </a:p>
+        </p:txBody>
+      </p:sp>
+      <p:cxnSp>
+        <p:nvCxnSpPr>
+          <p:cNvPr id="34" name="Straight Connector 33">
+            <a:extLst>
+              <a:ext uri="{FF2B5EF4-FFF2-40B4-BE49-F238E27FC236}">
+                <a16:creationId xmlns:a16="http://schemas.microsoft.com/office/drawing/2014/main" id="{2DA961C6-B5CF-44F7-8D38-B06163509FC1}"/>
+              </a:ext>
+            </a:extLst>
+          </p:cNvPr>
+          <p:cNvCxnSpPr>
+            <a:cxnSpLocks/>
+          </p:cNvCxnSpPr>
+          <p:nvPr/>
+        </p:nvCxnSpPr>
+        <p:spPr>
+          <a:xfrm>
+            <a:off x="7956082" y="3229524"/>
+            <a:ext cx="376059" cy="853333"/>
+          </a:xfrm>
+          <a:prstGeom prst="line">
+            <a:avLst/>
+          </a:prstGeom>
+        </p:spPr>
+        <p:style>
+          <a:lnRef idx="1">
+            <a:schemeClr val="accent1"/>
+          </a:lnRef>
+          <a:fillRef idx="0">
+            <a:schemeClr val="accent1"/>
+          </a:fillRef>
+          <a:effectRef idx="0">
+            <a:schemeClr val="accent1"/>
+          </a:effectRef>
+          <a:fontRef idx="minor">
+            <a:schemeClr val="tx1"/>
+          </a:fontRef>
+        </p:style>
+      </p:cxnSp>
+      <p:cxnSp>
+        <p:nvCxnSpPr>
+          <p:cNvPr id="35" name="Straight Connector 34">
+            <a:extLst>
+              <a:ext uri="{FF2B5EF4-FFF2-40B4-BE49-F238E27FC236}">
+                <a16:creationId xmlns:a16="http://schemas.microsoft.com/office/drawing/2014/main" id="{ABFCA162-8CEE-43B3-A3AC-2068BC2AC731}"/>
+              </a:ext>
+            </a:extLst>
+          </p:cNvPr>
+          <p:cNvCxnSpPr>
+            <a:cxnSpLocks/>
+          </p:cNvCxnSpPr>
+          <p:nvPr/>
+        </p:nvCxnSpPr>
+        <p:spPr>
+          <a:xfrm flipH="1">
+            <a:off x="7880835" y="4340305"/>
+            <a:ext cx="501345" cy="958189"/>
+          </a:xfrm>
+          <a:prstGeom prst="line">
+            <a:avLst/>
+          </a:prstGeom>
+        </p:spPr>
+        <p:style>
+          <a:lnRef idx="1">
+            <a:schemeClr val="accent1"/>
+          </a:lnRef>
+          <a:fillRef idx="0">
+            <a:schemeClr val="accent1"/>
+          </a:fillRef>
+          <a:effectRef idx="0">
+            <a:schemeClr val="accent1"/>
+          </a:effectRef>
+          <a:fontRef idx="minor">
+            <a:schemeClr val="tx1"/>
+          </a:fontRef>
+        </p:style>
+      </p:cxnSp>
+    </p:spTree>
+    <p:extLst>
+      <p:ext uri="{BB962C8B-B14F-4D97-AF65-F5344CB8AC3E}">
+        <p14:creationId xmlns:p14="http://schemas.microsoft.com/office/powerpoint/2010/main" val="2733641138"/>
+      </p:ext>
+    </p:extLst>
+  </p:cSld>
+  <p:clrMapOvr>
+    <a:masterClrMapping/>
+  </p:clrMapOvr>
+</p:sld>
+</file>
+
 <file path=ppt/theme/theme1.xml><?xml version="1.0" encoding="utf-8"?>
 <a:theme xmlns:a="http://schemas.openxmlformats.org/drawingml/2006/main" name="Office Theme">
   <a:themeElements>

</xml_diff>

<commit_message>
finished AVL testing. created BST method to find elements in range. started working on company.
</commit_message>
<xml_diff>
--- a/ex1/tests/sketch_tree.pptx
+++ b/ex1/tests/sketch_tree.pptx
@@ -8,6 +8,7 @@
     <p:sldId id="256" r:id="rId2"/>
     <p:sldId id="257" r:id="rId3"/>
     <p:sldId id="258" r:id="rId4"/>
+    <p:sldId id="259" r:id="rId5"/>
   </p:sldIdLst>
   <p:sldSz cx="12192000" cy="6858000"/>
   <p:notesSz cx="6858000" cy="9144000"/>
@@ -263,7 +264,7 @@
           <a:p>
             <a:fld id="{A8E905E9-DFD8-4C69-8908-AF1D10759DCE}" type="datetimeFigureOut">
               <a:rPr lang="en-IL" smtClean="0"/>
-              <a:t>18/04/2022</a:t>
+              <a:t>19/04/2022</a:t>
             </a:fld>
             <a:endParaRPr lang="en-IL"/>
           </a:p>
@@ -463,7 +464,7 @@
           <a:p>
             <a:fld id="{A8E905E9-DFD8-4C69-8908-AF1D10759DCE}" type="datetimeFigureOut">
               <a:rPr lang="en-IL" smtClean="0"/>
-              <a:t>18/04/2022</a:t>
+              <a:t>19/04/2022</a:t>
             </a:fld>
             <a:endParaRPr lang="en-IL"/>
           </a:p>
@@ -673,7 +674,7 @@
           <a:p>
             <a:fld id="{A8E905E9-DFD8-4C69-8908-AF1D10759DCE}" type="datetimeFigureOut">
               <a:rPr lang="en-IL" smtClean="0"/>
-              <a:t>18/04/2022</a:t>
+              <a:t>19/04/2022</a:t>
             </a:fld>
             <a:endParaRPr lang="en-IL"/>
           </a:p>
@@ -873,7 +874,7 @@
           <a:p>
             <a:fld id="{A8E905E9-DFD8-4C69-8908-AF1D10759DCE}" type="datetimeFigureOut">
               <a:rPr lang="en-IL" smtClean="0"/>
-              <a:t>18/04/2022</a:t>
+              <a:t>19/04/2022</a:t>
             </a:fld>
             <a:endParaRPr lang="en-IL"/>
           </a:p>
@@ -1149,7 +1150,7 @@
           <a:p>
             <a:fld id="{A8E905E9-DFD8-4C69-8908-AF1D10759DCE}" type="datetimeFigureOut">
               <a:rPr lang="en-IL" smtClean="0"/>
-              <a:t>18/04/2022</a:t>
+              <a:t>19/04/2022</a:t>
             </a:fld>
             <a:endParaRPr lang="en-IL"/>
           </a:p>
@@ -1417,7 +1418,7 @@
           <a:p>
             <a:fld id="{A8E905E9-DFD8-4C69-8908-AF1D10759DCE}" type="datetimeFigureOut">
               <a:rPr lang="en-IL" smtClean="0"/>
-              <a:t>18/04/2022</a:t>
+              <a:t>19/04/2022</a:t>
             </a:fld>
             <a:endParaRPr lang="en-IL"/>
           </a:p>
@@ -1832,7 +1833,7 @@
           <a:p>
             <a:fld id="{A8E905E9-DFD8-4C69-8908-AF1D10759DCE}" type="datetimeFigureOut">
               <a:rPr lang="en-IL" smtClean="0"/>
-              <a:t>18/04/2022</a:t>
+              <a:t>19/04/2022</a:t>
             </a:fld>
             <a:endParaRPr lang="en-IL"/>
           </a:p>
@@ -1974,7 +1975,7 @@
           <a:p>
             <a:fld id="{A8E905E9-DFD8-4C69-8908-AF1D10759DCE}" type="datetimeFigureOut">
               <a:rPr lang="en-IL" smtClean="0"/>
-              <a:t>18/04/2022</a:t>
+              <a:t>19/04/2022</a:t>
             </a:fld>
             <a:endParaRPr lang="en-IL"/>
           </a:p>
@@ -2087,7 +2088,7 @@
           <a:p>
             <a:fld id="{A8E905E9-DFD8-4C69-8908-AF1D10759DCE}" type="datetimeFigureOut">
               <a:rPr lang="en-IL" smtClean="0"/>
-              <a:t>18/04/2022</a:t>
+              <a:t>19/04/2022</a:t>
             </a:fld>
             <a:endParaRPr lang="en-IL"/>
           </a:p>
@@ -2400,7 +2401,7 @@
           <a:p>
             <a:fld id="{A8E905E9-DFD8-4C69-8908-AF1D10759DCE}" type="datetimeFigureOut">
               <a:rPr lang="en-IL" smtClean="0"/>
-              <a:t>18/04/2022</a:t>
+              <a:t>19/04/2022</a:t>
             </a:fld>
             <a:endParaRPr lang="en-IL"/>
           </a:p>
@@ -2689,7 +2690,7 @@
           <a:p>
             <a:fld id="{A8E905E9-DFD8-4C69-8908-AF1D10759DCE}" type="datetimeFigureOut">
               <a:rPr lang="en-IL" smtClean="0"/>
-              <a:t>18/04/2022</a:t>
+              <a:t>19/04/2022</a:t>
             </a:fld>
             <a:endParaRPr lang="en-IL"/>
           </a:p>
@@ -2932,7 +2933,7 @@
           <a:p>
             <a:fld id="{A8E905E9-DFD8-4C69-8908-AF1D10759DCE}" type="datetimeFigureOut">
               <a:rPr lang="en-IL" smtClean="0"/>
-              <a:t>18/04/2022</a:t>
+              <a:t>19/04/2022</a:t>
             </a:fld>
             <a:endParaRPr lang="en-IL"/>
           </a:p>
@@ -7620,6 +7621,878 @@
 </p:sld>
 </file>
 
+<file path=ppt/slides/slide4.xml><?xml version="1.0" encoding="utf-8"?>
+<p:sld xmlns:a="http://schemas.openxmlformats.org/drawingml/2006/main" xmlns:r="http://schemas.openxmlformats.org/officeDocument/2006/relationships" xmlns:p="http://schemas.openxmlformats.org/presentationml/2006/main">
+  <p:cSld>
+    <p:spTree>
+      <p:nvGrpSpPr>
+        <p:cNvPr id="1" name=""/>
+        <p:cNvGrpSpPr/>
+        <p:nvPr/>
+      </p:nvGrpSpPr>
+      <p:grpSpPr>
+        <a:xfrm>
+          <a:off x="0" y="0"/>
+          <a:ext cx="0" cy="0"/>
+          <a:chOff x="0" y="0"/>
+          <a:chExt cx="0" cy="0"/>
+        </a:xfrm>
+      </p:grpSpPr>
+      <p:sp>
+        <p:nvSpPr>
+          <p:cNvPr id="4" name="Oval 3">
+            <a:extLst>
+              <a:ext uri="{FF2B5EF4-FFF2-40B4-BE49-F238E27FC236}">
+                <a16:creationId xmlns:a16="http://schemas.microsoft.com/office/drawing/2014/main" id="{983BD16E-55E6-40BF-9372-8452C03308CF}"/>
+              </a:ext>
+            </a:extLst>
+          </p:cNvPr>
+          <p:cNvSpPr/>
+          <p:nvPr/>
+        </p:nvSpPr>
+        <p:spPr>
+          <a:xfrm>
+            <a:off x="711938" y="780741"/>
+            <a:ext cx="638354" cy="621102"/>
+          </a:xfrm>
+          <a:prstGeom prst="ellipse">
+            <a:avLst/>
+          </a:prstGeom>
+        </p:spPr>
+        <p:style>
+          <a:lnRef idx="2">
+            <a:schemeClr val="accent1">
+              <a:shade val="50000"/>
+            </a:schemeClr>
+          </a:lnRef>
+          <a:fillRef idx="1">
+            <a:schemeClr val="accent1"/>
+          </a:fillRef>
+          <a:effectRef idx="0">
+            <a:schemeClr val="accent1"/>
+          </a:effectRef>
+          <a:fontRef idx="minor">
+            <a:schemeClr val="lt1"/>
+          </a:fontRef>
+        </p:style>
+        <p:txBody>
+          <a:bodyPr rtlCol="0" anchor="ctr"/>
+          <a:lstStyle/>
+          <a:p>
+            <a:pPr algn="ctr"/>
+            <a:r>
+              <a:rPr lang="en-US" dirty="0"/>
+              <a:t>1</a:t>
+            </a:r>
+            <a:endParaRPr lang="en-IL" dirty="0"/>
+          </a:p>
+        </p:txBody>
+      </p:sp>
+      <p:sp>
+        <p:nvSpPr>
+          <p:cNvPr id="5" name="Oval 4">
+            <a:extLst>
+              <a:ext uri="{FF2B5EF4-FFF2-40B4-BE49-F238E27FC236}">
+                <a16:creationId xmlns:a16="http://schemas.microsoft.com/office/drawing/2014/main" id="{8A329136-C01F-41BC-A906-897A86950788}"/>
+              </a:ext>
+            </a:extLst>
+          </p:cNvPr>
+          <p:cNvSpPr/>
+          <p:nvPr/>
+        </p:nvSpPr>
+        <p:spPr>
+          <a:xfrm>
+            <a:off x="1182817" y="1712394"/>
+            <a:ext cx="638354" cy="621102"/>
+          </a:xfrm>
+          <a:prstGeom prst="ellipse">
+            <a:avLst/>
+          </a:prstGeom>
+        </p:spPr>
+        <p:style>
+          <a:lnRef idx="2">
+            <a:schemeClr val="accent1">
+              <a:shade val="50000"/>
+            </a:schemeClr>
+          </a:lnRef>
+          <a:fillRef idx="1">
+            <a:schemeClr val="accent1"/>
+          </a:fillRef>
+          <a:effectRef idx="0">
+            <a:schemeClr val="accent1"/>
+          </a:effectRef>
+          <a:fontRef idx="minor">
+            <a:schemeClr val="lt1"/>
+          </a:fontRef>
+        </p:style>
+        <p:txBody>
+          <a:bodyPr rtlCol="0" anchor="ctr"/>
+          <a:lstStyle/>
+          <a:p>
+            <a:pPr algn="ctr"/>
+            <a:r>
+              <a:rPr lang="en-US" dirty="0"/>
+              <a:t>2</a:t>
+            </a:r>
+            <a:endParaRPr lang="en-IL" dirty="0"/>
+          </a:p>
+        </p:txBody>
+      </p:sp>
+      <p:sp>
+        <p:nvSpPr>
+          <p:cNvPr id="6" name="Oval 5">
+            <a:extLst>
+              <a:ext uri="{FF2B5EF4-FFF2-40B4-BE49-F238E27FC236}">
+                <a16:creationId xmlns:a16="http://schemas.microsoft.com/office/drawing/2014/main" id="{B5243683-151A-4077-9B0A-B9295C9C2248}"/>
+              </a:ext>
+            </a:extLst>
+          </p:cNvPr>
+          <p:cNvSpPr/>
+          <p:nvPr/>
+        </p:nvSpPr>
+        <p:spPr>
+          <a:xfrm>
+            <a:off x="2856417" y="2702715"/>
+            <a:ext cx="638354" cy="621102"/>
+          </a:xfrm>
+          <a:prstGeom prst="ellipse">
+            <a:avLst/>
+          </a:prstGeom>
+        </p:spPr>
+        <p:style>
+          <a:lnRef idx="2">
+            <a:schemeClr val="accent1">
+              <a:shade val="50000"/>
+            </a:schemeClr>
+          </a:lnRef>
+          <a:fillRef idx="1">
+            <a:schemeClr val="accent1"/>
+          </a:fillRef>
+          <a:effectRef idx="0">
+            <a:schemeClr val="accent1"/>
+          </a:effectRef>
+          <a:fontRef idx="minor">
+            <a:schemeClr val="lt1"/>
+          </a:fontRef>
+        </p:style>
+        <p:txBody>
+          <a:bodyPr rtlCol="0" anchor="ctr"/>
+          <a:lstStyle/>
+          <a:p>
+            <a:pPr algn="ctr"/>
+            <a:r>
+              <a:rPr lang="en-US" dirty="0"/>
+              <a:t>3</a:t>
+            </a:r>
+            <a:endParaRPr lang="en-IL" dirty="0"/>
+          </a:p>
+        </p:txBody>
+      </p:sp>
+      <p:sp>
+        <p:nvSpPr>
+          <p:cNvPr id="7" name="Oval 6">
+            <a:extLst>
+              <a:ext uri="{FF2B5EF4-FFF2-40B4-BE49-F238E27FC236}">
+                <a16:creationId xmlns:a16="http://schemas.microsoft.com/office/drawing/2014/main" id="{B16B17C9-63B9-4A34-8787-B4D3A131089F}"/>
+              </a:ext>
+            </a:extLst>
+          </p:cNvPr>
+          <p:cNvSpPr/>
+          <p:nvPr/>
+        </p:nvSpPr>
+        <p:spPr>
+          <a:xfrm>
+            <a:off x="3776497" y="1738710"/>
+            <a:ext cx="645597" cy="621102"/>
+          </a:xfrm>
+          <a:prstGeom prst="ellipse">
+            <a:avLst/>
+          </a:prstGeom>
+        </p:spPr>
+        <p:style>
+          <a:lnRef idx="2">
+            <a:schemeClr val="accent1">
+              <a:shade val="50000"/>
+            </a:schemeClr>
+          </a:lnRef>
+          <a:fillRef idx="1">
+            <a:schemeClr val="accent1"/>
+          </a:fillRef>
+          <a:effectRef idx="0">
+            <a:schemeClr val="accent1"/>
+          </a:effectRef>
+          <a:fontRef idx="minor">
+            <a:schemeClr val="lt1"/>
+          </a:fontRef>
+        </p:style>
+        <p:txBody>
+          <a:bodyPr rtlCol="0" anchor="ctr"/>
+          <a:lstStyle/>
+          <a:p>
+            <a:pPr algn="ctr"/>
+            <a:r>
+              <a:rPr lang="en-US" dirty="0"/>
+              <a:t>4</a:t>
+            </a:r>
+            <a:endParaRPr lang="en-IL" dirty="0"/>
+          </a:p>
+        </p:txBody>
+      </p:sp>
+      <p:cxnSp>
+        <p:nvCxnSpPr>
+          <p:cNvPr id="10" name="Straight Connector 9">
+            <a:extLst>
+              <a:ext uri="{FF2B5EF4-FFF2-40B4-BE49-F238E27FC236}">
+                <a16:creationId xmlns:a16="http://schemas.microsoft.com/office/drawing/2014/main" id="{59EAAB18-3DB8-48F9-B6E3-A49D55CA2863}"/>
+              </a:ext>
+            </a:extLst>
+          </p:cNvPr>
+          <p:cNvCxnSpPr>
+            <a:cxnSpLocks/>
+          </p:cNvCxnSpPr>
+          <p:nvPr/>
+        </p:nvCxnSpPr>
+        <p:spPr>
+          <a:xfrm>
+            <a:off x="5842384" y="1401843"/>
+            <a:ext cx="644680" cy="858278"/>
+          </a:xfrm>
+          <a:prstGeom prst="line">
+            <a:avLst/>
+          </a:prstGeom>
+        </p:spPr>
+        <p:style>
+          <a:lnRef idx="1">
+            <a:schemeClr val="accent1"/>
+          </a:lnRef>
+          <a:fillRef idx="0">
+            <a:schemeClr val="accent1"/>
+          </a:fillRef>
+          <a:effectRef idx="0">
+            <a:schemeClr val="accent1"/>
+          </a:effectRef>
+          <a:fontRef idx="minor">
+            <a:schemeClr val="tx1"/>
+          </a:fontRef>
+        </p:style>
+      </p:cxnSp>
+      <p:cxnSp>
+        <p:nvCxnSpPr>
+          <p:cNvPr id="12" name="Straight Connector 11">
+            <a:extLst>
+              <a:ext uri="{FF2B5EF4-FFF2-40B4-BE49-F238E27FC236}">
+                <a16:creationId xmlns:a16="http://schemas.microsoft.com/office/drawing/2014/main" id="{ACC76558-C817-40EE-ADD9-2243BC7E2D08}"/>
+              </a:ext>
+            </a:extLst>
+          </p:cNvPr>
+          <p:cNvCxnSpPr>
+            <a:cxnSpLocks/>
+          </p:cNvCxnSpPr>
+          <p:nvPr/>
+        </p:nvCxnSpPr>
+        <p:spPr>
+          <a:xfrm>
+            <a:off x="6522666" y="2461175"/>
+            <a:ext cx="644680" cy="858278"/>
+          </a:xfrm>
+          <a:prstGeom prst="line">
+            <a:avLst/>
+          </a:prstGeom>
+        </p:spPr>
+        <p:style>
+          <a:lnRef idx="1">
+            <a:schemeClr val="accent1"/>
+          </a:lnRef>
+          <a:fillRef idx="0">
+            <a:schemeClr val="accent1"/>
+          </a:fillRef>
+          <a:effectRef idx="0">
+            <a:schemeClr val="accent1"/>
+          </a:effectRef>
+          <a:fontRef idx="minor">
+            <a:schemeClr val="tx1"/>
+          </a:fontRef>
+        </p:style>
+      </p:cxnSp>
+      <p:cxnSp>
+        <p:nvCxnSpPr>
+          <p:cNvPr id="13" name="Straight Connector 12">
+            <a:extLst>
+              <a:ext uri="{FF2B5EF4-FFF2-40B4-BE49-F238E27FC236}">
+                <a16:creationId xmlns:a16="http://schemas.microsoft.com/office/drawing/2014/main" id="{996C8E72-F30F-4EE0-A798-3D56B3EC1FEE}"/>
+              </a:ext>
+            </a:extLst>
+          </p:cNvPr>
+          <p:cNvCxnSpPr>
+            <a:cxnSpLocks/>
+          </p:cNvCxnSpPr>
+          <p:nvPr/>
+        </p:nvCxnSpPr>
+        <p:spPr>
+          <a:xfrm>
+            <a:off x="7300823" y="3349191"/>
+            <a:ext cx="644680" cy="858278"/>
+          </a:xfrm>
+          <a:prstGeom prst="line">
+            <a:avLst/>
+          </a:prstGeom>
+        </p:spPr>
+        <p:style>
+          <a:lnRef idx="1">
+            <a:schemeClr val="accent1"/>
+          </a:lnRef>
+          <a:fillRef idx="0">
+            <a:schemeClr val="accent1"/>
+          </a:fillRef>
+          <a:effectRef idx="0">
+            <a:schemeClr val="accent1"/>
+          </a:effectRef>
+          <a:fontRef idx="minor">
+            <a:schemeClr val="tx1"/>
+          </a:fontRef>
+        </p:style>
+      </p:cxnSp>
+      <p:cxnSp>
+        <p:nvCxnSpPr>
+          <p:cNvPr id="14" name="Straight Connector 13">
+            <a:extLst>
+              <a:ext uri="{FF2B5EF4-FFF2-40B4-BE49-F238E27FC236}">
+                <a16:creationId xmlns:a16="http://schemas.microsoft.com/office/drawing/2014/main" id="{003FDEF6-0CD9-41A2-8549-352B8AA86431}"/>
+              </a:ext>
+            </a:extLst>
+          </p:cNvPr>
+          <p:cNvCxnSpPr>
+            <a:cxnSpLocks/>
+          </p:cNvCxnSpPr>
+          <p:nvPr/>
+        </p:nvCxnSpPr>
+        <p:spPr>
+          <a:xfrm>
+            <a:off x="3987254" y="2395691"/>
+            <a:ext cx="571910" cy="585539"/>
+          </a:xfrm>
+          <a:prstGeom prst="line">
+            <a:avLst/>
+          </a:prstGeom>
+        </p:spPr>
+        <p:style>
+          <a:lnRef idx="1">
+            <a:schemeClr val="accent1"/>
+          </a:lnRef>
+          <a:fillRef idx="0">
+            <a:schemeClr val="accent1"/>
+          </a:fillRef>
+          <a:effectRef idx="0">
+            <a:schemeClr val="accent1"/>
+          </a:effectRef>
+          <a:fontRef idx="minor">
+            <a:schemeClr val="tx1"/>
+          </a:fontRef>
+        </p:style>
+      </p:cxnSp>
+      <p:cxnSp>
+        <p:nvCxnSpPr>
+          <p:cNvPr id="17" name="Straight Connector 16">
+            <a:extLst>
+              <a:ext uri="{FF2B5EF4-FFF2-40B4-BE49-F238E27FC236}">
+                <a16:creationId xmlns:a16="http://schemas.microsoft.com/office/drawing/2014/main" id="{16AD1CE3-4D24-444C-B232-292B8B6568EE}"/>
+              </a:ext>
+            </a:extLst>
+          </p:cNvPr>
+          <p:cNvCxnSpPr>
+            <a:cxnSpLocks/>
+          </p:cNvCxnSpPr>
+          <p:nvPr/>
+        </p:nvCxnSpPr>
+        <p:spPr>
+          <a:xfrm flipH="1">
+            <a:off x="4266452" y="1522482"/>
+            <a:ext cx="1287577" cy="553935"/>
+          </a:xfrm>
+          <a:prstGeom prst="line">
+            <a:avLst/>
+          </a:prstGeom>
+        </p:spPr>
+        <p:style>
+          <a:lnRef idx="1">
+            <a:schemeClr val="accent1"/>
+          </a:lnRef>
+          <a:fillRef idx="0">
+            <a:schemeClr val="accent1"/>
+          </a:fillRef>
+          <a:effectRef idx="0">
+            <a:schemeClr val="accent1"/>
+          </a:effectRef>
+          <a:fontRef idx="minor">
+            <a:schemeClr val="tx1"/>
+          </a:fontRef>
+        </p:style>
+      </p:cxnSp>
+      <p:cxnSp>
+        <p:nvCxnSpPr>
+          <p:cNvPr id="18" name="Straight Connector 17">
+            <a:extLst>
+              <a:ext uri="{FF2B5EF4-FFF2-40B4-BE49-F238E27FC236}">
+                <a16:creationId xmlns:a16="http://schemas.microsoft.com/office/drawing/2014/main" id="{90A948FA-EF27-43CD-9413-D1D060B52F19}"/>
+              </a:ext>
+            </a:extLst>
+          </p:cNvPr>
+          <p:cNvCxnSpPr>
+            <a:cxnSpLocks/>
+          </p:cNvCxnSpPr>
+          <p:nvPr/>
+        </p:nvCxnSpPr>
+        <p:spPr>
+          <a:xfrm flipH="1">
+            <a:off x="3259802" y="2183465"/>
+            <a:ext cx="638355" cy="888521"/>
+          </a:xfrm>
+          <a:prstGeom prst="line">
+            <a:avLst/>
+          </a:prstGeom>
+        </p:spPr>
+        <p:style>
+          <a:lnRef idx="1">
+            <a:schemeClr val="accent1"/>
+          </a:lnRef>
+          <a:fillRef idx="0">
+            <a:schemeClr val="accent1"/>
+          </a:fillRef>
+          <a:effectRef idx="0">
+            <a:schemeClr val="accent1"/>
+          </a:effectRef>
+          <a:fontRef idx="minor">
+            <a:schemeClr val="tx1"/>
+          </a:fontRef>
+        </p:style>
+      </p:cxnSp>
+      <p:cxnSp>
+        <p:nvCxnSpPr>
+          <p:cNvPr id="29" name="Straight Connector 28">
+            <a:extLst>
+              <a:ext uri="{FF2B5EF4-FFF2-40B4-BE49-F238E27FC236}">
+                <a16:creationId xmlns:a16="http://schemas.microsoft.com/office/drawing/2014/main" id="{579CB2B6-4D03-4AC7-BF34-060BC4E366FD}"/>
+              </a:ext>
+            </a:extLst>
+          </p:cNvPr>
+          <p:cNvCxnSpPr>
+            <a:cxnSpLocks/>
+          </p:cNvCxnSpPr>
+          <p:nvPr/>
+        </p:nvCxnSpPr>
+        <p:spPr>
+          <a:xfrm flipH="1">
+            <a:off x="5805577" y="2458528"/>
+            <a:ext cx="405442" cy="664234"/>
+          </a:xfrm>
+          <a:prstGeom prst="line">
+            <a:avLst/>
+          </a:prstGeom>
+        </p:spPr>
+        <p:style>
+          <a:lnRef idx="1">
+            <a:schemeClr val="accent1"/>
+          </a:lnRef>
+          <a:fillRef idx="0">
+            <a:schemeClr val="accent1"/>
+          </a:fillRef>
+          <a:effectRef idx="0">
+            <a:schemeClr val="accent1"/>
+          </a:effectRef>
+          <a:fontRef idx="minor">
+            <a:schemeClr val="tx1"/>
+          </a:fontRef>
+        </p:style>
+      </p:cxnSp>
+      <p:sp>
+        <p:nvSpPr>
+          <p:cNvPr id="32" name="Oval 31">
+            <a:extLst>
+              <a:ext uri="{FF2B5EF4-FFF2-40B4-BE49-F238E27FC236}">
+                <a16:creationId xmlns:a16="http://schemas.microsoft.com/office/drawing/2014/main" id="{530A980A-30D6-4630-860C-482F245A20B5}"/>
+              </a:ext>
+            </a:extLst>
+          </p:cNvPr>
+          <p:cNvSpPr/>
+          <p:nvPr/>
+        </p:nvSpPr>
+        <p:spPr>
+          <a:xfrm>
+            <a:off x="5450288" y="1033039"/>
+            <a:ext cx="638354" cy="621102"/>
+          </a:xfrm>
+          <a:prstGeom prst="ellipse">
+            <a:avLst/>
+          </a:prstGeom>
+        </p:spPr>
+        <p:style>
+          <a:lnRef idx="2">
+            <a:schemeClr val="accent1">
+              <a:shade val="50000"/>
+            </a:schemeClr>
+          </a:lnRef>
+          <a:fillRef idx="1">
+            <a:schemeClr val="accent1"/>
+          </a:fillRef>
+          <a:effectRef idx="0">
+            <a:schemeClr val="accent1"/>
+          </a:effectRef>
+          <a:fontRef idx="minor">
+            <a:schemeClr val="lt1"/>
+          </a:fontRef>
+        </p:style>
+        <p:txBody>
+          <a:bodyPr rtlCol="0" anchor="ctr"/>
+          <a:lstStyle/>
+          <a:p>
+            <a:pPr algn="ctr"/>
+            <a:r>
+              <a:rPr lang="en-US" dirty="0"/>
+              <a:t>8</a:t>
+            </a:r>
+            <a:endParaRPr lang="en-IL" dirty="0"/>
+          </a:p>
+        </p:txBody>
+      </p:sp>
+      <p:sp>
+        <p:nvSpPr>
+          <p:cNvPr id="33" name="Oval 32">
+            <a:extLst>
+              <a:ext uri="{FF2B5EF4-FFF2-40B4-BE49-F238E27FC236}">
+                <a16:creationId xmlns:a16="http://schemas.microsoft.com/office/drawing/2014/main" id="{61A3D50A-F25B-459C-B340-2AE75A28EBDA}"/>
+              </a:ext>
+            </a:extLst>
+          </p:cNvPr>
+          <p:cNvSpPr/>
+          <p:nvPr/>
+        </p:nvSpPr>
+        <p:spPr>
+          <a:xfrm>
+            <a:off x="6211019" y="2081613"/>
+            <a:ext cx="645597" cy="621102"/>
+          </a:xfrm>
+          <a:prstGeom prst="ellipse">
+            <a:avLst/>
+          </a:prstGeom>
+        </p:spPr>
+        <p:style>
+          <a:lnRef idx="2">
+            <a:schemeClr val="accent1">
+              <a:shade val="50000"/>
+            </a:schemeClr>
+          </a:lnRef>
+          <a:fillRef idx="1">
+            <a:schemeClr val="accent1"/>
+          </a:fillRef>
+          <a:effectRef idx="0">
+            <a:schemeClr val="accent1"/>
+          </a:effectRef>
+          <a:fontRef idx="minor">
+            <a:schemeClr val="lt1"/>
+          </a:fontRef>
+        </p:style>
+        <p:txBody>
+          <a:bodyPr rtlCol="0" anchor="ctr"/>
+          <a:lstStyle/>
+          <a:p>
+            <a:pPr algn="ctr"/>
+            <a:r>
+              <a:rPr lang="en-US" dirty="0"/>
+              <a:t>9</a:t>
+            </a:r>
+            <a:endParaRPr lang="en-IL" dirty="0"/>
+          </a:p>
+        </p:txBody>
+      </p:sp>
+      <p:sp>
+        <p:nvSpPr>
+          <p:cNvPr id="37" name="Oval 36">
+            <a:extLst>
+              <a:ext uri="{FF2B5EF4-FFF2-40B4-BE49-F238E27FC236}">
+                <a16:creationId xmlns:a16="http://schemas.microsoft.com/office/drawing/2014/main" id="{A57D17FD-E11C-4F97-833D-2E374CB834DA}"/>
+              </a:ext>
+            </a:extLst>
+          </p:cNvPr>
+          <p:cNvSpPr/>
+          <p:nvPr/>
+        </p:nvSpPr>
+        <p:spPr>
+          <a:xfrm>
+            <a:off x="6983700" y="3013266"/>
+            <a:ext cx="645597" cy="621102"/>
+          </a:xfrm>
+          <a:prstGeom prst="ellipse">
+            <a:avLst/>
+          </a:prstGeom>
+        </p:spPr>
+        <p:style>
+          <a:lnRef idx="2">
+            <a:schemeClr val="accent1">
+              <a:shade val="50000"/>
+            </a:schemeClr>
+          </a:lnRef>
+          <a:fillRef idx="1">
+            <a:schemeClr val="accent1"/>
+          </a:fillRef>
+          <a:effectRef idx="0">
+            <a:schemeClr val="accent1"/>
+          </a:effectRef>
+          <a:fontRef idx="minor">
+            <a:schemeClr val="lt1"/>
+          </a:fontRef>
+        </p:style>
+        <p:txBody>
+          <a:bodyPr rtlCol="0" anchor="ctr"/>
+          <a:lstStyle/>
+          <a:p>
+            <a:pPr algn="ctr"/>
+            <a:r>
+              <a:rPr lang="en-US" dirty="0"/>
+              <a:t>10</a:t>
+            </a:r>
+            <a:endParaRPr lang="en-IL" dirty="0"/>
+          </a:p>
+        </p:txBody>
+      </p:sp>
+      <p:sp>
+        <p:nvSpPr>
+          <p:cNvPr id="51" name="Oval 50">
+            <a:extLst>
+              <a:ext uri="{FF2B5EF4-FFF2-40B4-BE49-F238E27FC236}">
+                <a16:creationId xmlns:a16="http://schemas.microsoft.com/office/drawing/2014/main" id="{126EC3C7-05D9-4F2A-8041-F3228BFFDCDC}"/>
+              </a:ext>
+            </a:extLst>
+          </p:cNvPr>
+          <p:cNvSpPr/>
+          <p:nvPr/>
+        </p:nvSpPr>
+        <p:spPr>
+          <a:xfrm>
+            <a:off x="3787496" y="3771399"/>
+            <a:ext cx="638354" cy="621102"/>
+          </a:xfrm>
+          <a:prstGeom prst="ellipse">
+            <a:avLst/>
+          </a:prstGeom>
+        </p:spPr>
+        <p:style>
+          <a:lnRef idx="2">
+            <a:schemeClr val="accent1">
+              <a:shade val="50000"/>
+            </a:schemeClr>
+          </a:lnRef>
+          <a:fillRef idx="1">
+            <a:schemeClr val="accent1"/>
+          </a:fillRef>
+          <a:effectRef idx="0">
+            <a:schemeClr val="accent1"/>
+          </a:effectRef>
+          <a:fontRef idx="minor">
+            <a:schemeClr val="lt1"/>
+          </a:fontRef>
+        </p:style>
+        <p:txBody>
+          <a:bodyPr rtlCol="0" anchor="ctr"/>
+          <a:lstStyle/>
+          <a:p>
+            <a:pPr algn="ctr"/>
+            <a:r>
+              <a:rPr lang="en-US" dirty="0"/>
+              <a:t>5</a:t>
+            </a:r>
+            <a:endParaRPr lang="en-IL" dirty="0"/>
+          </a:p>
+        </p:txBody>
+      </p:sp>
+      <p:sp>
+        <p:nvSpPr>
+          <p:cNvPr id="52" name="Oval 51">
+            <a:extLst>
+              <a:ext uri="{FF2B5EF4-FFF2-40B4-BE49-F238E27FC236}">
+                <a16:creationId xmlns:a16="http://schemas.microsoft.com/office/drawing/2014/main" id="{9C399C7C-778A-411A-86C7-25535FB4F928}"/>
+              </a:ext>
+            </a:extLst>
+          </p:cNvPr>
+          <p:cNvSpPr/>
+          <p:nvPr/>
+        </p:nvSpPr>
+        <p:spPr>
+          <a:xfrm>
+            <a:off x="4431476" y="2746343"/>
+            <a:ext cx="645597" cy="621102"/>
+          </a:xfrm>
+          <a:prstGeom prst="ellipse">
+            <a:avLst/>
+          </a:prstGeom>
+        </p:spPr>
+        <p:style>
+          <a:lnRef idx="2">
+            <a:schemeClr val="accent1">
+              <a:shade val="50000"/>
+            </a:schemeClr>
+          </a:lnRef>
+          <a:fillRef idx="1">
+            <a:schemeClr val="accent1"/>
+          </a:fillRef>
+          <a:effectRef idx="0">
+            <a:schemeClr val="accent1"/>
+          </a:effectRef>
+          <a:fontRef idx="minor">
+            <a:schemeClr val="lt1"/>
+          </a:fontRef>
+        </p:style>
+        <p:txBody>
+          <a:bodyPr rtlCol="0" anchor="ctr"/>
+          <a:lstStyle/>
+          <a:p>
+            <a:pPr algn="ctr"/>
+            <a:r>
+              <a:rPr lang="en-US" dirty="0"/>
+              <a:t>6</a:t>
+            </a:r>
+            <a:endParaRPr lang="en-IL" dirty="0"/>
+          </a:p>
+        </p:txBody>
+      </p:sp>
+      <p:sp>
+        <p:nvSpPr>
+          <p:cNvPr id="53" name="Oval 52">
+            <a:extLst>
+              <a:ext uri="{FF2B5EF4-FFF2-40B4-BE49-F238E27FC236}">
+                <a16:creationId xmlns:a16="http://schemas.microsoft.com/office/drawing/2014/main" id="{C553BF05-19A3-45AC-AAC5-E5A1151698A2}"/>
+              </a:ext>
+            </a:extLst>
+          </p:cNvPr>
+          <p:cNvSpPr/>
+          <p:nvPr/>
+        </p:nvSpPr>
+        <p:spPr>
+          <a:xfrm>
+            <a:off x="5033321" y="3861965"/>
+            <a:ext cx="645597" cy="621102"/>
+          </a:xfrm>
+          <a:prstGeom prst="ellipse">
+            <a:avLst/>
+          </a:prstGeom>
+        </p:spPr>
+        <p:style>
+          <a:lnRef idx="2">
+            <a:schemeClr val="accent1">
+              <a:shade val="50000"/>
+            </a:schemeClr>
+          </a:lnRef>
+          <a:fillRef idx="1">
+            <a:schemeClr val="accent1"/>
+          </a:fillRef>
+          <a:effectRef idx="0">
+            <a:schemeClr val="accent1"/>
+          </a:effectRef>
+          <a:fontRef idx="minor">
+            <a:schemeClr val="lt1"/>
+          </a:fontRef>
+        </p:style>
+        <p:txBody>
+          <a:bodyPr rtlCol="0" anchor="ctr"/>
+          <a:lstStyle/>
+          <a:p>
+            <a:pPr algn="ctr"/>
+            <a:r>
+              <a:rPr lang="en-US" dirty="0"/>
+              <a:t>7</a:t>
+            </a:r>
+            <a:endParaRPr lang="en-IL" dirty="0"/>
+          </a:p>
+        </p:txBody>
+      </p:sp>
+      <p:cxnSp>
+        <p:nvCxnSpPr>
+          <p:cNvPr id="54" name="Straight Connector 53">
+            <a:extLst>
+              <a:ext uri="{FF2B5EF4-FFF2-40B4-BE49-F238E27FC236}">
+                <a16:creationId xmlns:a16="http://schemas.microsoft.com/office/drawing/2014/main" id="{974E7C44-7ED3-483F-916D-984B902ACD7F}"/>
+              </a:ext>
+            </a:extLst>
+          </p:cNvPr>
+          <p:cNvCxnSpPr>
+            <a:cxnSpLocks/>
+          </p:cNvCxnSpPr>
+          <p:nvPr/>
+        </p:nvCxnSpPr>
+        <p:spPr>
+          <a:xfrm>
+            <a:off x="4669743" y="3063334"/>
+            <a:ext cx="644680" cy="858278"/>
+          </a:xfrm>
+          <a:prstGeom prst="line">
+            <a:avLst/>
+          </a:prstGeom>
+        </p:spPr>
+        <p:style>
+          <a:lnRef idx="1">
+            <a:schemeClr val="accent1"/>
+          </a:lnRef>
+          <a:fillRef idx="0">
+            <a:schemeClr val="accent1"/>
+          </a:fillRef>
+          <a:effectRef idx="0">
+            <a:schemeClr val="accent1"/>
+          </a:effectRef>
+          <a:fontRef idx="minor">
+            <a:schemeClr val="tx1"/>
+          </a:fontRef>
+        </p:style>
+      </p:cxnSp>
+      <p:cxnSp>
+        <p:nvCxnSpPr>
+          <p:cNvPr id="55" name="Straight Connector 54">
+            <a:extLst>
+              <a:ext uri="{FF2B5EF4-FFF2-40B4-BE49-F238E27FC236}">
+                <a16:creationId xmlns:a16="http://schemas.microsoft.com/office/drawing/2014/main" id="{76614358-9CBD-4BB4-9E0C-FAE71A31A5D3}"/>
+              </a:ext>
+            </a:extLst>
+          </p:cNvPr>
+          <p:cNvCxnSpPr>
+            <a:cxnSpLocks/>
+          </p:cNvCxnSpPr>
+          <p:nvPr/>
+        </p:nvCxnSpPr>
+        <p:spPr>
+          <a:xfrm flipH="1">
+            <a:off x="4299590" y="3257378"/>
+            <a:ext cx="405442" cy="664234"/>
+          </a:xfrm>
+          <a:prstGeom prst="line">
+            <a:avLst/>
+          </a:prstGeom>
+        </p:spPr>
+        <p:style>
+          <a:lnRef idx="1">
+            <a:schemeClr val="accent1"/>
+          </a:lnRef>
+          <a:fillRef idx="0">
+            <a:schemeClr val="accent1"/>
+          </a:fillRef>
+          <a:effectRef idx="0">
+            <a:schemeClr val="accent1"/>
+          </a:effectRef>
+          <a:fontRef idx="minor">
+            <a:schemeClr val="tx1"/>
+          </a:fontRef>
+        </p:style>
+      </p:cxnSp>
+    </p:spTree>
+    <p:extLst>
+      <p:ext uri="{BB962C8B-B14F-4D97-AF65-F5344CB8AC3E}">
+        <p14:creationId xmlns:p14="http://schemas.microsoft.com/office/powerpoint/2010/main" val="2522329051"/>
+      </p:ext>
+    </p:extLst>
+  </p:cSld>
+  <p:clrMapOvr>
+    <a:masterClrMapping/>
+  </p:clrMapOvr>
+</p:sld>
+</file>
+
 <file path=ppt/theme/theme1.xml><?xml version="1.0" encoding="utf-8"?>
 <a:theme xmlns:a="http://schemas.openxmlformats.org/drawingml/2006/main" name="Office Theme">
   <a:themeElements>

</xml_diff>

<commit_message>
finished the Data structure
</commit_message>
<xml_diff>
--- a/ex1/tests/sketch_tree.pptx
+++ b/ex1/tests/sketch_tree.pptx
@@ -9,6 +9,7 @@
     <p:sldId id="257" r:id="rId3"/>
     <p:sldId id="258" r:id="rId4"/>
     <p:sldId id="259" r:id="rId5"/>
+    <p:sldId id="260" r:id="rId6"/>
   </p:sldIdLst>
   <p:sldSz cx="12192000" cy="6858000"/>
   <p:notesSz cx="6858000" cy="9144000"/>
@@ -264,7 +265,7 @@
           <a:p>
             <a:fld id="{A8E905E9-DFD8-4C69-8908-AF1D10759DCE}" type="datetimeFigureOut">
               <a:rPr lang="en-IL" smtClean="0"/>
-              <a:t>20/04/2022</a:t>
+              <a:t>23/04/2022</a:t>
             </a:fld>
             <a:endParaRPr lang="en-IL"/>
           </a:p>
@@ -464,7 +465,7 @@
           <a:p>
             <a:fld id="{A8E905E9-DFD8-4C69-8908-AF1D10759DCE}" type="datetimeFigureOut">
               <a:rPr lang="en-IL" smtClean="0"/>
-              <a:t>20/04/2022</a:t>
+              <a:t>23/04/2022</a:t>
             </a:fld>
             <a:endParaRPr lang="en-IL"/>
           </a:p>
@@ -674,7 +675,7 @@
           <a:p>
             <a:fld id="{A8E905E9-DFD8-4C69-8908-AF1D10759DCE}" type="datetimeFigureOut">
               <a:rPr lang="en-IL" smtClean="0"/>
-              <a:t>20/04/2022</a:t>
+              <a:t>23/04/2022</a:t>
             </a:fld>
             <a:endParaRPr lang="en-IL"/>
           </a:p>
@@ -874,7 +875,7 @@
           <a:p>
             <a:fld id="{A8E905E9-DFD8-4C69-8908-AF1D10759DCE}" type="datetimeFigureOut">
               <a:rPr lang="en-IL" smtClean="0"/>
-              <a:t>20/04/2022</a:t>
+              <a:t>23/04/2022</a:t>
             </a:fld>
             <a:endParaRPr lang="en-IL"/>
           </a:p>
@@ -1150,7 +1151,7 @@
           <a:p>
             <a:fld id="{A8E905E9-DFD8-4C69-8908-AF1D10759DCE}" type="datetimeFigureOut">
               <a:rPr lang="en-IL" smtClean="0"/>
-              <a:t>20/04/2022</a:t>
+              <a:t>23/04/2022</a:t>
             </a:fld>
             <a:endParaRPr lang="en-IL"/>
           </a:p>
@@ -1418,7 +1419,7 @@
           <a:p>
             <a:fld id="{A8E905E9-DFD8-4C69-8908-AF1D10759DCE}" type="datetimeFigureOut">
               <a:rPr lang="en-IL" smtClean="0"/>
-              <a:t>20/04/2022</a:t>
+              <a:t>23/04/2022</a:t>
             </a:fld>
             <a:endParaRPr lang="en-IL"/>
           </a:p>
@@ -1833,7 +1834,7 @@
           <a:p>
             <a:fld id="{A8E905E9-DFD8-4C69-8908-AF1D10759DCE}" type="datetimeFigureOut">
               <a:rPr lang="en-IL" smtClean="0"/>
-              <a:t>20/04/2022</a:t>
+              <a:t>23/04/2022</a:t>
             </a:fld>
             <a:endParaRPr lang="en-IL"/>
           </a:p>
@@ -1975,7 +1976,7 @@
           <a:p>
             <a:fld id="{A8E905E9-DFD8-4C69-8908-AF1D10759DCE}" type="datetimeFigureOut">
               <a:rPr lang="en-IL" smtClean="0"/>
-              <a:t>20/04/2022</a:t>
+              <a:t>23/04/2022</a:t>
             </a:fld>
             <a:endParaRPr lang="en-IL"/>
           </a:p>
@@ -2088,7 +2089,7 @@
           <a:p>
             <a:fld id="{A8E905E9-DFD8-4C69-8908-AF1D10759DCE}" type="datetimeFigureOut">
               <a:rPr lang="en-IL" smtClean="0"/>
-              <a:t>20/04/2022</a:t>
+              <a:t>23/04/2022</a:t>
             </a:fld>
             <a:endParaRPr lang="en-IL"/>
           </a:p>
@@ -2401,7 +2402,7 @@
           <a:p>
             <a:fld id="{A8E905E9-DFD8-4C69-8908-AF1D10759DCE}" type="datetimeFigureOut">
               <a:rPr lang="en-IL" smtClean="0"/>
-              <a:t>20/04/2022</a:t>
+              <a:t>23/04/2022</a:t>
             </a:fld>
             <a:endParaRPr lang="en-IL"/>
           </a:p>
@@ -2690,7 +2691,7 @@
           <a:p>
             <a:fld id="{A8E905E9-DFD8-4C69-8908-AF1D10759DCE}" type="datetimeFigureOut">
               <a:rPr lang="en-IL" smtClean="0"/>
-              <a:t>20/04/2022</a:t>
+              <a:t>23/04/2022</a:t>
             </a:fld>
             <a:endParaRPr lang="en-IL"/>
           </a:p>
@@ -2933,7 +2934,7 @@
           <a:p>
             <a:fld id="{A8E905E9-DFD8-4C69-8908-AF1D10759DCE}" type="datetimeFigureOut">
               <a:rPr lang="en-IL" smtClean="0"/>
-              <a:t>20/04/2022</a:t>
+              <a:t>23/04/2022</a:t>
             </a:fld>
             <a:endParaRPr lang="en-IL"/>
           </a:p>
@@ -5028,7 +5029,7 @@
         </p:nvSpPr>
         <p:spPr>
           <a:xfrm>
-            <a:off x="1083310" y="529646"/>
+            <a:off x="5317908" y="854467"/>
             <a:ext cx="638354" cy="621102"/>
           </a:xfrm>
           <a:prstGeom prst="ellipse">
@@ -5080,7 +5081,7 @@
         </p:nvCxnSpPr>
         <p:spPr>
           <a:xfrm flipH="1">
-            <a:off x="2085946" y="1487084"/>
+            <a:off x="4346067" y="1193786"/>
             <a:ext cx="1051157" cy="430540"/>
           </a:xfrm>
           <a:prstGeom prst="line">
@@ -5118,7 +5119,7 @@
         </p:nvCxnSpPr>
         <p:spPr>
           <a:xfrm>
-            <a:off x="3494390" y="1487084"/>
+            <a:off x="5754511" y="1193786"/>
             <a:ext cx="1230128" cy="559694"/>
           </a:xfrm>
           <a:prstGeom prst="line">
@@ -5154,7 +5155,7 @@
         </p:nvSpPr>
         <p:spPr>
           <a:xfrm>
-            <a:off x="1562189" y="4017766"/>
+            <a:off x="3822310" y="3724468"/>
             <a:ext cx="638354" cy="621102"/>
           </a:xfrm>
           <a:prstGeom prst="ellipse">
@@ -5204,7 +5205,7 @@
         </p:nvSpPr>
         <p:spPr>
           <a:xfrm>
-            <a:off x="4405341" y="1736227"/>
+            <a:off x="6665462" y="1442929"/>
             <a:ext cx="638354" cy="621102"/>
           </a:xfrm>
           <a:prstGeom prst="ellipse">
@@ -5254,7 +5255,7 @@
         </p:nvSpPr>
         <p:spPr>
           <a:xfrm>
-            <a:off x="2371580" y="2894429"/>
+            <a:off x="4631701" y="2601131"/>
             <a:ext cx="638354" cy="621102"/>
           </a:xfrm>
           <a:prstGeom prst="ellipse">
@@ -5304,7 +5305,7 @@
         </p:nvSpPr>
         <p:spPr>
           <a:xfrm>
-            <a:off x="1650297" y="1766930"/>
+            <a:off x="3910418" y="1473632"/>
             <a:ext cx="638354" cy="621102"/>
           </a:xfrm>
           <a:prstGeom prst="ellipse">
@@ -5354,7 +5355,7 @@
         </p:nvSpPr>
         <p:spPr>
           <a:xfrm>
-            <a:off x="2982732" y="1136255"/>
+            <a:off x="5699409" y="2584225"/>
             <a:ext cx="638354" cy="621102"/>
           </a:xfrm>
           <a:prstGeom prst="ellipse">
@@ -5404,7 +5405,7 @@
         </p:nvSpPr>
         <p:spPr>
           <a:xfrm>
-            <a:off x="5204910" y="2788234"/>
+            <a:off x="7465031" y="2494936"/>
             <a:ext cx="638354" cy="621102"/>
           </a:xfrm>
           <a:prstGeom prst="ellipse">
@@ -5454,7 +5455,7 @@
         </p:nvSpPr>
         <p:spPr>
           <a:xfrm>
-            <a:off x="3455834" y="2865504"/>
+            <a:off x="6125564" y="3636232"/>
             <a:ext cx="638354" cy="621102"/>
           </a:xfrm>
           <a:prstGeom prst="ellipse">
@@ -5506,7 +5507,7 @@
         </p:nvCxnSpPr>
         <p:spPr>
           <a:xfrm>
-            <a:off x="4861571" y="2241212"/>
+            <a:off x="7121692" y="1947914"/>
             <a:ext cx="603005" cy="800039"/>
           </a:xfrm>
           <a:prstGeom prst="line">
@@ -5544,7 +5545,7 @@
         </p:nvCxnSpPr>
         <p:spPr>
           <a:xfrm>
-            <a:off x="2071442" y="2241211"/>
+            <a:off x="4331563" y="1947913"/>
             <a:ext cx="603005" cy="800039"/>
           </a:xfrm>
           <a:prstGeom prst="line">
@@ -5582,7 +5583,7 @@
         </p:nvCxnSpPr>
         <p:spPr>
           <a:xfrm>
-            <a:off x="3807951" y="3322803"/>
+            <a:off x="6068072" y="3029505"/>
             <a:ext cx="376059" cy="853333"/>
           </a:xfrm>
           <a:prstGeom prst="line">
@@ -5620,7 +5621,7 @@
         </p:nvCxnSpPr>
         <p:spPr>
           <a:xfrm flipH="1">
-            <a:off x="3807951" y="2173469"/>
+            <a:off x="6068072" y="1880171"/>
             <a:ext cx="877404" cy="925316"/>
           </a:xfrm>
           <a:prstGeom prst="line">
@@ -5658,7 +5659,7 @@
         </p:nvCxnSpPr>
         <p:spPr>
           <a:xfrm flipH="1">
-            <a:off x="1003962" y="2115934"/>
+            <a:off x="3264083" y="1822636"/>
             <a:ext cx="877404" cy="925316"/>
           </a:xfrm>
           <a:prstGeom prst="line">
@@ -5696,7 +5697,7 @@
         </p:nvCxnSpPr>
         <p:spPr>
           <a:xfrm flipH="1">
-            <a:off x="5057257" y="3136947"/>
+            <a:off x="7317378" y="2843649"/>
             <a:ext cx="501345" cy="958189"/>
           </a:xfrm>
           <a:prstGeom prst="line">
@@ -5732,7 +5733,7 @@
         </p:nvSpPr>
         <p:spPr>
           <a:xfrm>
-            <a:off x="4709034" y="4026806"/>
+            <a:off x="6969155" y="3733508"/>
             <a:ext cx="638354" cy="621102"/>
           </a:xfrm>
           <a:prstGeom prst="ellipse">
@@ -5782,7 +5783,7 @@
         </p:nvSpPr>
         <p:spPr>
           <a:xfrm>
-            <a:off x="5758980" y="4026806"/>
+            <a:off x="8019101" y="3733508"/>
             <a:ext cx="638354" cy="621102"/>
           </a:xfrm>
           <a:prstGeom prst="ellipse">
@@ -5832,7 +5833,7 @@
         </p:nvSpPr>
         <p:spPr>
           <a:xfrm>
-            <a:off x="5256544" y="5143511"/>
+            <a:off x="7516665" y="4850213"/>
             <a:ext cx="638354" cy="621102"/>
           </a:xfrm>
           <a:prstGeom prst="ellipse">
@@ -5884,7 +5885,7 @@
         </p:nvCxnSpPr>
         <p:spPr>
           <a:xfrm flipH="1">
-            <a:off x="1721664" y="3314765"/>
+            <a:off x="3981785" y="3021467"/>
             <a:ext cx="877404" cy="925316"/>
           </a:xfrm>
           <a:prstGeom prst="line">
@@ -5920,7 +5921,7 @@
         </p:nvSpPr>
         <p:spPr>
           <a:xfrm>
-            <a:off x="673438" y="2788199"/>
+            <a:off x="2933559" y="2494901"/>
             <a:ext cx="638354" cy="621102"/>
           </a:xfrm>
           <a:prstGeom prst="ellipse">
@@ -5972,7 +5973,7 @@
         </p:nvCxnSpPr>
         <p:spPr>
           <a:xfrm>
-            <a:off x="5608088" y="3314765"/>
+            <a:off x="7868209" y="3021467"/>
             <a:ext cx="376059" cy="853333"/>
           </a:xfrm>
           <a:prstGeom prst="line">
@@ -6010,535 +6011,7 @@
         </p:nvCxnSpPr>
         <p:spPr>
           <a:xfrm flipH="1">
-            <a:off x="5532841" y="4425546"/>
-            <a:ext cx="501345" cy="958189"/>
-          </a:xfrm>
-          <a:prstGeom prst="line">
-            <a:avLst/>
-          </a:prstGeom>
-        </p:spPr>
-        <p:style>
-          <a:lnRef idx="1">
-            <a:schemeClr val="accent1"/>
-          </a:lnRef>
-          <a:fillRef idx="0">
-            <a:schemeClr val="accent1"/>
-          </a:fillRef>
-          <a:effectRef idx="0">
-            <a:schemeClr val="accent1"/>
-          </a:effectRef>
-          <a:fontRef idx="minor">
-            <a:schemeClr val="tx1"/>
-          </a:fontRef>
-        </p:style>
-      </p:cxnSp>
-      <p:sp>
-        <p:nvSpPr>
-          <p:cNvPr id="43" name="Oval 42">
-            <a:extLst>
-              <a:ext uri="{FF2B5EF4-FFF2-40B4-BE49-F238E27FC236}">
-                <a16:creationId xmlns:a16="http://schemas.microsoft.com/office/drawing/2014/main" id="{B90C64C0-D13F-4283-91DA-8DA6D2E4B71A}"/>
-              </a:ext>
-            </a:extLst>
-          </p:cNvPr>
-          <p:cNvSpPr/>
-          <p:nvPr/>
-        </p:nvSpPr>
-        <p:spPr>
-          <a:xfrm>
-            <a:off x="8448613" y="1743856"/>
-            <a:ext cx="638354" cy="621102"/>
-          </a:xfrm>
-          <a:prstGeom prst="ellipse">
-            <a:avLst/>
-          </a:prstGeom>
-        </p:spPr>
-        <p:style>
-          <a:lnRef idx="2">
-            <a:schemeClr val="accent1">
-              <a:shade val="50000"/>
-            </a:schemeClr>
-          </a:lnRef>
-          <a:fillRef idx="1">
-            <a:schemeClr val="accent1"/>
-          </a:fillRef>
-          <a:effectRef idx="0">
-            <a:schemeClr val="accent1"/>
-          </a:effectRef>
-          <a:fontRef idx="minor">
-            <a:schemeClr val="lt1"/>
-          </a:fontRef>
-        </p:style>
-        <p:txBody>
-          <a:bodyPr rtlCol="0" anchor="ctr"/>
-          <a:lstStyle/>
-          <a:p>
-            <a:pPr algn="ctr"/>
-            <a:r>
-              <a:rPr lang="en-US" dirty="0"/>
-              <a:t>8</a:t>
-            </a:r>
-            <a:endParaRPr lang="en-IL" dirty="0"/>
-          </a:p>
-        </p:txBody>
-      </p:sp>
-      <p:sp>
-        <p:nvSpPr>
-          <p:cNvPr id="44" name="Oval 43">
-            <a:extLst>
-              <a:ext uri="{FF2B5EF4-FFF2-40B4-BE49-F238E27FC236}">
-                <a16:creationId xmlns:a16="http://schemas.microsoft.com/office/drawing/2014/main" id="{E19C3229-FD9E-435C-B54B-B4AA5996578B}"/>
-              </a:ext>
-            </a:extLst>
-          </p:cNvPr>
-          <p:cNvSpPr/>
-          <p:nvPr/>
-        </p:nvSpPr>
-        <p:spPr>
-          <a:xfrm>
-            <a:off x="9381531" y="793415"/>
-            <a:ext cx="638354" cy="621102"/>
-          </a:xfrm>
-          <a:prstGeom prst="ellipse">
-            <a:avLst/>
-          </a:prstGeom>
-        </p:spPr>
-        <p:style>
-          <a:lnRef idx="2">
-            <a:schemeClr val="accent1">
-              <a:shade val="50000"/>
-            </a:schemeClr>
-          </a:lnRef>
-          <a:fillRef idx="1">
-            <a:schemeClr val="accent1"/>
-          </a:fillRef>
-          <a:effectRef idx="0">
-            <a:schemeClr val="accent1"/>
-          </a:effectRef>
-          <a:fontRef idx="minor">
-            <a:schemeClr val="lt1"/>
-          </a:fontRef>
-        </p:style>
-        <p:txBody>
-          <a:bodyPr rtlCol="0" anchor="ctr"/>
-          <a:lstStyle/>
-          <a:p>
-            <a:pPr algn="ctr"/>
-            <a:r>
-              <a:rPr lang="en-US" dirty="0"/>
-              <a:t>10</a:t>
-            </a:r>
-            <a:endParaRPr lang="en-IL" dirty="0"/>
-          </a:p>
-        </p:txBody>
-      </p:sp>
-      <p:sp>
-        <p:nvSpPr>
-          <p:cNvPr id="45" name="Oval 44">
-            <a:extLst>
-              <a:ext uri="{FF2B5EF4-FFF2-40B4-BE49-F238E27FC236}">
-                <a16:creationId xmlns:a16="http://schemas.microsoft.com/office/drawing/2014/main" id="{48A6D14F-5AB4-4CE4-BC43-41EA1793FD62}"/>
-              </a:ext>
-            </a:extLst>
-          </p:cNvPr>
-          <p:cNvSpPr/>
-          <p:nvPr/>
-        </p:nvSpPr>
-        <p:spPr>
-          <a:xfrm>
-            <a:off x="7748775" y="2894429"/>
-            <a:ext cx="638354" cy="621102"/>
-          </a:xfrm>
-          <a:prstGeom prst="ellipse">
-            <a:avLst/>
-          </a:prstGeom>
-        </p:spPr>
-        <p:style>
-          <a:lnRef idx="2">
-            <a:schemeClr val="accent1">
-              <a:shade val="50000"/>
-            </a:schemeClr>
-          </a:lnRef>
-          <a:fillRef idx="1">
-            <a:schemeClr val="accent1"/>
-          </a:fillRef>
-          <a:effectRef idx="0">
-            <a:schemeClr val="accent1"/>
-          </a:effectRef>
-          <a:fontRef idx="minor">
-            <a:schemeClr val="lt1"/>
-          </a:fontRef>
-        </p:style>
-        <p:txBody>
-          <a:bodyPr rtlCol="0" anchor="ctr"/>
-          <a:lstStyle/>
-          <a:p>
-            <a:pPr algn="ctr"/>
-            <a:r>
-              <a:rPr lang="en-US" dirty="0"/>
-              <a:t>7</a:t>
-            </a:r>
-            <a:endParaRPr lang="en-IL" dirty="0"/>
-          </a:p>
-        </p:txBody>
-      </p:sp>
-      <p:cxnSp>
-        <p:nvCxnSpPr>
-          <p:cNvPr id="46" name="Straight Connector 45">
-            <a:extLst>
-              <a:ext uri="{FF2B5EF4-FFF2-40B4-BE49-F238E27FC236}">
-                <a16:creationId xmlns:a16="http://schemas.microsoft.com/office/drawing/2014/main" id="{46A8FDB8-657C-463C-B6AA-7A79F3F5440C}"/>
-              </a:ext>
-            </a:extLst>
-          </p:cNvPr>
-          <p:cNvCxnSpPr>
-            <a:cxnSpLocks/>
-          </p:cNvCxnSpPr>
-          <p:nvPr/>
-        </p:nvCxnSpPr>
-        <p:spPr>
-          <a:xfrm>
-            <a:off x="10018468" y="1124507"/>
-            <a:ext cx="603005" cy="800039"/>
-          </a:xfrm>
-          <a:prstGeom prst="line">
-            <a:avLst/>
-          </a:prstGeom>
-        </p:spPr>
-        <p:style>
-          <a:lnRef idx="1">
-            <a:schemeClr val="accent1"/>
-          </a:lnRef>
-          <a:fillRef idx="0">
-            <a:schemeClr val="accent1"/>
-          </a:fillRef>
-          <a:effectRef idx="0">
-            <a:schemeClr val="accent1"/>
-          </a:effectRef>
-          <a:fontRef idx="minor">
-            <a:schemeClr val="tx1"/>
-          </a:fontRef>
-        </p:style>
-      </p:cxnSp>
-      <p:cxnSp>
-        <p:nvCxnSpPr>
-          <p:cNvPr id="47" name="Straight Connector 46">
-            <a:extLst>
-              <a:ext uri="{FF2B5EF4-FFF2-40B4-BE49-F238E27FC236}">
-                <a16:creationId xmlns:a16="http://schemas.microsoft.com/office/drawing/2014/main" id="{B999B784-C59E-497B-A784-A311EB38701B}"/>
-              </a:ext>
-            </a:extLst>
-          </p:cNvPr>
-          <p:cNvCxnSpPr>
-            <a:cxnSpLocks/>
-          </p:cNvCxnSpPr>
-          <p:nvPr/>
-        </p:nvCxnSpPr>
-        <p:spPr>
-          <a:xfrm>
-            <a:off x="8964848" y="2206098"/>
-            <a:ext cx="376059" cy="853333"/>
-          </a:xfrm>
-          <a:prstGeom prst="line">
-            <a:avLst/>
-          </a:prstGeom>
-        </p:spPr>
-        <p:style>
-          <a:lnRef idx="1">
-            <a:schemeClr val="accent1"/>
-          </a:lnRef>
-          <a:fillRef idx="0">
-            <a:schemeClr val="accent1"/>
-          </a:fillRef>
-          <a:effectRef idx="0">
-            <a:schemeClr val="accent1"/>
-          </a:effectRef>
-          <a:fontRef idx="minor">
-            <a:schemeClr val="tx1"/>
-          </a:fontRef>
-        </p:style>
-      </p:cxnSp>
-      <p:cxnSp>
-        <p:nvCxnSpPr>
-          <p:cNvPr id="48" name="Straight Connector 47">
-            <a:extLst>
-              <a:ext uri="{FF2B5EF4-FFF2-40B4-BE49-F238E27FC236}">
-                <a16:creationId xmlns:a16="http://schemas.microsoft.com/office/drawing/2014/main" id="{8089A858-4E96-4E6F-8DDF-387AEFA77769}"/>
-              </a:ext>
-            </a:extLst>
-          </p:cNvPr>
-          <p:cNvCxnSpPr>
-            <a:cxnSpLocks/>
-          </p:cNvCxnSpPr>
-          <p:nvPr/>
-        </p:nvCxnSpPr>
-        <p:spPr>
-          <a:xfrm flipH="1">
-            <a:off x="8972496" y="1061241"/>
-            <a:ext cx="501345" cy="958189"/>
-          </a:xfrm>
-          <a:prstGeom prst="line">
-            <a:avLst/>
-          </a:prstGeom>
-        </p:spPr>
-        <p:style>
-          <a:lnRef idx="1">
-            <a:schemeClr val="accent1"/>
-          </a:lnRef>
-          <a:fillRef idx="0">
-            <a:schemeClr val="accent1"/>
-          </a:fillRef>
-          <a:effectRef idx="0">
-            <a:schemeClr val="accent1"/>
-          </a:effectRef>
-          <a:fontRef idx="minor">
-            <a:schemeClr val="tx1"/>
-          </a:fontRef>
-        </p:style>
-      </p:cxnSp>
-      <p:sp>
-        <p:nvSpPr>
-          <p:cNvPr id="49" name="Oval 48">
-            <a:extLst>
-              <a:ext uri="{FF2B5EF4-FFF2-40B4-BE49-F238E27FC236}">
-                <a16:creationId xmlns:a16="http://schemas.microsoft.com/office/drawing/2014/main" id="{490B1245-CF30-4663-AF0E-C9E5DCFCA049}"/>
-              </a:ext>
-            </a:extLst>
-          </p:cNvPr>
-          <p:cNvSpPr/>
-          <p:nvPr/>
-        </p:nvSpPr>
-        <p:spPr>
-          <a:xfrm>
-            <a:off x="9139176" y="2961473"/>
-            <a:ext cx="638354" cy="621102"/>
-          </a:xfrm>
-          <a:prstGeom prst="ellipse">
-            <a:avLst/>
-          </a:prstGeom>
-        </p:spPr>
-        <p:style>
-          <a:lnRef idx="2">
-            <a:schemeClr val="accent1">
-              <a:shade val="50000"/>
-            </a:schemeClr>
-          </a:lnRef>
-          <a:fillRef idx="1">
-            <a:schemeClr val="accent1"/>
-          </a:fillRef>
-          <a:effectRef idx="0">
-            <a:schemeClr val="accent1"/>
-          </a:effectRef>
-          <a:fontRef idx="minor">
-            <a:schemeClr val="lt1"/>
-          </a:fontRef>
-        </p:style>
-        <p:txBody>
-          <a:bodyPr rtlCol="0" anchor="ctr"/>
-          <a:lstStyle/>
-          <a:p>
-            <a:pPr algn="ctr"/>
-            <a:r>
-              <a:rPr lang="en-US" dirty="0"/>
-              <a:t>9</a:t>
-            </a:r>
-            <a:endParaRPr lang="en-IL" dirty="0"/>
-          </a:p>
-        </p:txBody>
-      </p:sp>
-      <p:sp>
-        <p:nvSpPr>
-          <p:cNvPr id="50" name="Oval 49">
-            <a:extLst>
-              <a:ext uri="{FF2B5EF4-FFF2-40B4-BE49-F238E27FC236}">
-                <a16:creationId xmlns:a16="http://schemas.microsoft.com/office/drawing/2014/main" id="{FD5533F9-631F-4604-B3E4-40BF8DC5194F}"/>
-              </a:ext>
-            </a:extLst>
-          </p:cNvPr>
-          <p:cNvSpPr/>
-          <p:nvPr/>
-        </p:nvSpPr>
-        <p:spPr>
-          <a:xfrm>
-            <a:off x="10268521" y="1766930"/>
-            <a:ext cx="638354" cy="621102"/>
-          </a:xfrm>
-          <a:prstGeom prst="ellipse">
-            <a:avLst/>
-          </a:prstGeom>
-        </p:spPr>
-        <p:style>
-          <a:lnRef idx="2">
-            <a:schemeClr val="accent1">
-              <a:shade val="50000"/>
-            </a:schemeClr>
-          </a:lnRef>
-          <a:fillRef idx="1">
-            <a:schemeClr val="accent1"/>
-          </a:fillRef>
-          <a:effectRef idx="0">
-            <a:schemeClr val="accent1"/>
-          </a:effectRef>
-          <a:fontRef idx="minor">
-            <a:schemeClr val="lt1"/>
-          </a:fontRef>
-        </p:style>
-        <p:txBody>
-          <a:bodyPr rtlCol="0" anchor="ctr"/>
-          <a:lstStyle/>
-          <a:p>
-            <a:pPr algn="ctr"/>
-            <a:r>
-              <a:rPr lang="en-US" dirty="0"/>
-              <a:t>12</a:t>
-            </a:r>
-            <a:endParaRPr lang="en-IL" dirty="0"/>
-          </a:p>
-        </p:txBody>
-      </p:sp>
-      <p:sp>
-        <p:nvSpPr>
-          <p:cNvPr id="51" name="Oval 50">
-            <a:extLst>
-              <a:ext uri="{FF2B5EF4-FFF2-40B4-BE49-F238E27FC236}">
-                <a16:creationId xmlns:a16="http://schemas.microsoft.com/office/drawing/2014/main" id="{F54D5F85-4413-476B-AC78-C06B7DAB58A7}"/>
-              </a:ext>
-            </a:extLst>
-          </p:cNvPr>
-          <p:cNvSpPr/>
-          <p:nvPr/>
-        </p:nvSpPr>
-        <p:spPr>
-          <a:xfrm>
-            <a:off x="10831992" y="2894429"/>
-            <a:ext cx="638354" cy="621102"/>
-          </a:xfrm>
-          <a:prstGeom prst="ellipse">
-            <a:avLst/>
-          </a:prstGeom>
-        </p:spPr>
-        <p:style>
-          <a:lnRef idx="2">
-            <a:schemeClr val="accent1">
-              <a:shade val="50000"/>
-            </a:schemeClr>
-          </a:lnRef>
-          <a:fillRef idx="1">
-            <a:schemeClr val="accent1"/>
-          </a:fillRef>
-          <a:effectRef idx="0">
-            <a:schemeClr val="accent1"/>
-          </a:effectRef>
-          <a:fontRef idx="minor">
-            <a:schemeClr val="lt1"/>
-          </a:fontRef>
-        </p:style>
-        <p:txBody>
-          <a:bodyPr rtlCol="0" anchor="ctr"/>
-          <a:lstStyle/>
-          <a:p>
-            <a:pPr algn="ctr"/>
-            <a:r>
-              <a:rPr lang="en-US" dirty="0"/>
-              <a:t>11</a:t>
-            </a:r>
-            <a:endParaRPr lang="en-IL" dirty="0"/>
-          </a:p>
-        </p:txBody>
-      </p:sp>
-      <p:cxnSp>
-        <p:nvCxnSpPr>
-          <p:cNvPr id="52" name="Straight Connector 51">
-            <a:extLst>
-              <a:ext uri="{FF2B5EF4-FFF2-40B4-BE49-F238E27FC236}">
-                <a16:creationId xmlns:a16="http://schemas.microsoft.com/office/drawing/2014/main" id="{8465FA73-13F2-483C-9769-5E8FFA388A08}"/>
-              </a:ext>
-            </a:extLst>
-          </p:cNvPr>
-          <p:cNvCxnSpPr>
-            <a:cxnSpLocks/>
-          </p:cNvCxnSpPr>
-          <p:nvPr/>
-        </p:nvCxnSpPr>
-        <p:spPr>
-          <a:xfrm>
-            <a:off x="10764985" y="2198060"/>
-            <a:ext cx="376059" cy="853333"/>
-          </a:xfrm>
-          <a:prstGeom prst="line">
-            <a:avLst/>
-          </a:prstGeom>
-        </p:spPr>
-        <p:style>
-          <a:lnRef idx="1">
-            <a:schemeClr val="accent1"/>
-          </a:lnRef>
-          <a:fillRef idx="0">
-            <a:schemeClr val="accent1"/>
-          </a:fillRef>
-          <a:effectRef idx="0">
-            <a:schemeClr val="accent1"/>
-          </a:effectRef>
-          <a:fontRef idx="minor">
-            <a:schemeClr val="tx1"/>
-          </a:fontRef>
-        </p:style>
-      </p:cxnSp>
-      <p:cxnSp>
-        <p:nvCxnSpPr>
-          <p:cNvPr id="53" name="Straight Connector 52">
-            <a:extLst>
-              <a:ext uri="{FF2B5EF4-FFF2-40B4-BE49-F238E27FC236}">
-                <a16:creationId xmlns:a16="http://schemas.microsoft.com/office/drawing/2014/main" id="{DE9A4AE8-12D7-4189-83A6-2AAF63696B4E}"/>
-              </a:ext>
-            </a:extLst>
-          </p:cNvPr>
-          <p:cNvCxnSpPr>
-            <a:cxnSpLocks/>
-          </p:cNvCxnSpPr>
-          <p:nvPr/>
-        </p:nvCxnSpPr>
-        <p:spPr>
-          <a:xfrm flipH="1">
-            <a:off x="10689738" y="3308841"/>
-            <a:ext cx="501345" cy="958189"/>
-          </a:xfrm>
-          <a:prstGeom prst="line">
-            <a:avLst/>
-          </a:prstGeom>
-        </p:spPr>
-        <p:style>
-          <a:lnRef idx="1">
-            <a:schemeClr val="accent1"/>
-          </a:lnRef>
-          <a:fillRef idx="0">
-            <a:schemeClr val="accent1"/>
-          </a:fillRef>
-          <a:effectRef idx="0">
-            <a:schemeClr val="accent1"/>
-          </a:effectRef>
-          <a:fontRef idx="minor">
-            <a:schemeClr val="tx1"/>
-          </a:fontRef>
-        </p:style>
-      </p:cxnSp>
-      <p:cxnSp>
-        <p:nvCxnSpPr>
-          <p:cNvPr id="55" name="Straight Connector 54">
-            <a:extLst>
-              <a:ext uri="{FF2B5EF4-FFF2-40B4-BE49-F238E27FC236}">
-                <a16:creationId xmlns:a16="http://schemas.microsoft.com/office/drawing/2014/main" id="{EFBEAB74-6346-4499-8008-A7C3451FF533}"/>
-              </a:ext>
-            </a:extLst>
-          </p:cNvPr>
-          <p:cNvCxnSpPr>
-            <a:cxnSpLocks/>
-          </p:cNvCxnSpPr>
-          <p:nvPr/>
-        </p:nvCxnSpPr>
-        <p:spPr>
-          <a:xfrm flipH="1">
-            <a:off x="8126912" y="2146790"/>
+            <a:off x="7792962" y="4132248"/>
             <a:ext cx="501345" cy="958189"/>
           </a:xfrm>
           <a:prstGeom prst="line">
@@ -8484,6 +7957,1054 @@
     <p:extLst>
       <p:ext uri="{BB962C8B-B14F-4D97-AF65-F5344CB8AC3E}">
         <p14:creationId xmlns:p14="http://schemas.microsoft.com/office/powerpoint/2010/main" val="2522329051"/>
+      </p:ext>
+    </p:extLst>
+  </p:cSld>
+  <p:clrMapOvr>
+    <a:masterClrMapping/>
+  </p:clrMapOvr>
+</p:sld>
+</file>
+
+<file path=ppt/slides/slide5.xml><?xml version="1.0" encoding="utf-8"?>
+<p:sld xmlns:a="http://schemas.openxmlformats.org/drawingml/2006/main" xmlns:r="http://schemas.openxmlformats.org/officeDocument/2006/relationships" xmlns:p="http://schemas.openxmlformats.org/presentationml/2006/main">
+  <p:cSld>
+    <p:spTree>
+      <p:nvGrpSpPr>
+        <p:cNvPr id="1" name=""/>
+        <p:cNvGrpSpPr/>
+        <p:nvPr/>
+      </p:nvGrpSpPr>
+      <p:grpSpPr>
+        <a:xfrm>
+          <a:off x="0" y="0"/>
+          <a:ext cx="0" cy="0"/>
+          <a:chOff x="0" y="0"/>
+          <a:chExt cx="0" cy="0"/>
+        </a:xfrm>
+      </p:grpSpPr>
+      <p:sp>
+        <p:nvSpPr>
+          <p:cNvPr id="4" name="Oval 3">
+            <a:extLst>
+              <a:ext uri="{FF2B5EF4-FFF2-40B4-BE49-F238E27FC236}">
+                <a16:creationId xmlns:a16="http://schemas.microsoft.com/office/drawing/2014/main" id="{ADF9CD02-12ED-439B-80DE-CED727D58513}"/>
+              </a:ext>
+            </a:extLst>
+          </p:cNvPr>
+          <p:cNvSpPr/>
+          <p:nvPr/>
+        </p:nvSpPr>
+        <p:spPr>
+          <a:xfrm>
+            <a:off x="5317908" y="854467"/>
+            <a:ext cx="638354" cy="621102"/>
+          </a:xfrm>
+          <a:prstGeom prst="ellipse">
+            <a:avLst/>
+          </a:prstGeom>
+        </p:spPr>
+        <p:style>
+          <a:lnRef idx="2">
+            <a:schemeClr val="accent1">
+              <a:shade val="50000"/>
+            </a:schemeClr>
+          </a:lnRef>
+          <a:fillRef idx="1">
+            <a:schemeClr val="accent1"/>
+          </a:fillRef>
+          <a:effectRef idx="0">
+            <a:schemeClr val="accent1"/>
+          </a:effectRef>
+          <a:fontRef idx="minor">
+            <a:schemeClr val="lt1"/>
+          </a:fontRef>
+        </p:style>
+        <p:txBody>
+          <a:bodyPr rtlCol="0" anchor="ctr"/>
+          <a:lstStyle/>
+          <a:p>
+            <a:pPr algn="ctr"/>
+            <a:r>
+              <a:rPr lang="en-US" dirty="0"/>
+              <a:t>5</a:t>
+            </a:r>
+            <a:endParaRPr lang="en-IL" dirty="0"/>
+          </a:p>
+        </p:txBody>
+      </p:sp>
+      <p:cxnSp>
+        <p:nvCxnSpPr>
+          <p:cNvPr id="5" name="Straight Connector 4">
+            <a:extLst>
+              <a:ext uri="{FF2B5EF4-FFF2-40B4-BE49-F238E27FC236}">
+                <a16:creationId xmlns:a16="http://schemas.microsoft.com/office/drawing/2014/main" id="{2FD8C976-9D39-4DAA-A4ED-B7064D8DC20D}"/>
+              </a:ext>
+            </a:extLst>
+          </p:cNvPr>
+          <p:cNvCxnSpPr>
+            <a:cxnSpLocks/>
+          </p:cNvCxnSpPr>
+          <p:nvPr/>
+        </p:nvCxnSpPr>
+        <p:spPr>
+          <a:xfrm flipH="1">
+            <a:off x="4346067" y="1193786"/>
+            <a:ext cx="1051157" cy="430540"/>
+          </a:xfrm>
+          <a:prstGeom prst="line">
+            <a:avLst/>
+          </a:prstGeom>
+        </p:spPr>
+        <p:style>
+          <a:lnRef idx="1">
+            <a:schemeClr val="accent1"/>
+          </a:lnRef>
+          <a:fillRef idx="0">
+            <a:schemeClr val="accent1"/>
+          </a:fillRef>
+          <a:effectRef idx="0">
+            <a:schemeClr val="accent1"/>
+          </a:effectRef>
+          <a:fontRef idx="minor">
+            <a:schemeClr val="tx1"/>
+          </a:fontRef>
+        </p:style>
+      </p:cxnSp>
+      <p:cxnSp>
+        <p:nvCxnSpPr>
+          <p:cNvPr id="6" name="Straight Connector 5">
+            <a:extLst>
+              <a:ext uri="{FF2B5EF4-FFF2-40B4-BE49-F238E27FC236}">
+                <a16:creationId xmlns:a16="http://schemas.microsoft.com/office/drawing/2014/main" id="{D55E085A-857B-4D9A-9287-15E46C60DD49}"/>
+              </a:ext>
+            </a:extLst>
+          </p:cNvPr>
+          <p:cNvCxnSpPr>
+            <a:cxnSpLocks/>
+          </p:cNvCxnSpPr>
+          <p:nvPr/>
+        </p:nvCxnSpPr>
+        <p:spPr>
+          <a:xfrm>
+            <a:off x="5754511" y="1193786"/>
+            <a:ext cx="1230128" cy="559694"/>
+          </a:xfrm>
+          <a:prstGeom prst="line">
+            <a:avLst/>
+          </a:prstGeom>
+        </p:spPr>
+        <p:style>
+          <a:lnRef idx="1">
+            <a:schemeClr val="accent1"/>
+          </a:lnRef>
+          <a:fillRef idx="0">
+            <a:schemeClr val="accent1"/>
+          </a:fillRef>
+          <a:effectRef idx="0">
+            <a:schemeClr val="accent1"/>
+          </a:effectRef>
+          <a:fontRef idx="minor">
+            <a:schemeClr val="tx1"/>
+          </a:fontRef>
+        </p:style>
+      </p:cxnSp>
+      <p:sp>
+        <p:nvSpPr>
+          <p:cNvPr id="8" name="Oval 7">
+            <a:extLst>
+              <a:ext uri="{FF2B5EF4-FFF2-40B4-BE49-F238E27FC236}">
+                <a16:creationId xmlns:a16="http://schemas.microsoft.com/office/drawing/2014/main" id="{88E6CD13-FC1E-4310-BF64-AF2926D2CB5E}"/>
+              </a:ext>
+            </a:extLst>
+          </p:cNvPr>
+          <p:cNvSpPr/>
+          <p:nvPr/>
+        </p:nvSpPr>
+        <p:spPr>
+          <a:xfrm>
+            <a:off x="3822310" y="3724468"/>
+            <a:ext cx="638354" cy="621102"/>
+          </a:xfrm>
+          <a:prstGeom prst="ellipse">
+            <a:avLst/>
+          </a:prstGeom>
+        </p:spPr>
+        <p:style>
+          <a:lnRef idx="2">
+            <a:schemeClr val="accent1">
+              <a:shade val="50000"/>
+            </a:schemeClr>
+          </a:lnRef>
+          <a:fillRef idx="1">
+            <a:schemeClr val="accent1"/>
+          </a:fillRef>
+          <a:effectRef idx="0">
+            <a:schemeClr val="accent1"/>
+          </a:effectRef>
+          <a:fontRef idx="minor">
+            <a:schemeClr val="lt1"/>
+          </a:fontRef>
+        </p:style>
+        <p:txBody>
+          <a:bodyPr rtlCol="0" anchor="ctr"/>
+          <a:lstStyle/>
+          <a:p>
+            <a:pPr algn="ctr"/>
+            <a:r>
+              <a:rPr lang="en-US" dirty="0"/>
+              <a:t>3</a:t>
+            </a:r>
+            <a:endParaRPr lang="en-IL" dirty="0"/>
+          </a:p>
+        </p:txBody>
+      </p:sp>
+      <p:sp>
+        <p:nvSpPr>
+          <p:cNvPr id="9" name="Oval 8">
+            <a:extLst>
+              <a:ext uri="{FF2B5EF4-FFF2-40B4-BE49-F238E27FC236}">
+                <a16:creationId xmlns:a16="http://schemas.microsoft.com/office/drawing/2014/main" id="{45618D00-5680-429F-BB8B-2215D643065B}"/>
+              </a:ext>
+            </a:extLst>
+          </p:cNvPr>
+          <p:cNvSpPr/>
+          <p:nvPr/>
+        </p:nvSpPr>
+        <p:spPr>
+          <a:xfrm>
+            <a:off x="6665462" y="1442929"/>
+            <a:ext cx="638354" cy="621102"/>
+          </a:xfrm>
+          <a:prstGeom prst="ellipse">
+            <a:avLst/>
+          </a:prstGeom>
+        </p:spPr>
+        <p:style>
+          <a:lnRef idx="2">
+            <a:schemeClr val="accent1">
+              <a:shade val="50000"/>
+            </a:schemeClr>
+          </a:lnRef>
+          <a:fillRef idx="1">
+            <a:schemeClr val="accent1"/>
+          </a:fillRef>
+          <a:effectRef idx="0">
+            <a:schemeClr val="accent1"/>
+          </a:effectRef>
+          <a:fontRef idx="minor">
+            <a:schemeClr val="lt1"/>
+          </a:fontRef>
+        </p:style>
+        <p:txBody>
+          <a:bodyPr rtlCol="0" anchor="ctr"/>
+          <a:lstStyle/>
+          <a:p>
+            <a:pPr algn="ctr"/>
+            <a:r>
+              <a:rPr lang="en-US" dirty="0"/>
+              <a:t>8</a:t>
+            </a:r>
+            <a:endParaRPr lang="en-IL" dirty="0"/>
+          </a:p>
+        </p:txBody>
+      </p:sp>
+      <p:sp>
+        <p:nvSpPr>
+          <p:cNvPr id="12" name="Oval 11">
+            <a:extLst>
+              <a:ext uri="{FF2B5EF4-FFF2-40B4-BE49-F238E27FC236}">
+                <a16:creationId xmlns:a16="http://schemas.microsoft.com/office/drawing/2014/main" id="{FE85DE7B-9740-4E53-8443-6314F5DF0E93}"/>
+              </a:ext>
+            </a:extLst>
+          </p:cNvPr>
+          <p:cNvSpPr/>
+          <p:nvPr/>
+        </p:nvSpPr>
+        <p:spPr>
+          <a:xfrm>
+            <a:off x="4631701" y="2601131"/>
+            <a:ext cx="638354" cy="621102"/>
+          </a:xfrm>
+          <a:prstGeom prst="ellipse">
+            <a:avLst/>
+          </a:prstGeom>
+        </p:spPr>
+        <p:style>
+          <a:lnRef idx="2">
+            <a:schemeClr val="accent1">
+              <a:shade val="50000"/>
+            </a:schemeClr>
+          </a:lnRef>
+          <a:fillRef idx="1">
+            <a:schemeClr val="accent1"/>
+          </a:fillRef>
+          <a:effectRef idx="0">
+            <a:schemeClr val="accent1"/>
+          </a:effectRef>
+          <a:fontRef idx="minor">
+            <a:schemeClr val="lt1"/>
+          </a:fontRef>
+        </p:style>
+        <p:txBody>
+          <a:bodyPr rtlCol="0" anchor="ctr"/>
+          <a:lstStyle/>
+          <a:p>
+            <a:pPr algn="ctr"/>
+            <a:r>
+              <a:rPr lang="en-US" dirty="0"/>
+              <a:t>4</a:t>
+            </a:r>
+            <a:endParaRPr lang="en-IL" dirty="0"/>
+          </a:p>
+        </p:txBody>
+      </p:sp>
+      <p:sp>
+        <p:nvSpPr>
+          <p:cNvPr id="13" name="Oval 12">
+            <a:extLst>
+              <a:ext uri="{FF2B5EF4-FFF2-40B4-BE49-F238E27FC236}">
+                <a16:creationId xmlns:a16="http://schemas.microsoft.com/office/drawing/2014/main" id="{46A46D48-81A8-4133-8E35-3D29723333E0}"/>
+              </a:ext>
+            </a:extLst>
+          </p:cNvPr>
+          <p:cNvSpPr/>
+          <p:nvPr/>
+        </p:nvSpPr>
+        <p:spPr>
+          <a:xfrm>
+            <a:off x="3910418" y="1473632"/>
+            <a:ext cx="638354" cy="621102"/>
+          </a:xfrm>
+          <a:prstGeom prst="ellipse">
+            <a:avLst/>
+          </a:prstGeom>
+        </p:spPr>
+        <p:style>
+          <a:lnRef idx="2">
+            <a:schemeClr val="accent1">
+              <a:shade val="50000"/>
+            </a:schemeClr>
+          </a:lnRef>
+          <a:fillRef idx="1">
+            <a:schemeClr val="accent1"/>
+          </a:fillRef>
+          <a:effectRef idx="0">
+            <a:schemeClr val="accent1"/>
+          </a:effectRef>
+          <a:fontRef idx="minor">
+            <a:schemeClr val="lt1"/>
+          </a:fontRef>
+        </p:style>
+        <p:txBody>
+          <a:bodyPr rtlCol="0" anchor="ctr"/>
+          <a:lstStyle/>
+          <a:p>
+            <a:pPr algn="ctr"/>
+            <a:r>
+              <a:rPr lang="en-US" dirty="0"/>
+              <a:t>2</a:t>
+            </a:r>
+            <a:endParaRPr lang="en-IL" dirty="0"/>
+          </a:p>
+        </p:txBody>
+      </p:sp>
+      <p:sp>
+        <p:nvSpPr>
+          <p:cNvPr id="14" name="Oval 13">
+            <a:extLst>
+              <a:ext uri="{FF2B5EF4-FFF2-40B4-BE49-F238E27FC236}">
+                <a16:creationId xmlns:a16="http://schemas.microsoft.com/office/drawing/2014/main" id="{BF944F62-7D17-443A-9FB0-FAE6282F1660}"/>
+              </a:ext>
+            </a:extLst>
+          </p:cNvPr>
+          <p:cNvSpPr/>
+          <p:nvPr/>
+        </p:nvSpPr>
+        <p:spPr>
+          <a:xfrm>
+            <a:off x="5699409" y="2584225"/>
+            <a:ext cx="638354" cy="621102"/>
+          </a:xfrm>
+          <a:prstGeom prst="ellipse">
+            <a:avLst/>
+          </a:prstGeom>
+        </p:spPr>
+        <p:style>
+          <a:lnRef idx="2">
+            <a:schemeClr val="accent1">
+              <a:shade val="50000"/>
+            </a:schemeClr>
+          </a:lnRef>
+          <a:fillRef idx="1">
+            <a:schemeClr val="accent1"/>
+          </a:fillRef>
+          <a:effectRef idx="0">
+            <a:schemeClr val="accent1"/>
+          </a:effectRef>
+          <a:fontRef idx="minor">
+            <a:schemeClr val="lt1"/>
+          </a:fontRef>
+        </p:style>
+        <p:txBody>
+          <a:bodyPr rtlCol="0" anchor="ctr"/>
+          <a:lstStyle/>
+          <a:p>
+            <a:pPr algn="ctr"/>
+            <a:r>
+              <a:rPr lang="en-US" dirty="0"/>
+              <a:t>6</a:t>
+            </a:r>
+            <a:endParaRPr lang="en-IL" dirty="0"/>
+          </a:p>
+        </p:txBody>
+      </p:sp>
+      <p:sp>
+        <p:nvSpPr>
+          <p:cNvPr id="15" name="Oval 14">
+            <a:extLst>
+              <a:ext uri="{FF2B5EF4-FFF2-40B4-BE49-F238E27FC236}">
+                <a16:creationId xmlns:a16="http://schemas.microsoft.com/office/drawing/2014/main" id="{F60B2FB0-FC0D-477D-B73A-A82CC6849087}"/>
+              </a:ext>
+            </a:extLst>
+          </p:cNvPr>
+          <p:cNvSpPr/>
+          <p:nvPr/>
+        </p:nvSpPr>
+        <p:spPr>
+          <a:xfrm>
+            <a:off x="7465031" y="2494936"/>
+            <a:ext cx="638354" cy="621102"/>
+          </a:xfrm>
+          <a:prstGeom prst="ellipse">
+            <a:avLst/>
+          </a:prstGeom>
+        </p:spPr>
+        <p:style>
+          <a:lnRef idx="2">
+            <a:schemeClr val="accent1">
+              <a:shade val="50000"/>
+            </a:schemeClr>
+          </a:lnRef>
+          <a:fillRef idx="1">
+            <a:schemeClr val="accent1"/>
+          </a:fillRef>
+          <a:effectRef idx="0">
+            <a:schemeClr val="accent1"/>
+          </a:effectRef>
+          <a:fontRef idx="minor">
+            <a:schemeClr val="lt1"/>
+          </a:fontRef>
+        </p:style>
+        <p:txBody>
+          <a:bodyPr rtlCol="0" anchor="ctr"/>
+          <a:lstStyle/>
+          <a:p>
+            <a:pPr algn="ctr"/>
+            <a:r>
+              <a:rPr lang="en-US" dirty="0"/>
+              <a:t>10</a:t>
+            </a:r>
+            <a:endParaRPr lang="en-IL" dirty="0"/>
+          </a:p>
+        </p:txBody>
+      </p:sp>
+      <p:sp>
+        <p:nvSpPr>
+          <p:cNvPr id="16" name="Oval 15">
+            <a:extLst>
+              <a:ext uri="{FF2B5EF4-FFF2-40B4-BE49-F238E27FC236}">
+                <a16:creationId xmlns:a16="http://schemas.microsoft.com/office/drawing/2014/main" id="{88A780DD-6211-4DA8-8765-B221308A7668}"/>
+              </a:ext>
+            </a:extLst>
+          </p:cNvPr>
+          <p:cNvSpPr/>
+          <p:nvPr/>
+        </p:nvSpPr>
+        <p:spPr>
+          <a:xfrm>
+            <a:off x="6125564" y="3636232"/>
+            <a:ext cx="638354" cy="621102"/>
+          </a:xfrm>
+          <a:prstGeom prst="ellipse">
+            <a:avLst/>
+          </a:prstGeom>
+        </p:spPr>
+        <p:style>
+          <a:lnRef idx="2">
+            <a:schemeClr val="accent1">
+              <a:shade val="50000"/>
+            </a:schemeClr>
+          </a:lnRef>
+          <a:fillRef idx="1">
+            <a:schemeClr val="accent1"/>
+          </a:fillRef>
+          <a:effectRef idx="0">
+            <a:schemeClr val="accent1"/>
+          </a:effectRef>
+          <a:fontRef idx="minor">
+            <a:schemeClr val="lt1"/>
+          </a:fontRef>
+        </p:style>
+        <p:txBody>
+          <a:bodyPr rtlCol="0" anchor="ctr"/>
+          <a:lstStyle/>
+          <a:p>
+            <a:pPr algn="ctr"/>
+            <a:r>
+              <a:rPr lang="en-US" dirty="0"/>
+              <a:t>7</a:t>
+            </a:r>
+            <a:endParaRPr lang="en-IL" dirty="0"/>
+          </a:p>
+        </p:txBody>
+      </p:sp>
+      <p:cxnSp>
+        <p:nvCxnSpPr>
+          <p:cNvPr id="17" name="Straight Connector 16">
+            <a:extLst>
+              <a:ext uri="{FF2B5EF4-FFF2-40B4-BE49-F238E27FC236}">
+                <a16:creationId xmlns:a16="http://schemas.microsoft.com/office/drawing/2014/main" id="{59EA5F00-A627-4AA1-9108-0E4B662A35DC}"/>
+              </a:ext>
+            </a:extLst>
+          </p:cNvPr>
+          <p:cNvCxnSpPr>
+            <a:cxnSpLocks/>
+          </p:cNvCxnSpPr>
+          <p:nvPr/>
+        </p:nvCxnSpPr>
+        <p:spPr>
+          <a:xfrm>
+            <a:off x="7121692" y="1947914"/>
+            <a:ext cx="603005" cy="800039"/>
+          </a:xfrm>
+          <a:prstGeom prst="line">
+            <a:avLst/>
+          </a:prstGeom>
+        </p:spPr>
+        <p:style>
+          <a:lnRef idx="1">
+            <a:schemeClr val="accent1"/>
+          </a:lnRef>
+          <a:fillRef idx="0">
+            <a:schemeClr val="accent1"/>
+          </a:fillRef>
+          <a:effectRef idx="0">
+            <a:schemeClr val="accent1"/>
+          </a:effectRef>
+          <a:fontRef idx="minor">
+            <a:schemeClr val="tx1"/>
+          </a:fontRef>
+        </p:style>
+      </p:cxnSp>
+      <p:cxnSp>
+        <p:nvCxnSpPr>
+          <p:cNvPr id="19" name="Straight Connector 18">
+            <a:extLst>
+              <a:ext uri="{FF2B5EF4-FFF2-40B4-BE49-F238E27FC236}">
+                <a16:creationId xmlns:a16="http://schemas.microsoft.com/office/drawing/2014/main" id="{9E8CEC1B-4C02-4619-AF9C-0DF96A2CBB06}"/>
+              </a:ext>
+            </a:extLst>
+          </p:cNvPr>
+          <p:cNvCxnSpPr>
+            <a:cxnSpLocks/>
+          </p:cNvCxnSpPr>
+          <p:nvPr/>
+        </p:nvCxnSpPr>
+        <p:spPr>
+          <a:xfrm>
+            <a:off x="4331563" y="1947913"/>
+            <a:ext cx="603005" cy="800039"/>
+          </a:xfrm>
+          <a:prstGeom prst="line">
+            <a:avLst/>
+          </a:prstGeom>
+        </p:spPr>
+        <p:style>
+          <a:lnRef idx="1">
+            <a:schemeClr val="accent1"/>
+          </a:lnRef>
+          <a:fillRef idx="0">
+            <a:schemeClr val="accent1"/>
+          </a:fillRef>
+          <a:effectRef idx="0">
+            <a:schemeClr val="accent1"/>
+          </a:effectRef>
+          <a:fontRef idx="minor">
+            <a:schemeClr val="tx1"/>
+          </a:fontRef>
+        </p:style>
+      </p:cxnSp>
+      <p:cxnSp>
+        <p:nvCxnSpPr>
+          <p:cNvPr id="20" name="Straight Connector 19">
+            <a:extLst>
+              <a:ext uri="{FF2B5EF4-FFF2-40B4-BE49-F238E27FC236}">
+                <a16:creationId xmlns:a16="http://schemas.microsoft.com/office/drawing/2014/main" id="{596AA1C5-5AC4-49E5-A287-7E216860DD0B}"/>
+              </a:ext>
+            </a:extLst>
+          </p:cNvPr>
+          <p:cNvCxnSpPr>
+            <a:cxnSpLocks/>
+          </p:cNvCxnSpPr>
+          <p:nvPr/>
+        </p:nvCxnSpPr>
+        <p:spPr>
+          <a:xfrm>
+            <a:off x="6068072" y="3029505"/>
+            <a:ext cx="376059" cy="853333"/>
+          </a:xfrm>
+          <a:prstGeom prst="line">
+            <a:avLst/>
+          </a:prstGeom>
+        </p:spPr>
+        <p:style>
+          <a:lnRef idx="1">
+            <a:schemeClr val="accent1"/>
+          </a:lnRef>
+          <a:fillRef idx="0">
+            <a:schemeClr val="accent1"/>
+          </a:fillRef>
+          <a:effectRef idx="0">
+            <a:schemeClr val="accent1"/>
+          </a:effectRef>
+          <a:fontRef idx="minor">
+            <a:schemeClr val="tx1"/>
+          </a:fontRef>
+        </p:style>
+      </p:cxnSp>
+      <p:cxnSp>
+        <p:nvCxnSpPr>
+          <p:cNvPr id="22" name="Straight Connector 21">
+            <a:extLst>
+              <a:ext uri="{FF2B5EF4-FFF2-40B4-BE49-F238E27FC236}">
+                <a16:creationId xmlns:a16="http://schemas.microsoft.com/office/drawing/2014/main" id="{BA4193EC-18A4-45EF-8692-5FA8DE1F552B}"/>
+              </a:ext>
+            </a:extLst>
+          </p:cNvPr>
+          <p:cNvCxnSpPr>
+            <a:cxnSpLocks/>
+          </p:cNvCxnSpPr>
+          <p:nvPr/>
+        </p:nvCxnSpPr>
+        <p:spPr>
+          <a:xfrm flipH="1">
+            <a:off x="6068072" y="1880171"/>
+            <a:ext cx="877404" cy="925316"/>
+          </a:xfrm>
+          <a:prstGeom prst="line">
+            <a:avLst/>
+          </a:prstGeom>
+        </p:spPr>
+        <p:style>
+          <a:lnRef idx="1">
+            <a:schemeClr val="accent1"/>
+          </a:lnRef>
+          <a:fillRef idx="0">
+            <a:schemeClr val="accent1"/>
+          </a:fillRef>
+          <a:effectRef idx="0">
+            <a:schemeClr val="accent1"/>
+          </a:effectRef>
+          <a:fontRef idx="minor">
+            <a:schemeClr val="tx1"/>
+          </a:fontRef>
+        </p:style>
+      </p:cxnSp>
+      <p:cxnSp>
+        <p:nvCxnSpPr>
+          <p:cNvPr id="24" name="Straight Connector 23">
+            <a:extLst>
+              <a:ext uri="{FF2B5EF4-FFF2-40B4-BE49-F238E27FC236}">
+                <a16:creationId xmlns:a16="http://schemas.microsoft.com/office/drawing/2014/main" id="{8D9C1536-67CA-4CE6-BA8D-46D95F8C7375}"/>
+              </a:ext>
+            </a:extLst>
+          </p:cNvPr>
+          <p:cNvCxnSpPr>
+            <a:cxnSpLocks/>
+          </p:cNvCxnSpPr>
+          <p:nvPr/>
+        </p:nvCxnSpPr>
+        <p:spPr>
+          <a:xfrm flipH="1">
+            <a:off x="3264083" y="1822636"/>
+            <a:ext cx="877404" cy="925316"/>
+          </a:xfrm>
+          <a:prstGeom prst="line">
+            <a:avLst/>
+          </a:prstGeom>
+        </p:spPr>
+        <p:style>
+          <a:lnRef idx="1">
+            <a:schemeClr val="accent1"/>
+          </a:lnRef>
+          <a:fillRef idx="0">
+            <a:schemeClr val="accent1"/>
+          </a:fillRef>
+          <a:effectRef idx="0">
+            <a:schemeClr val="accent1"/>
+          </a:effectRef>
+          <a:fontRef idx="minor">
+            <a:schemeClr val="tx1"/>
+          </a:fontRef>
+        </p:style>
+      </p:cxnSp>
+      <p:cxnSp>
+        <p:nvCxnSpPr>
+          <p:cNvPr id="25" name="Straight Connector 24">
+            <a:extLst>
+              <a:ext uri="{FF2B5EF4-FFF2-40B4-BE49-F238E27FC236}">
+                <a16:creationId xmlns:a16="http://schemas.microsoft.com/office/drawing/2014/main" id="{79DCADF0-CB48-473A-816B-7C41F6BE672F}"/>
+              </a:ext>
+            </a:extLst>
+          </p:cNvPr>
+          <p:cNvCxnSpPr>
+            <a:cxnSpLocks/>
+          </p:cNvCxnSpPr>
+          <p:nvPr/>
+        </p:nvCxnSpPr>
+        <p:spPr>
+          <a:xfrm flipH="1">
+            <a:off x="7317378" y="2843649"/>
+            <a:ext cx="501345" cy="958189"/>
+          </a:xfrm>
+          <a:prstGeom prst="line">
+            <a:avLst/>
+          </a:prstGeom>
+        </p:spPr>
+        <p:style>
+          <a:lnRef idx="1">
+            <a:schemeClr val="accent1"/>
+          </a:lnRef>
+          <a:fillRef idx="0">
+            <a:schemeClr val="accent1"/>
+          </a:fillRef>
+          <a:effectRef idx="0">
+            <a:schemeClr val="accent1"/>
+          </a:effectRef>
+          <a:fontRef idx="minor">
+            <a:schemeClr val="tx1"/>
+          </a:fontRef>
+        </p:style>
+      </p:cxnSp>
+      <p:sp>
+        <p:nvSpPr>
+          <p:cNvPr id="29" name="Oval 28">
+            <a:extLst>
+              <a:ext uri="{FF2B5EF4-FFF2-40B4-BE49-F238E27FC236}">
+                <a16:creationId xmlns:a16="http://schemas.microsoft.com/office/drawing/2014/main" id="{EB39261E-3673-4ED1-888D-DDFB72349565}"/>
+              </a:ext>
+            </a:extLst>
+          </p:cNvPr>
+          <p:cNvSpPr/>
+          <p:nvPr/>
+        </p:nvSpPr>
+        <p:spPr>
+          <a:xfrm>
+            <a:off x="6969155" y="3733508"/>
+            <a:ext cx="638354" cy="621102"/>
+          </a:xfrm>
+          <a:prstGeom prst="ellipse">
+            <a:avLst/>
+          </a:prstGeom>
+        </p:spPr>
+        <p:style>
+          <a:lnRef idx="2">
+            <a:schemeClr val="accent1">
+              <a:shade val="50000"/>
+            </a:schemeClr>
+          </a:lnRef>
+          <a:fillRef idx="1">
+            <a:schemeClr val="accent1"/>
+          </a:fillRef>
+          <a:effectRef idx="0">
+            <a:schemeClr val="accent1"/>
+          </a:effectRef>
+          <a:fontRef idx="minor">
+            <a:schemeClr val="lt1"/>
+          </a:fontRef>
+        </p:style>
+        <p:txBody>
+          <a:bodyPr rtlCol="0" anchor="ctr"/>
+          <a:lstStyle/>
+          <a:p>
+            <a:pPr algn="ctr"/>
+            <a:r>
+              <a:rPr lang="en-US" dirty="0"/>
+              <a:t>9</a:t>
+            </a:r>
+            <a:endParaRPr lang="en-IL" dirty="0"/>
+          </a:p>
+        </p:txBody>
+      </p:sp>
+      <p:sp>
+        <p:nvSpPr>
+          <p:cNvPr id="30" name="Oval 29">
+            <a:extLst>
+              <a:ext uri="{FF2B5EF4-FFF2-40B4-BE49-F238E27FC236}">
+                <a16:creationId xmlns:a16="http://schemas.microsoft.com/office/drawing/2014/main" id="{80804BE3-44D3-4337-ACEB-10CDD129F6CA}"/>
+              </a:ext>
+            </a:extLst>
+          </p:cNvPr>
+          <p:cNvSpPr/>
+          <p:nvPr/>
+        </p:nvSpPr>
+        <p:spPr>
+          <a:xfrm>
+            <a:off x="8019101" y="3733508"/>
+            <a:ext cx="638354" cy="621102"/>
+          </a:xfrm>
+          <a:prstGeom prst="ellipse">
+            <a:avLst/>
+          </a:prstGeom>
+        </p:spPr>
+        <p:style>
+          <a:lnRef idx="2">
+            <a:schemeClr val="accent1">
+              <a:shade val="50000"/>
+            </a:schemeClr>
+          </a:lnRef>
+          <a:fillRef idx="1">
+            <a:schemeClr val="accent1"/>
+          </a:fillRef>
+          <a:effectRef idx="0">
+            <a:schemeClr val="accent1"/>
+          </a:effectRef>
+          <a:fontRef idx="minor">
+            <a:schemeClr val="lt1"/>
+          </a:fontRef>
+        </p:style>
+        <p:txBody>
+          <a:bodyPr rtlCol="0" anchor="ctr"/>
+          <a:lstStyle/>
+          <a:p>
+            <a:pPr algn="ctr"/>
+            <a:r>
+              <a:rPr lang="en-US" dirty="0"/>
+              <a:t>12</a:t>
+            </a:r>
+            <a:endParaRPr lang="en-IL" dirty="0"/>
+          </a:p>
+        </p:txBody>
+      </p:sp>
+      <p:sp>
+        <p:nvSpPr>
+          <p:cNvPr id="31" name="Oval 30">
+            <a:extLst>
+              <a:ext uri="{FF2B5EF4-FFF2-40B4-BE49-F238E27FC236}">
+                <a16:creationId xmlns:a16="http://schemas.microsoft.com/office/drawing/2014/main" id="{588F14ED-3B37-46B7-B927-8A2941F69105}"/>
+              </a:ext>
+            </a:extLst>
+          </p:cNvPr>
+          <p:cNvSpPr/>
+          <p:nvPr/>
+        </p:nvSpPr>
+        <p:spPr>
+          <a:xfrm>
+            <a:off x="7516665" y="4850213"/>
+            <a:ext cx="638354" cy="621102"/>
+          </a:xfrm>
+          <a:prstGeom prst="ellipse">
+            <a:avLst/>
+          </a:prstGeom>
+        </p:spPr>
+        <p:style>
+          <a:lnRef idx="2">
+            <a:schemeClr val="accent1">
+              <a:shade val="50000"/>
+            </a:schemeClr>
+          </a:lnRef>
+          <a:fillRef idx="1">
+            <a:schemeClr val="accent1"/>
+          </a:fillRef>
+          <a:effectRef idx="0">
+            <a:schemeClr val="accent1"/>
+          </a:effectRef>
+          <a:fontRef idx="minor">
+            <a:schemeClr val="lt1"/>
+          </a:fontRef>
+        </p:style>
+        <p:txBody>
+          <a:bodyPr rtlCol="0" anchor="ctr"/>
+          <a:lstStyle/>
+          <a:p>
+            <a:pPr algn="ctr"/>
+            <a:r>
+              <a:rPr lang="en-US" dirty="0"/>
+              <a:t>11</a:t>
+            </a:r>
+            <a:endParaRPr lang="en-IL" dirty="0"/>
+          </a:p>
+        </p:txBody>
+      </p:sp>
+      <p:cxnSp>
+        <p:nvCxnSpPr>
+          <p:cNvPr id="32" name="Straight Connector 31">
+            <a:extLst>
+              <a:ext uri="{FF2B5EF4-FFF2-40B4-BE49-F238E27FC236}">
+                <a16:creationId xmlns:a16="http://schemas.microsoft.com/office/drawing/2014/main" id="{347AC39A-7C5A-4622-A033-D9737C20B4CB}"/>
+              </a:ext>
+            </a:extLst>
+          </p:cNvPr>
+          <p:cNvCxnSpPr>
+            <a:cxnSpLocks/>
+          </p:cNvCxnSpPr>
+          <p:nvPr/>
+        </p:nvCxnSpPr>
+        <p:spPr>
+          <a:xfrm flipH="1">
+            <a:off x="3981785" y="3021467"/>
+            <a:ext cx="877404" cy="925316"/>
+          </a:xfrm>
+          <a:prstGeom prst="line">
+            <a:avLst/>
+          </a:prstGeom>
+        </p:spPr>
+        <p:style>
+          <a:lnRef idx="1">
+            <a:schemeClr val="accent1"/>
+          </a:lnRef>
+          <a:fillRef idx="0">
+            <a:schemeClr val="accent1"/>
+          </a:fillRef>
+          <a:effectRef idx="0">
+            <a:schemeClr val="accent1"/>
+          </a:effectRef>
+          <a:fontRef idx="minor">
+            <a:schemeClr val="tx1"/>
+          </a:fontRef>
+        </p:style>
+      </p:cxnSp>
+      <p:sp>
+        <p:nvSpPr>
+          <p:cNvPr id="34" name="Oval 33">
+            <a:extLst>
+              <a:ext uri="{FF2B5EF4-FFF2-40B4-BE49-F238E27FC236}">
+                <a16:creationId xmlns:a16="http://schemas.microsoft.com/office/drawing/2014/main" id="{0C95B91A-A58D-43DC-982B-D276178B14DC}"/>
+              </a:ext>
+            </a:extLst>
+          </p:cNvPr>
+          <p:cNvSpPr/>
+          <p:nvPr/>
+        </p:nvSpPr>
+        <p:spPr>
+          <a:xfrm>
+            <a:off x="2933559" y="2494901"/>
+            <a:ext cx="638354" cy="621102"/>
+          </a:xfrm>
+          <a:prstGeom prst="ellipse">
+            <a:avLst/>
+          </a:prstGeom>
+        </p:spPr>
+        <p:style>
+          <a:lnRef idx="2">
+            <a:schemeClr val="accent1">
+              <a:shade val="50000"/>
+            </a:schemeClr>
+          </a:lnRef>
+          <a:fillRef idx="1">
+            <a:schemeClr val="accent1"/>
+          </a:fillRef>
+          <a:effectRef idx="0">
+            <a:schemeClr val="accent1"/>
+          </a:effectRef>
+          <a:fontRef idx="minor">
+            <a:schemeClr val="lt1"/>
+          </a:fontRef>
+        </p:style>
+        <p:txBody>
+          <a:bodyPr rtlCol="0" anchor="ctr"/>
+          <a:lstStyle/>
+          <a:p>
+            <a:pPr algn="ctr"/>
+            <a:r>
+              <a:rPr lang="en-US" dirty="0"/>
+              <a:t>1</a:t>
+            </a:r>
+            <a:endParaRPr lang="en-IL" dirty="0"/>
+          </a:p>
+        </p:txBody>
+      </p:sp>
+      <p:cxnSp>
+        <p:nvCxnSpPr>
+          <p:cNvPr id="35" name="Straight Connector 34">
+            <a:extLst>
+              <a:ext uri="{FF2B5EF4-FFF2-40B4-BE49-F238E27FC236}">
+                <a16:creationId xmlns:a16="http://schemas.microsoft.com/office/drawing/2014/main" id="{404CD11F-4136-430B-80E3-6875D908C6C5}"/>
+              </a:ext>
+            </a:extLst>
+          </p:cNvPr>
+          <p:cNvCxnSpPr>
+            <a:cxnSpLocks/>
+          </p:cNvCxnSpPr>
+          <p:nvPr/>
+        </p:nvCxnSpPr>
+        <p:spPr>
+          <a:xfrm>
+            <a:off x="7868209" y="3021467"/>
+            <a:ext cx="376059" cy="853333"/>
+          </a:xfrm>
+          <a:prstGeom prst="line">
+            <a:avLst/>
+          </a:prstGeom>
+        </p:spPr>
+        <p:style>
+          <a:lnRef idx="1">
+            <a:schemeClr val="accent1"/>
+          </a:lnRef>
+          <a:fillRef idx="0">
+            <a:schemeClr val="accent1"/>
+          </a:fillRef>
+          <a:effectRef idx="0">
+            <a:schemeClr val="accent1"/>
+          </a:effectRef>
+          <a:fontRef idx="minor">
+            <a:schemeClr val="tx1"/>
+          </a:fontRef>
+        </p:style>
+      </p:cxnSp>
+      <p:cxnSp>
+        <p:nvCxnSpPr>
+          <p:cNvPr id="36" name="Straight Connector 35">
+            <a:extLst>
+              <a:ext uri="{FF2B5EF4-FFF2-40B4-BE49-F238E27FC236}">
+                <a16:creationId xmlns:a16="http://schemas.microsoft.com/office/drawing/2014/main" id="{4A03B50C-B86F-4A53-8428-045E4C4D0B97}"/>
+              </a:ext>
+            </a:extLst>
+          </p:cNvPr>
+          <p:cNvCxnSpPr>
+            <a:cxnSpLocks/>
+          </p:cNvCxnSpPr>
+          <p:nvPr/>
+        </p:nvCxnSpPr>
+        <p:spPr>
+          <a:xfrm flipH="1">
+            <a:off x="7792962" y="4132248"/>
+            <a:ext cx="501345" cy="958189"/>
+          </a:xfrm>
+          <a:prstGeom prst="line">
+            <a:avLst/>
+          </a:prstGeom>
+        </p:spPr>
+        <p:style>
+          <a:lnRef idx="1">
+            <a:schemeClr val="accent1"/>
+          </a:lnRef>
+          <a:fillRef idx="0">
+            <a:schemeClr val="accent1"/>
+          </a:fillRef>
+          <a:effectRef idx="0">
+            <a:schemeClr val="accent1"/>
+          </a:effectRef>
+          <a:fontRef idx="minor">
+            <a:schemeClr val="tx1"/>
+          </a:fontRef>
+        </p:style>
+      </p:cxnSp>
+    </p:spTree>
+    <p:extLst>
+      <p:ext uri="{BB962C8B-B14F-4D97-AF65-F5344CB8AC3E}">
+        <p14:creationId xmlns:p14="http://schemas.microsoft.com/office/powerpoint/2010/main" val="2466337929"/>
       </p:ext>
     </p:extLst>
   </p:cSld>

</xml_diff>